<commit_message>
add 002 Data Structure - Numbers
</commit_message>
<xml_diff>
--- a/Video_Covers.pptx
+++ b/Video_Covers.pptx
@@ -5,13 +5,15 @@
     <p:sldMasterId id="2147483660" r:id="rId1"/>
   </p:sldMasterIdLst>
   <p:notesMasterIdLst>
-    <p:notesMasterId r:id="rId3"/>
+    <p:notesMasterId r:id="rId5"/>
   </p:notesMasterIdLst>
   <p:handoutMasterIdLst>
-    <p:handoutMasterId r:id="rId4"/>
+    <p:handoutMasterId r:id="rId6"/>
   </p:handoutMasterIdLst>
   <p:sldIdLst>
     <p:sldId id="257" r:id="rId2"/>
+    <p:sldId id="258" r:id="rId3"/>
+    <p:sldId id="259" r:id="rId4"/>
   </p:sldIdLst>
   <p:sldSz cx="12188825" cy="6858000"/>
   <p:notesSz cx="6858000" cy="9144000"/>
@@ -776,6 +778,174 @@
     <p:extLst>
       <p:ext uri="{BB962C8B-B14F-4D97-AF65-F5344CB8AC3E}">
         <p14:creationId xmlns:p14="http://schemas.microsoft.com/office/powerpoint/2010/main" val="2864014762"/>
+      </p:ext>
+    </p:extLst>
+  </p:cSld>
+  <p:clrMapOvr>
+    <a:masterClrMapping/>
+  </p:clrMapOvr>
+</p:notes>
+</file>
+
+<file path=ppt/notesSlides/notesSlide2.xml><?xml version="1.0" encoding="utf-8"?>
+<p:notes xmlns:a="http://schemas.openxmlformats.org/drawingml/2006/main" xmlns:r="http://schemas.openxmlformats.org/officeDocument/2006/relationships" xmlns:p="http://schemas.openxmlformats.org/presentationml/2006/main">
+  <p:cSld>
+    <p:spTree>
+      <p:nvGrpSpPr>
+        <p:cNvPr id="1" name=""/>
+        <p:cNvGrpSpPr/>
+        <p:nvPr/>
+      </p:nvGrpSpPr>
+      <p:grpSpPr>
+        <a:xfrm>
+          <a:off x="0" y="0"/>
+          <a:ext cx="0" cy="0"/>
+          <a:chOff x="0" y="0"/>
+          <a:chExt cx="0" cy="0"/>
+        </a:xfrm>
+      </p:grpSpPr>
+      <p:sp>
+        <p:nvSpPr>
+          <p:cNvPr id="2" name="Slide Image Placeholder 1"/>
+          <p:cNvSpPr>
+            <a:spLocks noGrp="1" noRot="1" noChangeAspect="1"/>
+          </p:cNvSpPr>
+          <p:nvPr>
+            <p:ph type="sldImg"/>
+          </p:nvPr>
+        </p:nvSpPr>
+        <p:spPr/>
+      </p:sp>
+      <p:sp>
+        <p:nvSpPr>
+          <p:cNvPr id="3" name="Notes Placeholder 2"/>
+          <p:cNvSpPr>
+            <a:spLocks noGrp="1"/>
+          </p:cNvSpPr>
+          <p:nvPr>
+            <p:ph type="body" idx="1"/>
+          </p:nvPr>
+        </p:nvSpPr>
+        <p:spPr/>
+        <p:txBody>
+          <a:bodyPr/>
+          <a:lstStyle/>
+          <a:p>
+            <a:endParaRPr lang="en-US" dirty="0"/>
+          </a:p>
+        </p:txBody>
+      </p:sp>
+      <p:sp>
+        <p:nvSpPr>
+          <p:cNvPr id="4" name="Slide Number Placeholder 3"/>
+          <p:cNvSpPr>
+            <a:spLocks noGrp="1"/>
+          </p:cNvSpPr>
+          <p:nvPr>
+            <p:ph type="sldNum" sz="quarter" idx="10"/>
+          </p:nvPr>
+        </p:nvSpPr>
+        <p:spPr/>
+        <p:txBody>
+          <a:bodyPr/>
+          <a:lstStyle/>
+          <a:p>
+            <a:fld id="{6BB98AFB-CB0D-4DFE-87B9-B4B0D0DE73CD}" type="slidenum">
+              <a:rPr lang="en-US" smtClean="0"/>
+              <a:t>2</a:t>
+            </a:fld>
+            <a:endParaRPr lang="en-US" dirty="0"/>
+          </a:p>
+        </p:txBody>
+      </p:sp>
+    </p:spTree>
+    <p:extLst>
+      <p:ext uri="{BB962C8B-B14F-4D97-AF65-F5344CB8AC3E}">
+        <p14:creationId xmlns:p14="http://schemas.microsoft.com/office/powerpoint/2010/main" val="3343015242"/>
+      </p:ext>
+    </p:extLst>
+  </p:cSld>
+  <p:clrMapOvr>
+    <a:masterClrMapping/>
+  </p:clrMapOvr>
+</p:notes>
+</file>
+
+<file path=ppt/notesSlides/notesSlide3.xml><?xml version="1.0" encoding="utf-8"?>
+<p:notes xmlns:a="http://schemas.openxmlformats.org/drawingml/2006/main" xmlns:r="http://schemas.openxmlformats.org/officeDocument/2006/relationships" xmlns:p="http://schemas.openxmlformats.org/presentationml/2006/main">
+  <p:cSld>
+    <p:spTree>
+      <p:nvGrpSpPr>
+        <p:cNvPr id="1" name=""/>
+        <p:cNvGrpSpPr/>
+        <p:nvPr/>
+      </p:nvGrpSpPr>
+      <p:grpSpPr>
+        <a:xfrm>
+          <a:off x="0" y="0"/>
+          <a:ext cx="0" cy="0"/>
+          <a:chOff x="0" y="0"/>
+          <a:chExt cx="0" cy="0"/>
+        </a:xfrm>
+      </p:grpSpPr>
+      <p:sp>
+        <p:nvSpPr>
+          <p:cNvPr id="2" name="Slide Image Placeholder 1"/>
+          <p:cNvSpPr>
+            <a:spLocks noGrp="1" noRot="1" noChangeAspect="1"/>
+          </p:cNvSpPr>
+          <p:nvPr>
+            <p:ph type="sldImg"/>
+          </p:nvPr>
+        </p:nvSpPr>
+        <p:spPr/>
+      </p:sp>
+      <p:sp>
+        <p:nvSpPr>
+          <p:cNvPr id="3" name="Notes Placeholder 2"/>
+          <p:cNvSpPr>
+            <a:spLocks noGrp="1"/>
+          </p:cNvSpPr>
+          <p:nvPr>
+            <p:ph type="body" idx="1"/>
+          </p:nvPr>
+        </p:nvSpPr>
+        <p:spPr/>
+        <p:txBody>
+          <a:bodyPr/>
+          <a:lstStyle/>
+          <a:p>
+            <a:endParaRPr lang="en-US" dirty="0"/>
+          </a:p>
+        </p:txBody>
+      </p:sp>
+      <p:sp>
+        <p:nvSpPr>
+          <p:cNvPr id="4" name="Slide Number Placeholder 3"/>
+          <p:cNvSpPr>
+            <a:spLocks noGrp="1"/>
+          </p:cNvSpPr>
+          <p:nvPr>
+            <p:ph type="sldNum" sz="quarter" idx="10"/>
+          </p:nvPr>
+        </p:nvSpPr>
+        <p:spPr/>
+        <p:txBody>
+          <a:bodyPr/>
+          <a:lstStyle/>
+          <a:p>
+            <a:fld id="{6BB98AFB-CB0D-4DFE-87B9-B4B0D0DE73CD}" type="slidenum">
+              <a:rPr lang="en-US" smtClean="0"/>
+              <a:t>3</a:t>
+            </a:fld>
+            <a:endParaRPr lang="en-US" dirty="0"/>
+          </a:p>
+        </p:txBody>
+      </p:sp>
+    </p:spTree>
+    <p:extLst>
+      <p:ext uri="{BB962C8B-B14F-4D97-AF65-F5344CB8AC3E}">
+        <p14:creationId xmlns:p14="http://schemas.microsoft.com/office/powerpoint/2010/main" val="318718707"/>
       </p:ext>
     </p:extLst>
   </p:cSld>
@@ -4286,6 +4456,694 @@
     <p:extLst>
       <p:ext uri="{BB962C8B-B14F-4D97-AF65-F5344CB8AC3E}">
         <p14:creationId xmlns:p14="http://schemas.microsoft.com/office/powerpoint/2010/main" val="3658128150"/>
+      </p:ext>
+    </p:extLst>
+  </p:cSld>
+  <p:clrMapOvr>
+    <a:masterClrMapping/>
+  </p:clrMapOvr>
+  <mc:AlternateContent xmlns:mc="http://schemas.openxmlformats.org/markup-compatibility/2006" xmlns:p14="http://schemas.microsoft.com/office/powerpoint/2010/main">
+    <mc:Choice Requires="p14">
+      <p:transition spd="med" p14:dur="700">
+        <p:fade/>
+      </p:transition>
+    </mc:Choice>
+    <mc:Fallback xmlns="">
+      <p:transition spd="med">
+        <p:fade/>
+      </p:transition>
+    </mc:Fallback>
+  </mc:AlternateContent>
+</p:sld>
+</file>
+
+<file path=ppt/slides/slide2.xml><?xml version="1.0" encoding="utf-8"?>
+<p:sld xmlns:a="http://schemas.openxmlformats.org/drawingml/2006/main" xmlns:r="http://schemas.openxmlformats.org/officeDocument/2006/relationships" xmlns:p="http://schemas.openxmlformats.org/presentationml/2006/main">
+  <p:cSld>
+    <p:spTree>
+      <p:nvGrpSpPr>
+        <p:cNvPr id="1" name=""/>
+        <p:cNvGrpSpPr/>
+        <p:nvPr/>
+      </p:nvGrpSpPr>
+      <p:grpSpPr>
+        <a:xfrm>
+          <a:off x="0" y="0"/>
+          <a:ext cx="0" cy="0"/>
+          <a:chOff x="0" y="0"/>
+          <a:chExt cx="0" cy="0"/>
+        </a:xfrm>
+      </p:grpSpPr>
+      <p:sp>
+        <p:nvSpPr>
+          <p:cNvPr id="4" name="Title 3"/>
+          <p:cNvSpPr>
+            <a:spLocks noGrp="1"/>
+          </p:cNvSpPr>
+          <p:nvPr>
+            <p:ph type="ctrTitle"/>
+          </p:nvPr>
+        </p:nvSpPr>
+        <p:spPr/>
+        <p:txBody>
+          <a:bodyPr>
+            <a:normAutofit/>
+          </a:bodyPr>
+          <a:lstStyle/>
+          <a:p>
+            <a:pPr algn="ctr"/>
+            <a:r>
+              <a:rPr lang="zh-CN" altLang="en-US" sz="4800" dirty="0">
+                <a:latin typeface="华文隶书" panose="02010800040101010101" pitchFamily="2" charset="-122"/>
+                <a:ea typeface="华文隶书" panose="02010800040101010101" pitchFamily="2" charset="-122"/>
+              </a:rPr>
+              <a:t>让</a:t>
+            </a:r>
+            <a:r>
+              <a:rPr lang="en-US" altLang="zh-CN" sz="4800" dirty="0">
+                <a:latin typeface="华文隶书" panose="02010800040101010101" pitchFamily="2" charset="-122"/>
+                <a:ea typeface="华文隶书" panose="02010800040101010101" pitchFamily="2" charset="-122"/>
+              </a:rPr>
+              <a:t>Python</a:t>
+            </a:r>
+            <a:r>
+              <a:rPr lang="zh-CN" altLang="en-US" sz="4800" dirty="0">
+                <a:latin typeface="华文隶书" panose="02010800040101010101" pitchFamily="2" charset="-122"/>
+                <a:ea typeface="华文隶书" panose="02010800040101010101" pitchFamily="2" charset="-122"/>
+              </a:rPr>
+              <a:t>遇上</a:t>
+            </a:r>
+            <a:r>
+              <a:rPr lang="en-US" altLang="zh-CN" sz="4800" dirty="0">
+                <a:latin typeface="华文隶书" panose="02010800040101010101" pitchFamily="2" charset="-122"/>
+                <a:ea typeface="华文隶书" panose="02010800040101010101" pitchFamily="2" charset="-122"/>
+              </a:rPr>
+              <a:t>Office</a:t>
+            </a:r>
+            <a:br>
+              <a:rPr lang="en-US" altLang="zh-CN" sz="4800" dirty="0">
+                <a:latin typeface="华文隶书" panose="02010800040101010101" pitchFamily="2" charset="-122"/>
+                <a:ea typeface="华文隶书" panose="02010800040101010101" pitchFamily="2" charset="-122"/>
+              </a:rPr>
+            </a:br>
+            <a:br>
+              <a:rPr lang="en-US" altLang="zh-CN" sz="4800" dirty="0">
+                <a:latin typeface="华文隶书" panose="02010800040101010101" pitchFamily="2" charset="-122"/>
+                <a:ea typeface="华文隶书" panose="02010800040101010101" pitchFamily="2" charset="-122"/>
+              </a:rPr>
+            </a:br>
+            <a:r>
+              <a:rPr lang="en-US" altLang="zh-CN" sz="4800" dirty="0">
+                <a:latin typeface="华文隶书" panose="02010800040101010101" pitchFamily="2" charset="-122"/>
+                <a:ea typeface="华文隶书" panose="02010800040101010101" pitchFamily="2" charset="-122"/>
+              </a:rPr>
+              <a:t>(Python with Office)</a:t>
+            </a:r>
+            <a:endParaRPr lang="en-US" sz="4800" dirty="0">
+              <a:latin typeface="华文隶书" panose="02010800040101010101" pitchFamily="2" charset="-122"/>
+              <a:ea typeface="华文隶书" panose="02010800040101010101" pitchFamily="2" charset="-122"/>
+            </a:endParaRPr>
+          </a:p>
+        </p:txBody>
+      </p:sp>
+      <p:sp>
+        <p:nvSpPr>
+          <p:cNvPr id="3" name="Content Placeholder 2"/>
+          <p:cNvSpPr>
+            <a:spLocks noGrp="1"/>
+          </p:cNvSpPr>
+          <p:nvPr>
+            <p:ph type="subTitle" idx="1"/>
+          </p:nvPr>
+        </p:nvSpPr>
+        <p:spPr>
+          <a:xfrm>
+            <a:off x="1065212" y="3403600"/>
+            <a:ext cx="5029201" cy="2185640"/>
+          </a:xfrm>
+        </p:spPr>
+        <p:txBody>
+          <a:bodyPr>
+            <a:normAutofit lnSpcReduction="10000"/>
+          </a:bodyPr>
+          <a:lstStyle/>
+          <a:p>
+            <a:r>
+              <a:rPr lang="en-US" sz="2800" dirty="0">
+                <a:latin typeface="ADLaM Display" panose="020F0502020204030204" pitchFamily="2" charset="0"/>
+                <a:ea typeface="ADLaM Display" panose="020F0502020204030204" pitchFamily="2" charset="0"/>
+                <a:cs typeface="ADLaM Display" panose="020F0502020204030204" pitchFamily="2" charset="0"/>
+              </a:rPr>
+              <a:t>Chapter 2 Data Structure </a:t>
+            </a:r>
+          </a:p>
+          <a:p>
+            <a:r>
+              <a:rPr lang="en-US" sz="2800" dirty="0">
+                <a:latin typeface="ADLaM Display" panose="020F0502020204030204" pitchFamily="2" charset="0"/>
+                <a:ea typeface="ADLaM Display" panose="020F0502020204030204" pitchFamily="2" charset="0"/>
+                <a:cs typeface="ADLaM Display" panose="020F0502020204030204" pitchFamily="2" charset="0"/>
+              </a:rPr>
+              <a:t>2.1 </a:t>
+            </a:r>
+            <a:r>
+              <a:rPr lang="en-US" altLang="zh-CN" sz="2800" dirty="0">
+                <a:latin typeface="ADLaM Display" panose="020F0502020204030204" pitchFamily="2" charset="0"/>
+                <a:ea typeface="ADLaM Display" panose="020F0502020204030204" pitchFamily="2" charset="0"/>
+                <a:cs typeface="ADLaM Display" panose="020F0502020204030204" pitchFamily="2" charset="0"/>
+              </a:rPr>
+              <a:t>Numeric Type</a:t>
+            </a:r>
+          </a:p>
+          <a:p>
+            <a:endParaRPr lang="en-US" sz="2800" dirty="0">
+              <a:latin typeface="ADLaM Display" panose="020F0502020204030204" pitchFamily="2" charset="0"/>
+              <a:ea typeface="ADLaM Display" panose="020F0502020204030204" pitchFamily="2" charset="0"/>
+              <a:cs typeface="ADLaM Display" panose="020F0502020204030204" pitchFamily="2" charset="0"/>
+            </a:endParaRPr>
+          </a:p>
+          <a:p>
+            <a:r>
+              <a:rPr lang="zh-CN" altLang="en-US" sz="2800" dirty="0">
+                <a:latin typeface="ADLaM Display" panose="020F0502020204030204" pitchFamily="2" charset="0"/>
+                <a:ea typeface="ADLaM Display" panose="020F0502020204030204" pitchFamily="2" charset="0"/>
+                <a:cs typeface="ADLaM Display" panose="020F0502020204030204" pitchFamily="2" charset="0"/>
+              </a:rPr>
+              <a:t>第二章 数据结构</a:t>
+            </a:r>
+            <a:endParaRPr lang="en-US" altLang="zh-CN" sz="2800" dirty="0">
+              <a:latin typeface="ADLaM Display" panose="020F0502020204030204" pitchFamily="2" charset="0"/>
+              <a:ea typeface="ADLaM Display" panose="020F0502020204030204" pitchFamily="2" charset="0"/>
+              <a:cs typeface="ADLaM Display" panose="020F0502020204030204" pitchFamily="2" charset="0"/>
+            </a:endParaRPr>
+          </a:p>
+          <a:p>
+            <a:r>
+              <a:rPr lang="en-US" sz="2800" dirty="0">
+                <a:latin typeface="ADLaM Display" panose="020F0502020204030204" pitchFamily="2" charset="0"/>
+                <a:ea typeface="ADLaM Display" panose="020F0502020204030204" pitchFamily="2" charset="0"/>
+                <a:cs typeface="ADLaM Display" panose="020F0502020204030204" pitchFamily="2" charset="0"/>
+              </a:rPr>
+              <a:t>2.1 </a:t>
+            </a:r>
+            <a:r>
+              <a:rPr lang="zh-CN" altLang="en-US" sz="2800" dirty="0">
+                <a:latin typeface="ADLaM Display" panose="020F0502020204030204" pitchFamily="2" charset="0"/>
+                <a:ea typeface="ADLaM Display" panose="020F0502020204030204" pitchFamily="2" charset="0"/>
+                <a:cs typeface="ADLaM Display" panose="020F0502020204030204" pitchFamily="2" charset="0"/>
+              </a:rPr>
+              <a:t>数字类型</a:t>
+            </a:r>
+            <a:endParaRPr lang="en-US" sz="2800" dirty="0">
+              <a:latin typeface="ADLaM Display" panose="020F0502020204030204" pitchFamily="2" charset="0"/>
+              <a:ea typeface="ADLaM Display" panose="020F0502020204030204" pitchFamily="2" charset="0"/>
+              <a:cs typeface="ADLaM Display" panose="020F0502020204030204" pitchFamily="2" charset="0"/>
+            </a:endParaRPr>
+          </a:p>
+          <a:p>
+            <a:endParaRPr lang="en-US" sz="2800" dirty="0">
+              <a:latin typeface="ADLaM Display" panose="020F0502020204030204" pitchFamily="2" charset="0"/>
+              <a:ea typeface="ADLaM Display" panose="020F0502020204030204" pitchFamily="2" charset="0"/>
+              <a:cs typeface="ADLaM Display" panose="020F0502020204030204" pitchFamily="2" charset="0"/>
+            </a:endParaRPr>
+          </a:p>
+        </p:txBody>
+      </p:sp>
+      <p:pic>
+        <p:nvPicPr>
+          <p:cNvPr id="5" name="Picture 4">
+            <a:extLst>
+              <a:ext uri="{FF2B5EF4-FFF2-40B4-BE49-F238E27FC236}">
+                <a16:creationId xmlns:a16="http://schemas.microsoft.com/office/drawing/2014/main" id="{4AD8B85C-B359-195F-B78C-C879AB7840B1}"/>
+              </a:ext>
+            </a:extLst>
+          </p:cNvPr>
+          <p:cNvPicPr>
+            <a:picLocks noChangeAspect="1"/>
+          </p:cNvPicPr>
+          <p:nvPr/>
+        </p:nvPicPr>
+        <p:blipFill>
+          <a:blip r:embed="rId3"/>
+          <a:stretch>
+            <a:fillRect/>
+          </a:stretch>
+        </p:blipFill>
+        <p:spPr>
+          <a:xfrm>
+            <a:off x="57601" y="1189856"/>
+            <a:ext cx="1068259" cy="1556792"/>
+          </a:xfrm>
+          <a:prstGeom prst="rect">
+            <a:avLst/>
+          </a:prstGeom>
+          <a:ln>
+            <a:noFill/>
+          </a:ln>
+          <a:effectLst>
+            <a:outerShdw blurRad="292100" dist="139700" dir="2700000" algn="tl" rotWithShape="0">
+              <a:srgbClr val="333333">
+                <a:alpha val="65000"/>
+              </a:srgbClr>
+            </a:outerShdw>
+          </a:effectLst>
+        </p:spPr>
+      </p:pic>
+      <p:sp>
+        <p:nvSpPr>
+          <p:cNvPr id="2" name="TextBox 1">
+            <a:extLst>
+              <a:ext uri="{FF2B5EF4-FFF2-40B4-BE49-F238E27FC236}">
+                <a16:creationId xmlns:a16="http://schemas.microsoft.com/office/drawing/2014/main" id="{CAB2C784-DE74-68FC-7A84-3E6C5D164315}"/>
+              </a:ext>
+            </a:extLst>
+          </p:cNvPr>
+          <p:cNvSpPr txBox="1"/>
+          <p:nvPr/>
+        </p:nvSpPr>
+        <p:spPr>
+          <a:xfrm>
+            <a:off x="405780" y="6139934"/>
+            <a:ext cx="7951216" cy="523220"/>
+          </a:xfrm>
+          <a:prstGeom prst="rect">
+            <a:avLst/>
+          </a:prstGeom>
+          <a:solidFill>
+            <a:schemeClr val="bg1">
+              <a:lumMod val="95000"/>
+            </a:schemeClr>
+          </a:solidFill>
+          <a:ln>
+            <a:solidFill>
+              <a:schemeClr val="bg2"/>
+            </a:solidFill>
+          </a:ln>
+        </p:spPr>
+        <p:txBody>
+          <a:bodyPr wrap="none" rtlCol="0" anchor="ctr" anchorCtr="1">
+            <a:spAutoFit/>
+          </a:bodyPr>
+          <a:lstStyle/>
+          <a:p>
+            <a:r>
+              <a:rPr lang="en-US" sz="2800" dirty="0">
+                <a:hlinkClick r:id="rId4"/>
+              </a:rPr>
+              <a:t>https://github.com/yasenstar/python_with_office</a:t>
+            </a:r>
+            <a:endParaRPr lang="en-US" sz="2800" dirty="0"/>
+          </a:p>
+        </p:txBody>
+      </p:sp>
+      <p:pic>
+        <p:nvPicPr>
+          <p:cNvPr id="7" name="Picture 6">
+            <a:extLst>
+              <a:ext uri="{FF2B5EF4-FFF2-40B4-BE49-F238E27FC236}">
+                <a16:creationId xmlns:a16="http://schemas.microsoft.com/office/drawing/2014/main" id="{3B6787F6-2691-8FF0-DD76-9A26EDBF1ECE}"/>
+              </a:ext>
+            </a:extLst>
+          </p:cNvPr>
+          <p:cNvPicPr>
+            <a:picLocks noChangeAspect="1"/>
+          </p:cNvPicPr>
+          <p:nvPr/>
+        </p:nvPicPr>
+        <p:blipFill>
+          <a:blip r:embed="rId5"/>
+          <a:stretch>
+            <a:fillRect/>
+          </a:stretch>
+        </p:blipFill>
+        <p:spPr>
+          <a:xfrm>
+            <a:off x="6238427" y="404664"/>
+            <a:ext cx="5439555" cy="5184576"/>
+          </a:xfrm>
+          <a:prstGeom prst="rect">
+            <a:avLst/>
+          </a:prstGeom>
+          <a:ln>
+            <a:noFill/>
+          </a:ln>
+          <a:effectLst>
+            <a:outerShdw blurRad="292100" dist="139700" dir="2700000" algn="tl" rotWithShape="0">
+              <a:srgbClr val="333333">
+                <a:alpha val="65000"/>
+              </a:srgbClr>
+            </a:outerShdw>
+          </a:effectLst>
+        </p:spPr>
+      </p:pic>
+    </p:spTree>
+    <p:extLst>
+      <p:ext uri="{BB962C8B-B14F-4D97-AF65-F5344CB8AC3E}">
+        <p14:creationId xmlns:p14="http://schemas.microsoft.com/office/powerpoint/2010/main" val="2396154423"/>
+      </p:ext>
+    </p:extLst>
+  </p:cSld>
+  <p:clrMapOvr>
+    <a:masterClrMapping/>
+  </p:clrMapOvr>
+  <mc:AlternateContent xmlns:mc="http://schemas.openxmlformats.org/markup-compatibility/2006" xmlns:p14="http://schemas.microsoft.com/office/powerpoint/2010/main">
+    <mc:Choice Requires="p14">
+      <p:transition spd="med" p14:dur="700">
+        <p:fade/>
+      </p:transition>
+    </mc:Choice>
+    <mc:Fallback xmlns="">
+      <p:transition spd="med">
+        <p:fade/>
+      </p:transition>
+    </mc:Fallback>
+  </mc:AlternateContent>
+</p:sld>
+</file>
+
+<file path=ppt/slides/slide3.xml><?xml version="1.0" encoding="utf-8"?>
+<p:sld xmlns:a="http://schemas.openxmlformats.org/drawingml/2006/main" xmlns:r="http://schemas.openxmlformats.org/officeDocument/2006/relationships" xmlns:p="http://schemas.openxmlformats.org/presentationml/2006/main">
+  <p:cSld>
+    <p:spTree>
+      <p:nvGrpSpPr>
+        <p:cNvPr id="1" name=""/>
+        <p:cNvGrpSpPr/>
+        <p:nvPr/>
+      </p:nvGrpSpPr>
+      <p:grpSpPr>
+        <a:xfrm>
+          <a:off x="0" y="0"/>
+          <a:ext cx="0" cy="0"/>
+          <a:chOff x="0" y="0"/>
+          <a:chExt cx="0" cy="0"/>
+        </a:xfrm>
+      </p:grpSpPr>
+      <p:sp>
+        <p:nvSpPr>
+          <p:cNvPr id="4" name="Title 3"/>
+          <p:cNvSpPr>
+            <a:spLocks noGrp="1"/>
+          </p:cNvSpPr>
+          <p:nvPr>
+            <p:ph type="ctrTitle"/>
+          </p:nvPr>
+        </p:nvSpPr>
+        <p:spPr/>
+        <p:txBody>
+          <a:bodyPr>
+            <a:normAutofit/>
+          </a:bodyPr>
+          <a:lstStyle/>
+          <a:p>
+            <a:pPr algn="ctr"/>
+            <a:r>
+              <a:rPr lang="zh-CN" altLang="en-US" sz="4800" dirty="0">
+                <a:latin typeface="华文隶书" panose="02010800040101010101" pitchFamily="2" charset="-122"/>
+                <a:ea typeface="华文隶书" panose="02010800040101010101" pitchFamily="2" charset="-122"/>
+              </a:rPr>
+              <a:t>让</a:t>
+            </a:r>
+            <a:r>
+              <a:rPr lang="en-US" altLang="zh-CN" sz="4800" dirty="0">
+                <a:latin typeface="华文隶书" panose="02010800040101010101" pitchFamily="2" charset="-122"/>
+                <a:ea typeface="华文隶书" panose="02010800040101010101" pitchFamily="2" charset="-122"/>
+              </a:rPr>
+              <a:t>Python</a:t>
+            </a:r>
+            <a:r>
+              <a:rPr lang="zh-CN" altLang="en-US" sz="4800" dirty="0">
+                <a:latin typeface="华文隶书" panose="02010800040101010101" pitchFamily="2" charset="-122"/>
+                <a:ea typeface="华文隶书" panose="02010800040101010101" pitchFamily="2" charset="-122"/>
+              </a:rPr>
+              <a:t>遇上</a:t>
+            </a:r>
+            <a:r>
+              <a:rPr lang="en-US" altLang="zh-CN" sz="4800" dirty="0">
+                <a:latin typeface="华文隶书" panose="02010800040101010101" pitchFamily="2" charset="-122"/>
+                <a:ea typeface="华文隶书" panose="02010800040101010101" pitchFamily="2" charset="-122"/>
+              </a:rPr>
+              <a:t>Office</a:t>
+            </a:r>
+            <a:br>
+              <a:rPr lang="en-US" altLang="zh-CN" sz="4800" dirty="0">
+                <a:latin typeface="华文隶书" panose="02010800040101010101" pitchFamily="2" charset="-122"/>
+                <a:ea typeface="华文隶书" panose="02010800040101010101" pitchFamily="2" charset="-122"/>
+              </a:rPr>
+            </a:br>
+            <a:br>
+              <a:rPr lang="en-US" altLang="zh-CN" sz="4800" dirty="0">
+                <a:latin typeface="华文隶书" panose="02010800040101010101" pitchFamily="2" charset="-122"/>
+                <a:ea typeface="华文隶书" panose="02010800040101010101" pitchFamily="2" charset="-122"/>
+              </a:rPr>
+            </a:br>
+            <a:r>
+              <a:rPr lang="en-US" altLang="zh-CN" sz="4800" dirty="0">
+                <a:latin typeface="华文隶书" panose="02010800040101010101" pitchFamily="2" charset="-122"/>
+                <a:ea typeface="华文隶书" panose="02010800040101010101" pitchFamily="2" charset="-122"/>
+              </a:rPr>
+              <a:t>(Python with Office)</a:t>
+            </a:r>
+            <a:endParaRPr lang="en-US" sz="4800" dirty="0">
+              <a:latin typeface="华文隶书" panose="02010800040101010101" pitchFamily="2" charset="-122"/>
+              <a:ea typeface="华文隶书" panose="02010800040101010101" pitchFamily="2" charset="-122"/>
+            </a:endParaRPr>
+          </a:p>
+        </p:txBody>
+      </p:sp>
+      <p:sp>
+        <p:nvSpPr>
+          <p:cNvPr id="3" name="Content Placeholder 2"/>
+          <p:cNvSpPr>
+            <a:spLocks noGrp="1"/>
+          </p:cNvSpPr>
+          <p:nvPr>
+            <p:ph type="subTitle" idx="1"/>
+          </p:nvPr>
+        </p:nvSpPr>
+        <p:spPr>
+          <a:xfrm>
+            <a:off x="1065212" y="3403600"/>
+            <a:ext cx="5029201" cy="2185640"/>
+          </a:xfrm>
+        </p:spPr>
+        <p:txBody>
+          <a:bodyPr>
+            <a:normAutofit lnSpcReduction="10000"/>
+          </a:bodyPr>
+          <a:lstStyle/>
+          <a:p>
+            <a:r>
+              <a:rPr lang="en-US" sz="2800" dirty="0">
+                <a:latin typeface="ADLaM Display" panose="020F0502020204030204" pitchFamily="2" charset="0"/>
+                <a:ea typeface="ADLaM Display" panose="020F0502020204030204" pitchFamily="2" charset="0"/>
+                <a:cs typeface="ADLaM Display" panose="020F0502020204030204" pitchFamily="2" charset="0"/>
+              </a:rPr>
+              <a:t>Chapter 2 Data Structure </a:t>
+            </a:r>
+          </a:p>
+          <a:p>
+            <a:r>
+              <a:rPr lang="en-US" sz="2800" dirty="0">
+                <a:latin typeface="ADLaM Display" panose="020F0502020204030204" pitchFamily="2" charset="0"/>
+                <a:ea typeface="ADLaM Display" panose="020F0502020204030204" pitchFamily="2" charset="0"/>
+                <a:cs typeface="ADLaM Display" panose="020F0502020204030204" pitchFamily="2" charset="0"/>
+              </a:rPr>
+              <a:t>2.2 </a:t>
+            </a:r>
+            <a:r>
+              <a:rPr lang="en-US" altLang="zh-CN" sz="2800" dirty="0">
+                <a:latin typeface="ADLaM Display" panose="020F0502020204030204" pitchFamily="2" charset="0"/>
+                <a:ea typeface="ADLaM Display" panose="020F0502020204030204" pitchFamily="2" charset="0"/>
+                <a:cs typeface="ADLaM Display" panose="020F0502020204030204" pitchFamily="2" charset="0"/>
+              </a:rPr>
+              <a:t>String Type</a:t>
+            </a:r>
+          </a:p>
+          <a:p>
+            <a:endParaRPr lang="en-US" sz="2800" dirty="0">
+              <a:latin typeface="ADLaM Display" panose="020F0502020204030204" pitchFamily="2" charset="0"/>
+              <a:ea typeface="ADLaM Display" panose="020F0502020204030204" pitchFamily="2" charset="0"/>
+              <a:cs typeface="ADLaM Display" panose="020F0502020204030204" pitchFamily="2" charset="0"/>
+            </a:endParaRPr>
+          </a:p>
+          <a:p>
+            <a:r>
+              <a:rPr lang="zh-CN" altLang="en-US" sz="2800" dirty="0">
+                <a:latin typeface="ADLaM Display" panose="020F0502020204030204" pitchFamily="2" charset="0"/>
+                <a:ea typeface="ADLaM Display" panose="020F0502020204030204" pitchFamily="2" charset="0"/>
+                <a:cs typeface="ADLaM Display" panose="020F0502020204030204" pitchFamily="2" charset="0"/>
+              </a:rPr>
+              <a:t>第二章 数据结构</a:t>
+            </a:r>
+            <a:endParaRPr lang="en-US" altLang="zh-CN" sz="2800" dirty="0">
+              <a:latin typeface="ADLaM Display" panose="020F0502020204030204" pitchFamily="2" charset="0"/>
+              <a:ea typeface="ADLaM Display" panose="020F0502020204030204" pitchFamily="2" charset="0"/>
+              <a:cs typeface="ADLaM Display" panose="020F0502020204030204" pitchFamily="2" charset="0"/>
+            </a:endParaRPr>
+          </a:p>
+          <a:p>
+            <a:r>
+              <a:rPr lang="en-US" sz="2800" dirty="0">
+                <a:latin typeface="ADLaM Display" panose="020F0502020204030204" pitchFamily="2" charset="0"/>
+                <a:ea typeface="ADLaM Display" panose="020F0502020204030204" pitchFamily="2" charset="0"/>
+                <a:cs typeface="ADLaM Display" panose="020F0502020204030204" pitchFamily="2" charset="0"/>
+              </a:rPr>
+              <a:t>2.2 </a:t>
+            </a:r>
+            <a:r>
+              <a:rPr lang="zh-CN" altLang="en-US" sz="2800" dirty="0">
+                <a:latin typeface="ADLaM Display" panose="020F0502020204030204" pitchFamily="2" charset="0"/>
+                <a:ea typeface="ADLaM Display" panose="020F0502020204030204" pitchFamily="2" charset="0"/>
+                <a:cs typeface="ADLaM Display" panose="020F0502020204030204" pitchFamily="2" charset="0"/>
+              </a:rPr>
+              <a:t>字符串</a:t>
+            </a:r>
+            <a:endParaRPr lang="en-US" sz="2800" dirty="0">
+              <a:latin typeface="ADLaM Display" panose="020F0502020204030204" pitchFamily="2" charset="0"/>
+              <a:ea typeface="ADLaM Display" panose="020F0502020204030204" pitchFamily="2" charset="0"/>
+              <a:cs typeface="ADLaM Display" panose="020F0502020204030204" pitchFamily="2" charset="0"/>
+            </a:endParaRPr>
+          </a:p>
+          <a:p>
+            <a:endParaRPr lang="en-US" sz="2800" dirty="0">
+              <a:latin typeface="ADLaM Display" panose="020F0502020204030204" pitchFamily="2" charset="0"/>
+              <a:ea typeface="ADLaM Display" panose="020F0502020204030204" pitchFamily="2" charset="0"/>
+              <a:cs typeface="ADLaM Display" panose="020F0502020204030204" pitchFamily="2" charset="0"/>
+            </a:endParaRPr>
+          </a:p>
+        </p:txBody>
+      </p:sp>
+      <p:pic>
+        <p:nvPicPr>
+          <p:cNvPr id="5" name="Picture 4">
+            <a:extLst>
+              <a:ext uri="{FF2B5EF4-FFF2-40B4-BE49-F238E27FC236}">
+                <a16:creationId xmlns:a16="http://schemas.microsoft.com/office/drawing/2014/main" id="{4AD8B85C-B359-195F-B78C-C879AB7840B1}"/>
+              </a:ext>
+            </a:extLst>
+          </p:cNvPr>
+          <p:cNvPicPr>
+            <a:picLocks noChangeAspect="1"/>
+          </p:cNvPicPr>
+          <p:nvPr/>
+        </p:nvPicPr>
+        <p:blipFill>
+          <a:blip r:embed="rId3"/>
+          <a:stretch>
+            <a:fillRect/>
+          </a:stretch>
+        </p:blipFill>
+        <p:spPr>
+          <a:xfrm>
+            <a:off x="57601" y="1189856"/>
+            <a:ext cx="1068259" cy="1556792"/>
+          </a:xfrm>
+          <a:prstGeom prst="rect">
+            <a:avLst/>
+          </a:prstGeom>
+          <a:ln>
+            <a:noFill/>
+          </a:ln>
+          <a:effectLst>
+            <a:outerShdw blurRad="292100" dist="139700" dir="2700000" algn="tl" rotWithShape="0">
+              <a:srgbClr val="333333">
+                <a:alpha val="65000"/>
+              </a:srgbClr>
+            </a:outerShdw>
+          </a:effectLst>
+        </p:spPr>
+      </p:pic>
+      <p:sp>
+        <p:nvSpPr>
+          <p:cNvPr id="2" name="TextBox 1">
+            <a:extLst>
+              <a:ext uri="{FF2B5EF4-FFF2-40B4-BE49-F238E27FC236}">
+                <a16:creationId xmlns:a16="http://schemas.microsoft.com/office/drawing/2014/main" id="{CAB2C784-DE74-68FC-7A84-3E6C5D164315}"/>
+              </a:ext>
+            </a:extLst>
+          </p:cNvPr>
+          <p:cNvSpPr txBox="1"/>
+          <p:nvPr/>
+        </p:nvSpPr>
+        <p:spPr>
+          <a:xfrm>
+            <a:off x="405780" y="6139934"/>
+            <a:ext cx="7951216" cy="523220"/>
+          </a:xfrm>
+          <a:prstGeom prst="rect">
+            <a:avLst/>
+          </a:prstGeom>
+          <a:solidFill>
+            <a:schemeClr val="bg1">
+              <a:lumMod val="95000"/>
+            </a:schemeClr>
+          </a:solidFill>
+          <a:ln>
+            <a:solidFill>
+              <a:schemeClr val="bg2"/>
+            </a:solidFill>
+          </a:ln>
+        </p:spPr>
+        <p:txBody>
+          <a:bodyPr wrap="none" rtlCol="0" anchor="ctr" anchorCtr="1">
+            <a:spAutoFit/>
+          </a:bodyPr>
+          <a:lstStyle/>
+          <a:p>
+            <a:r>
+              <a:rPr lang="en-US" sz="2800" dirty="0">
+                <a:hlinkClick r:id="rId4"/>
+              </a:rPr>
+              <a:t>https://github.com/yasenstar/python_with_office</a:t>
+            </a:r>
+            <a:endParaRPr lang="en-US" sz="2800" dirty="0"/>
+          </a:p>
+        </p:txBody>
+      </p:sp>
+      <p:pic>
+        <p:nvPicPr>
+          <p:cNvPr id="7" name="Picture 6">
+            <a:extLst>
+              <a:ext uri="{FF2B5EF4-FFF2-40B4-BE49-F238E27FC236}">
+                <a16:creationId xmlns:a16="http://schemas.microsoft.com/office/drawing/2014/main" id="{3B6787F6-2691-8FF0-DD76-9A26EDBF1ECE}"/>
+              </a:ext>
+            </a:extLst>
+          </p:cNvPr>
+          <p:cNvPicPr>
+            <a:picLocks noChangeAspect="1"/>
+          </p:cNvPicPr>
+          <p:nvPr/>
+        </p:nvPicPr>
+        <p:blipFill>
+          <a:blip r:embed="rId5"/>
+          <a:stretch>
+            <a:fillRect/>
+          </a:stretch>
+        </p:blipFill>
+        <p:spPr>
+          <a:xfrm>
+            <a:off x="6238427" y="404664"/>
+            <a:ext cx="5439555" cy="5184576"/>
+          </a:xfrm>
+          <a:prstGeom prst="rect">
+            <a:avLst/>
+          </a:prstGeom>
+          <a:ln>
+            <a:noFill/>
+          </a:ln>
+          <a:effectLst>
+            <a:outerShdw blurRad="292100" dist="139700" dir="2700000" algn="tl" rotWithShape="0">
+              <a:srgbClr val="333333">
+                <a:alpha val="65000"/>
+              </a:srgbClr>
+            </a:outerShdw>
+          </a:effectLst>
+        </p:spPr>
+      </p:pic>
+    </p:spTree>
+    <p:extLst>
+      <p:ext uri="{BB962C8B-B14F-4D97-AF65-F5344CB8AC3E}">
+        <p14:creationId xmlns:p14="http://schemas.microsoft.com/office/powerpoint/2010/main" val="4068248247"/>
       </p:ext>
     </p:extLst>
   </p:cSld>

</xml_diff>

<commit_message>
add 004 and prepare 005
</commit_message>
<xml_diff>
--- a/Video_Covers.pptx
+++ b/Video_Covers.pptx
@@ -5,16 +5,17 @@
     <p:sldMasterId id="2147483660" r:id="rId1"/>
   </p:sldMasterIdLst>
   <p:notesMasterIdLst>
-    <p:notesMasterId r:id="rId6"/>
+    <p:notesMasterId r:id="rId7"/>
   </p:notesMasterIdLst>
   <p:handoutMasterIdLst>
-    <p:handoutMasterId r:id="rId7"/>
+    <p:handoutMasterId r:id="rId8"/>
   </p:handoutMasterIdLst>
   <p:sldIdLst>
     <p:sldId id="257" r:id="rId2"/>
     <p:sldId id="258" r:id="rId3"/>
     <p:sldId id="259" r:id="rId4"/>
     <p:sldId id="260" r:id="rId5"/>
+    <p:sldId id="261" r:id="rId6"/>
   </p:sldIdLst>
   <p:sldSz cx="12188825" cy="6858000"/>
   <p:notesSz cx="6858000" cy="9144000"/>
@@ -1031,6 +1032,90 @@
     <p:extLst>
       <p:ext uri="{BB962C8B-B14F-4D97-AF65-F5344CB8AC3E}">
         <p14:creationId xmlns:p14="http://schemas.microsoft.com/office/powerpoint/2010/main" val="150836077"/>
+      </p:ext>
+    </p:extLst>
+  </p:cSld>
+  <p:clrMapOvr>
+    <a:masterClrMapping/>
+  </p:clrMapOvr>
+</p:notes>
+</file>
+
+<file path=ppt/notesSlides/notesSlide5.xml><?xml version="1.0" encoding="utf-8"?>
+<p:notes xmlns:a="http://schemas.openxmlformats.org/drawingml/2006/main" xmlns:r="http://schemas.openxmlformats.org/officeDocument/2006/relationships" xmlns:p="http://schemas.openxmlformats.org/presentationml/2006/main">
+  <p:cSld>
+    <p:spTree>
+      <p:nvGrpSpPr>
+        <p:cNvPr id="1" name=""/>
+        <p:cNvGrpSpPr/>
+        <p:nvPr/>
+      </p:nvGrpSpPr>
+      <p:grpSpPr>
+        <a:xfrm>
+          <a:off x="0" y="0"/>
+          <a:ext cx="0" cy="0"/>
+          <a:chOff x="0" y="0"/>
+          <a:chExt cx="0" cy="0"/>
+        </a:xfrm>
+      </p:grpSpPr>
+      <p:sp>
+        <p:nvSpPr>
+          <p:cNvPr id="2" name="Slide Image Placeholder 1"/>
+          <p:cNvSpPr>
+            <a:spLocks noGrp="1" noRot="1" noChangeAspect="1"/>
+          </p:cNvSpPr>
+          <p:nvPr>
+            <p:ph type="sldImg"/>
+          </p:nvPr>
+        </p:nvSpPr>
+        <p:spPr/>
+      </p:sp>
+      <p:sp>
+        <p:nvSpPr>
+          <p:cNvPr id="3" name="Notes Placeholder 2"/>
+          <p:cNvSpPr>
+            <a:spLocks noGrp="1"/>
+          </p:cNvSpPr>
+          <p:nvPr>
+            <p:ph type="body" idx="1"/>
+          </p:nvPr>
+        </p:nvSpPr>
+        <p:spPr/>
+        <p:txBody>
+          <a:bodyPr/>
+          <a:lstStyle/>
+          <a:p>
+            <a:endParaRPr lang="en-US" dirty="0"/>
+          </a:p>
+        </p:txBody>
+      </p:sp>
+      <p:sp>
+        <p:nvSpPr>
+          <p:cNvPr id="4" name="Slide Number Placeholder 3"/>
+          <p:cNvSpPr>
+            <a:spLocks noGrp="1"/>
+          </p:cNvSpPr>
+          <p:nvPr>
+            <p:ph type="sldNum" sz="quarter" idx="10"/>
+          </p:nvPr>
+        </p:nvSpPr>
+        <p:spPr/>
+        <p:txBody>
+          <a:bodyPr/>
+          <a:lstStyle/>
+          <a:p>
+            <a:fld id="{6BB98AFB-CB0D-4DFE-87B9-B4B0D0DE73CD}" type="slidenum">
+              <a:rPr lang="en-US" smtClean="0"/>
+              <a:t>5</a:t>
+            </a:fld>
+            <a:endParaRPr lang="en-US" dirty="0"/>
+          </a:p>
+        </p:txBody>
+      </p:sp>
+    </p:spTree>
+    <p:extLst>
+      <p:ext uri="{BB962C8B-B14F-4D97-AF65-F5344CB8AC3E}">
+        <p14:creationId xmlns:p14="http://schemas.microsoft.com/office/powerpoint/2010/main" val="2930636943"/>
       </p:ext>
     </p:extLst>
   </p:cSld>
@@ -5573,6 +5658,350 @@
     <p:extLst>
       <p:ext uri="{BB962C8B-B14F-4D97-AF65-F5344CB8AC3E}">
         <p14:creationId xmlns:p14="http://schemas.microsoft.com/office/powerpoint/2010/main" val="2678052507"/>
+      </p:ext>
+    </p:extLst>
+  </p:cSld>
+  <p:clrMapOvr>
+    <a:masterClrMapping/>
+  </p:clrMapOvr>
+  <mc:AlternateContent xmlns:mc="http://schemas.openxmlformats.org/markup-compatibility/2006" xmlns:p14="http://schemas.microsoft.com/office/powerpoint/2010/main">
+    <mc:Choice Requires="p14">
+      <p:transition spd="med" p14:dur="700">
+        <p:fade/>
+      </p:transition>
+    </mc:Choice>
+    <mc:Fallback xmlns="">
+      <p:transition spd="med">
+        <p:fade/>
+      </p:transition>
+    </mc:Fallback>
+  </mc:AlternateContent>
+</p:sld>
+</file>
+
+<file path=ppt/slides/slide5.xml><?xml version="1.0" encoding="utf-8"?>
+<p:sld xmlns:a="http://schemas.openxmlformats.org/drawingml/2006/main" xmlns:r="http://schemas.openxmlformats.org/officeDocument/2006/relationships" xmlns:p="http://schemas.openxmlformats.org/presentationml/2006/main">
+  <p:cSld>
+    <p:spTree>
+      <p:nvGrpSpPr>
+        <p:cNvPr id="1" name=""/>
+        <p:cNvGrpSpPr/>
+        <p:nvPr/>
+      </p:nvGrpSpPr>
+      <p:grpSpPr>
+        <a:xfrm>
+          <a:off x="0" y="0"/>
+          <a:ext cx="0" cy="0"/>
+          <a:chOff x="0" y="0"/>
+          <a:chExt cx="0" cy="0"/>
+        </a:xfrm>
+      </p:grpSpPr>
+      <p:sp>
+        <p:nvSpPr>
+          <p:cNvPr id="4" name="Title 3"/>
+          <p:cNvSpPr>
+            <a:spLocks noGrp="1"/>
+          </p:cNvSpPr>
+          <p:nvPr>
+            <p:ph type="ctrTitle"/>
+          </p:nvPr>
+        </p:nvSpPr>
+        <p:spPr/>
+        <p:txBody>
+          <a:bodyPr>
+            <a:normAutofit/>
+          </a:bodyPr>
+          <a:lstStyle/>
+          <a:p>
+            <a:pPr algn="ctr"/>
+            <a:r>
+              <a:rPr lang="zh-CN" altLang="en-US" sz="4800" dirty="0">
+                <a:latin typeface="华文隶书" panose="02010800040101010101" pitchFamily="2" charset="-122"/>
+                <a:ea typeface="华文隶书" panose="02010800040101010101" pitchFamily="2" charset="-122"/>
+              </a:rPr>
+              <a:t>让</a:t>
+            </a:r>
+            <a:r>
+              <a:rPr lang="en-US" altLang="zh-CN" sz="4800" dirty="0">
+                <a:latin typeface="华文隶书" panose="02010800040101010101" pitchFamily="2" charset="-122"/>
+                <a:ea typeface="华文隶书" panose="02010800040101010101" pitchFamily="2" charset="-122"/>
+              </a:rPr>
+              <a:t>Python</a:t>
+            </a:r>
+            <a:r>
+              <a:rPr lang="zh-CN" altLang="en-US" sz="4800" dirty="0">
+                <a:latin typeface="华文隶书" panose="02010800040101010101" pitchFamily="2" charset="-122"/>
+                <a:ea typeface="华文隶书" panose="02010800040101010101" pitchFamily="2" charset="-122"/>
+              </a:rPr>
+              <a:t>遇上</a:t>
+            </a:r>
+            <a:r>
+              <a:rPr lang="en-US" altLang="zh-CN" sz="4800" dirty="0">
+                <a:latin typeface="华文隶书" panose="02010800040101010101" pitchFamily="2" charset="-122"/>
+                <a:ea typeface="华文隶书" panose="02010800040101010101" pitchFamily="2" charset="-122"/>
+              </a:rPr>
+              <a:t>Office</a:t>
+            </a:r>
+            <a:br>
+              <a:rPr lang="en-US" altLang="zh-CN" sz="4800" dirty="0">
+                <a:latin typeface="华文隶书" panose="02010800040101010101" pitchFamily="2" charset="-122"/>
+                <a:ea typeface="华文隶书" panose="02010800040101010101" pitchFamily="2" charset="-122"/>
+              </a:rPr>
+            </a:br>
+            <a:br>
+              <a:rPr lang="en-US" altLang="zh-CN" sz="4800" dirty="0">
+                <a:latin typeface="华文隶书" panose="02010800040101010101" pitchFamily="2" charset="-122"/>
+                <a:ea typeface="华文隶书" panose="02010800040101010101" pitchFamily="2" charset="-122"/>
+              </a:rPr>
+            </a:br>
+            <a:r>
+              <a:rPr lang="en-US" altLang="zh-CN" sz="4800" dirty="0">
+                <a:latin typeface="华文隶书" panose="02010800040101010101" pitchFamily="2" charset="-122"/>
+                <a:ea typeface="华文隶书" panose="02010800040101010101" pitchFamily="2" charset="-122"/>
+              </a:rPr>
+              <a:t>(Python with Office)</a:t>
+            </a:r>
+            <a:endParaRPr lang="en-US" sz="4800" dirty="0">
+              <a:latin typeface="华文隶书" panose="02010800040101010101" pitchFamily="2" charset="-122"/>
+              <a:ea typeface="华文隶书" panose="02010800040101010101" pitchFamily="2" charset="-122"/>
+            </a:endParaRPr>
+          </a:p>
+        </p:txBody>
+      </p:sp>
+      <p:sp>
+        <p:nvSpPr>
+          <p:cNvPr id="3" name="Content Placeholder 2"/>
+          <p:cNvSpPr>
+            <a:spLocks noGrp="1"/>
+          </p:cNvSpPr>
+          <p:nvPr>
+            <p:ph type="subTitle" idx="1"/>
+          </p:nvPr>
+        </p:nvSpPr>
+        <p:spPr>
+          <a:xfrm>
+            <a:off x="1065212" y="3403600"/>
+            <a:ext cx="5029201" cy="2185640"/>
+          </a:xfrm>
+        </p:spPr>
+        <p:txBody>
+          <a:bodyPr>
+            <a:normAutofit lnSpcReduction="10000"/>
+          </a:bodyPr>
+          <a:lstStyle/>
+          <a:p>
+            <a:r>
+              <a:rPr lang="en-US" sz="2800" dirty="0">
+                <a:latin typeface="ADLaM Display" panose="020F0502020204030204" pitchFamily="2" charset="0"/>
+                <a:ea typeface="ADLaM Display" panose="020F0502020204030204" pitchFamily="2" charset="0"/>
+                <a:cs typeface="ADLaM Display" panose="020F0502020204030204" pitchFamily="2" charset="0"/>
+              </a:rPr>
+              <a:t>Chapter 2 Data Structure </a:t>
+            </a:r>
+          </a:p>
+          <a:p>
+            <a:r>
+              <a:rPr lang="en-US" sz="2800" dirty="0">
+                <a:latin typeface="ADLaM Display" panose="020F0502020204030204" pitchFamily="2" charset="0"/>
+                <a:ea typeface="ADLaM Display" panose="020F0502020204030204" pitchFamily="2" charset="0"/>
+                <a:cs typeface="ADLaM Display" panose="020F0502020204030204" pitchFamily="2" charset="0"/>
+              </a:rPr>
+              <a:t>2.4 </a:t>
+            </a:r>
+            <a:r>
+              <a:rPr lang="en-US" altLang="zh-CN" sz="2800" dirty="0">
+                <a:latin typeface="ADLaM Display" panose="020F0502020204030204" pitchFamily="2" charset="0"/>
+                <a:ea typeface="ADLaM Display" panose="020F0502020204030204" pitchFamily="2" charset="0"/>
+                <a:cs typeface="ADLaM Display" panose="020F0502020204030204" pitchFamily="2" charset="0"/>
+              </a:rPr>
+              <a:t>Tuple</a:t>
+            </a:r>
+          </a:p>
+          <a:p>
+            <a:endParaRPr lang="en-US" sz="2800" dirty="0">
+              <a:latin typeface="ADLaM Display" panose="020F0502020204030204" pitchFamily="2" charset="0"/>
+              <a:ea typeface="ADLaM Display" panose="020F0502020204030204" pitchFamily="2" charset="0"/>
+              <a:cs typeface="ADLaM Display" panose="020F0502020204030204" pitchFamily="2" charset="0"/>
+            </a:endParaRPr>
+          </a:p>
+          <a:p>
+            <a:r>
+              <a:rPr lang="zh-CN" altLang="en-US" sz="2800" dirty="0">
+                <a:latin typeface="ADLaM Display" panose="020F0502020204030204" pitchFamily="2" charset="0"/>
+                <a:ea typeface="ADLaM Display" panose="020F0502020204030204" pitchFamily="2" charset="0"/>
+                <a:cs typeface="ADLaM Display" panose="020F0502020204030204" pitchFamily="2" charset="0"/>
+              </a:rPr>
+              <a:t>第二章 数据结构</a:t>
+            </a:r>
+            <a:endParaRPr lang="en-US" altLang="zh-CN" sz="2800" dirty="0">
+              <a:latin typeface="ADLaM Display" panose="020F0502020204030204" pitchFamily="2" charset="0"/>
+              <a:ea typeface="ADLaM Display" panose="020F0502020204030204" pitchFamily="2" charset="0"/>
+              <a:cs typeface="ADLaM Display" panose="020F0502020204030204" pitchFamily="2" charset="0"/>
+            </a:endParaRPr>
+          </a:p>
+          <a:p>
+            <a:r>
+              <a:rPr lang="en-US" sz="2800" dirty="0">
+                <a:latin typeface="ADLaM Display" panose="020F0502020204030204" pitchFamily="2" charset="0"/>
+                <a:ea typeface="ADLaM Display" panose="020F0502020204030204" pitchFamily="2" charset="0"/>
+                <a:cs typeface="ADLaM Display" panose="020F0502020204030204" pitchFamily="2" charset="0"/>
+              </a:rPr>
+              <a:t>2.4 </a:t>
+            </a:r>
+            <a:r>
+              <a:rPr lang="zh-CN" altLang="en-US" sz="2800" dirty="0">
+                <a:latin typeface="ADLaM Display" panose="020F0502020204030204" pitchFamily="2" charset="0"/>
+                <a:ea typeface="ADLaM Display" panose="020F0502020204030204" pitchFamily="2" charset="0"/>
+                <a:cs typeface="ADLaM Display" panose="020F0502020204030204" pitchFamily="2" charset="0"/>
+              </a:rPr>
+              <a:t>元组</a:t>
+            </a:r>
+            <a:endParaRPr lang="en-US" sz="2800" dirty="0">
+              <a:latin typeface="ADLaM Display" panose="020F0502020204030204" pitchFamily="2" charset="0"/>
+              <a:ea typeface="ADLaM Display" panose="020F0502020204030204" pitchFamily="2" charset="0"/>
+              <a:cs typeface="ADLaM Display" panose="020F0502020204030204" pitchFamily="2" charset="0"/>
+            </a:endParaRPr>
+          </a:p>
+          <a:p>
+            <a:endParaRPr lang="en-US" sz="2800" dirty="0">
+              <a:latin typeface="ADLaM Display" panose="020F0502020204030204" pitchFamily="2" charset="0"/>
+              <a:ea typeface="ADLaM Display" panose="020F0502020204030204" pitchFamily="2" charset="0"/>
+              <a:cs typeface="ADLaM Display" panose="020F0502020204030204" pitchFamily="2" charset="0"/>
+            </a:endParaRPr>
+          </a:p>
+        </p:txBody>
+      </p:sp>
+      <p:pic>
+        <p:nvPicPr>
+          <p:cNvPr id="5" name="Picture 4">
+            <a:extLst>
+              <a:ext uri="{FF2B5EF4-FFF2-40B4-BE49-F238E27FC236}">
+                <a16:creationId xmlns:a16="http://schemas.microsoft.com/office/drawing/2014/main" id="{4AD8B85C-B359-195F-B78C-C879AB7840B1}"/>
+              </a:ext>
+            </a:extLst>
+          </p:cNvPr>
+          <p:cNvPicPr>
+            <a:picLocks noChangeAspect="1"/>
+          </p:cNvPicPr>
+          <p:nvPr/>
+        </p:nvPicPr>
+        <p:blipFill>
+          <a:blip r:embed="rId3"/>
+          <a:stretch>
+            <a:fillRect/>
+          </a:stretch>
+        </p:blipFill>
+        <p:spPr>
+          <a:xfrm>
+            <a:off x="57601" y="1189856"/>
+            <a:ext cx="1068259" cy="1556792"/>
+          </a:xfrm>
+          <a:prstGeom prst="rect">
+            <a:avLst/>
+          </a:prstGeom>
+          <a:ln>
+            <a:noFill/>
+          </a:ln>
+          <a:effectLst>
+            <a:outerShdw blurRad="292100" dist="139700" dir="2700000" algn="tl" rotWithShape="0">
+              <a:srgbClr val="333333">
+                <a:alpha val="65000"/>
+              </a:srgbClr>
+            </a:outerShdw>
+          </a:effectLst>
+        </p:spPr>
+      </p:pic>
+      <p:sp>
+        <p:nvSpPr>
+          <p:cNvPr id="2" name="TextBox 1">
+            <a:extLst>
+              <a:ext uri="{FF2B5EF4-FFF2-40B4-BE49-F238E27FC236}">
+                <a16:creationId xmlns:a16="http://schemas.microsoft.com/office/drawing/2014/main" id="{CAB2C784-DE74-68FC-7A84-3E6C5D164315}"/>
+              </a:ext>
+            </a:extLst>
+          </p:cNvPr>
+          <p:cNvSpPr txBox="1"/>
+          <p:nvPr/>
+        </p:nvSpPr>
+        <p:spPr>
+          <a:xfrm>
+            <a:off x="405780" y="6139934"/>
+            <a:ext cx="7951216" cy="523220"/>
+          </a:xfrm>
+          <a:prstGeom prst="rect">
+            <a:avLst/>
+          </a:prstGeom>
+          <a:solidFill>
+            <a:schemeClr val="bg1">
+              <a:lumMod val="95000"/>
+            </a:schemeClr>
+          </a:solidFill>
+          <a:ln>
+            <a:solidFill>
+              <a:schemeClr val="bg2"/>
+            </a:solidFill>
+          </a:ln>
+        </p:spPr>
+        <p:txBody>
+          <a:bodyPr wrap="none" rtlCol="0" anchor="ctr" anchorCtr="1">
+            <a:spAutoFit/>
+          </a:bodyPr>
+          <a:lstStyle/>
+          <a:p>
+            <a:r>
+              <a:rPr lang="en-US" sz="2800" dirty="0">
+                <a:hlinkClick r:id="rId4"/>
+              </a:rPr>
+              <a:t>https://github.com/yasenstar/python_with_office</a:t>
+            </a:r>
+            <a:endParaRPr lang="en-US" sz="2800" dirty="0"/>
+          </a:p>
+        </p:txBody>
+      </p:sp>
+      <p:pic>
+        <p:nvPicPr>
+          <p:cNvPr id="7" name="Picture 6">
+            <a:extLst>
+              <a:ext uri="{FF2B5EF4-FFF2-40B4-BE49-F238E27FC236}">
+                <a16:creationId xmlns:a16="http://schemas.microsoft.com/office/drawing/2014/main" id="{EFA378EA-5F4D-2102-F243-0CBD94FCDEF6}"/>
+              </a:ext>
+            </a:extLst>
+          </p:cNvPr>
+          <p:cNvPicPr>
+            <a:picLocks noChangeAspect="1"/>
+          </p:cNvPicPr>
+          <p:nvPr/>
+        </p:nvPicPr>
+        <p:blipFill>
+          <a:blip r:embed="rId5"/>
+          <a:stretch>
+            <a:fillRect/>
+          </a:stretch>
+        </p:blipFill>
+        <p:spPr>
+          <a:xfrm>
+            <a:off x="6166420" y="1161365"/>
+            <a:ext cx="5876726" cy="4774840"/>
+          </a:xfrm>
+          <a:prstGeom prst="rect">
+            <a:avLst/>
+          </a:prstGeom>
+          <a:ln>
+            <a:noFill/>
+          </a:ln>
+          <a:effectLst>
+            <a:outerShdw blurRad="292100" dist="139700" dir="2700000" algn="tl" rotWithShape="0">
+              <a:srgbClr val="333333">
+                <a:alpha val="65000"/>
+              </a:srgbClr>
+            </a:outerShdw>
+          </a:effectLst>
+        </p:spPr>
+      </p:pic>
+    </p:spTree>
+    <p:extLst>
+      <p:ext uri="{BB962C8B-B14F-4D97-AF65-F5344CB8AC3E}">
+        <p14:creationId xmlns:p14="http://schemas.microsoft.com/office/powerpoint/2010/main" val="967501008"/>
       </p:ext>
     </p:extLst>
   </p:cSld>

</xml_diff>

<commit_message>
update 017 cover image
</commit_message>
<xml_diff>
--- a/Video_Covers.pptx
+++ b/Video_Covers.pptx
@@ -290,7 +290,7 @@
           <a:p>
             <a:fld id="{24CE221E-83ED-4F6C-BA5F-3F9E6FDB6953}" type="datetimeFigureOut">
               <a:rPr lang="en-US"/>
-              <a:t>10/25/2023</a:t>
+              <a:t>11/12/2023</a:t>
             </a:fld>
             <a:endParaRPr dirty="0"/>
           </a:p>
@@ -455,7 +455,7 @@
           <a:p>
             <a:fld id="{97853E5F-CE67-483C-A264-F17AC70E9CA2}" type="datetimeFigureOut">
               <a:rPr lang="en-US"/>
-              <a:t>10/24/2023</a:t>
+              <a:t>11/12/2023</a:t>
             </a:fld>
             <a:endParaRPr dirty="0"/>
           </a:p>
@@ -2391,7 +2391,7 @@
           <a:p>
             <a:fld id="{3E0FA9E5-6744-4841-888F-9E7CC0C2B7EC}" type="datetimeFigureOut">
               <a:rPr lang="en-US" smtClean="0"/>
-              <a:t>10/24/2023</a:t>
+              <a:t>11/12/2023</a:t>
             </a:fld>
             <a:endParaRPr lang="en-US" dirty="0"/>
           </a:p>
@@ -2581,7 +2581,7 @@
           <a:p>
             <a:fld id="{3E0FA9E5-6744-4841-888F-9E7CC0C2B7EC}" type="datetimeFigureOut">
               <a:rPr lang="en-US" smtClean="0"/>
-              <a:t>10/24/2023</a:t>
+              <a:t>11/12/2023</a:t>
             </a:fld>
             <a:endParaRPr lang="en-US" dirty="0"/>
           </a:p>
@@ -2776,7 +2776,7 @@
           <a:p>
             <a:fld id="{3E0FA9E5-6744-4841-888F-9E7CC0C2B7EC}" type="datetimeFigureOut">
               <a:rPr lang="en-US" smtClean="0"/>
-              <a:t>10/24/2023</a:t>
+              <a:t>11/12/2023</a:t>
             </a:fld>
             <a:endParaRPr lang="en-US" dirty="0"/>
           </a:p>
@@ -2961,7 +2961,7 @@
           <a:p>
             <a:fld id="{3E0FA9E5-6744-4841-888F-9E7CC0C2B7EC}" type="datetimeFigureOut">
               <a:rPr lang="en-US" smtClean="0"/>
-              <a:t>10/24/2023</a:t>
+              <a:t>11/12/2023</a:t>
             </a:fld>
             <a:endParaRPr lang="en-US" dirty="0"/>
           </a:p>
@@ -3230,7 +3230,7 @@
           <a:p>
             <a:fld id="{3E0FA9E5-6744-4841-888F-9E7CC0C2B7EC}" type="datetimeFigureOut">
               <a:rPr lang="en-US" smtClean="0"/>
-              <a:t>10/24/2023</a:t>
+              <a:t>11/12/2023</a:t>
             </a:fld>
             <a:endParaRPr lang="en-US" dirty="0"/>
           </a:p>
@@ -3537,7 +3537,7 @@
           <a:p>
             <a:fld id="{3E0FA9E5-6744-4841-888F-9E7CC0C2B7EC}" type="datetimeFigureOut">
               <a:rPr lang="en-US" smtClean="0"/>
-              <a:t>10/24/2023</a:t>
+              <a:t>11/12/2023</a:t>
             </a:fld>
             <a:endParaRPr lang="en-US" dirty="0"/>
           </a:p>
@@ -3993,7 +3993,7 @@
           <a:p>
             <a:fld id="{3E0FA9E5-6744-4841-888F-9E7CC0C2B7EC}" type="datetimeFigureOut">
               <a:rPr lang="en-US" smtClean="0"/>
-              <a:t>10/24/2023</a:t>
+              <a:t>11/12/2023</a:t>
             </a:fld>
             <a:endParaRPr lang="en-US" dirty="0"/>
           </a:p>
@@ -4126,7 +4126,7 @@
           <a:p>
             <a:fld id="{3E0FA9E5-6744-4841-888F-9E7CC0C2B7EC}" type="datetimeFigureOut">
               <a:rPr lang="en-US" smtClean="0"/>
-              <a:t>10/24/2023</a:t>
+              <a:t>11/12/2023</a:t>
             </a:fld>
             <a:endParaRPr lang="en-US" dirty="0"/>
           </a:p>
@@ -4236,7 +4236,7 @@
           <a:p>
             <a:fld id="{3E0FA9E5-6744-4841-888F-9E7CC0C2B7EC}" type="datetimeFigureOut">
               <a:rPr lang="en-US" smtClean="0"/>
-              <a:t>10/24/2023</a:t>
+              <a:t>11/12/2023</a:t>
             </a:fld>
             <a:endParaRPr lang="en-US" dirty="0"/>
           </a:p>
@@ -4547,7 +4547,7 @@
           <a:p>
             <a:fld id="{3E0FA9E5-6744-4841-888F-9E7CC0C2B7EC}" type="datetimeFigureOut">
               <a:rPr lang="en-US" smtClean="0"/>
-              <a:t>10/24/2023</a:t>
+              <a:t>11/12/2023</a:t>
             </a:fld>
             <a:endParaRPr lang="en-US" dirty="0"/>
           </a:p>
@@ -5024,7 +5024,7 @@
             <a:fld id="{3E0FA9E5-6744-4841-888F-9E7CC0C2B7EC}" type="datetimeFigureOut">
               <a:rPr lang="en-US" smtClean="0"/>
               <a:pPr/>
-              <a:t>10/24/2023</a:t>
+              <a:t>11/12/2023</a:t>
             </a:fld>
             <a:endParaRPr lang="en-US" dirty="0"/>
           </a:p>
@@ -8530,15 +8530,8 @@
                 <a:ea typeface="ADLaM Display" panose="020F0502020204030204" pitchFamily="2" charset="0"/>
                 <a:cs typeface="ADLaM Display" panose="020F0502020204030204" pitchFamily="2" charset="0"/>
               </a:rPr>
-              <a:t>Chapter 4 Class and Object</a:t>
-            </a:r>
-          </a:p>
-          <a:p>
-            <a:endParaRPr lang="en-US" sz="2800" dirty="0">
-              <a:latin typeface="ADLaM Display" panose="020F0502020204030204" pitchFamily="2" charset="0"/>
-              <a:ea typeface="ADLaM Display" panose="020F0502020204030204" pitchFamily="2" charset="0"/>
-              <a:cs typeface="ADLaM Display" panose="020F0502020204030204" pitchFamily="2" charset="0"/>
-            </a:endParaRPr>
+              <a:t>Chapter 4 Class and Object (4.1)</a:t>
+            </a:r>
           </a:p>
           <a:p>
             <a:r>
@@ -8547,13 +8540,16 @@
                 <a:ea typeface="ADLaM Display" panose="020F0502020204030204" pitchFamily="2" charset="0"/>
                 <a:cs typeface="ADLaM Display" panose="020F0502020204030204" pitchFamily="2" charset="0"/>
               </a:rPr>
-              <a:t>第四章 类与对象</a:t>
-            </a:r>
-            <a:endParaRPr lang="en-US" altLang="zh-CN" sz="2800" dirty="0">
-              <a:latin typeface="ADLaM Display" panose="020F0502020204030204" pitchFamily="2" charset="0"/>
-              <a:ea typeface="ADLaM Display" panose="020F0502020204030204" pitchFamily="2" charset="0"/>
-              <a:cs typeface="ADLaM Display" panose="020F0502020204030204" pitchFamily="2" charset="0"/>
-            </a:endParaRPr>
+              <a:t>第四章 类与对象 </a:t>
+            </a:r>
+            <a:r>
+              <a:rPr lang="en-US" altLang="zh-CN" sz="2800" dirty="0">
+                <a:latin typeface="ADLaM Display" panose="020F0502020204030204" pitchFamily="2" charset="0"/>
+                <a:ea typeface="ADLaM Display" panose="020F0502020204030204" pitchFamily="2" charset="0"/>
+                <a:cs typeface="ADLaM Display" panose="020F0502020204030204" pitchFamily="2" charset="0"/>
+              </a:rPr>
+              <a:t>(4.1)</a:t>
+            </a:r>
           </a:p>
         </p:txBody>
       </p:sp>
@@ -8691,6 +8687,46 @@
           </a:p>
         </p:txBody>
       </p:sp>
+      <p:pic>
+        <p:nvPicPr>
+          <p:cNvPr id="7" name="Picture 6">
+            <a:extLst>
+              <a:ext uri="{FF2B5EF4-FFF2-40B4-BE49-F238E27FC236}">
+                <a16:creationId xmlns:a16="http://schemas.microsoft.com/office/drawing/2014/main" id="{257430BF-8FA6-2161-2501-1DE336A84C23}"/>
+              </a:ext>
+            </a:extLst>
+          </p:cNvPr>
+          <p:cNvPicPr>
+            <a:picLocks noChangeAspect="1"/>
+          </p:cNvPicPr>
+          <p:nvPr/>
+        </p:nvPicPr>
+        <p:blipFill>
+          <a:blip r:embed="rId6"/>
+          <a:stretch>
+            <a:fillRect/>
+          </a:stretch>
+        </p:blipFill>
+        <p:spPr>
+          <a:xfrm>
+            <a:off x="6166420" y="1189857"/>
+            <a:ext cx="5251971" cy="4271506"/>
+          </a:xfrm>
+          <a:prstGeom prst="rect">
+            <a:avLst/>
+          </a:prstGeom>
+          <a:ln>
+            <a:noFill/>
+          </a:ln>
+          <a:effectLst>
+            <a:outerShdw blurRad="292100" dist="139700" dir="2700000" algn="tl" rotWithShape="0">
+              <a:srgbClr val="333333">
+                <a:alpha val="65000"/>
+              </a:srgbClr>
+            </a:outerShdw>
+          </a:effectLst>
+        </p:spPr>
+      </p:pic>
     </p:spTree>
     <p:extLst>
       <p:ext uri="{BB962C8B-B14F-4D97-AF65-F5344CB8AC3E}">

</xml_diff>

<commit_message>
add 019 magic methods
</commit_message>
<xml_diff>
--- a/Video_Covers.pptx
+++ b/Video_Covers.pptx
@@ -5,10 +5,10 @@
     <p:sldMasterId id="2147483660" r:id="rId1"/>
   </p:sldMasterIdLst>
   <p:notesMasterIdLst>
-    <p:notesMasterId r:id="rId21"/>
+    <p:notesMasterId r:id="rId22"/>
   </p:notesMasterIdLst>
   <p:handoutMasterIdLst>
-    <p:handoutMasterId r:id="rId22"/>
+    <p:handoutMasterId r:id="rId23"/>
   </p:handoutMasterIdLst>
   <p:sldIdLst>
     <p:sldId id="257" r:id="rId2"/>
@@ -30,6 +30,7 @@
     <p:sldId id="273" r:id="rId18"/>
     <p:sldId id="274" r:id="rId19"/>
     <p:sldId id="275" r:id="rId20"/>
+    <p:sldId id="276" r:id="rId21"/>
   </p:sldIdLst>
   <p:sldSz cx="12188825" cy="6858000"/>
   <p:notesSz cx="6858000" cy="9144000"/>
@@ -292,7 +293,7 @@
           <a:p>
             <a:fld id="{24CE221E-83ED-4F6C-BA5F-3F9E6FDB6953}" type="datetimeFigureOut">
               <a:rPr lang="en-US"/>
-              <a:t>11/12/2023</a:t>
+              <a:t>11/16/2023</a:t>
             </a:fld>
             <a:endParaRPr dirty="0"/>
           </a:p>
@@ -457,7 +458,7 @@
           <a:p>
             <a:fld id="{97853E5F-CE67-483C-A264-F17AC70E9CA2}" type="datetimeFigureOut">
               <a:rPr lang="en-US"/>
-              <a:t>11/12/2023</a:t>
+              <a:t>11/16/2023</a:t>
             </a:fld>
             <a:endParaRPr dirty="0"/>
           </a:p>
@@ -1727,6 +1728,90 @@
 </p:notes>
 </file>
 
+<file path=ppt/notesSlides/notesSlide20.xml><?xml version="1.0" encoding="utf-8"?>
+<p:notes xmlns:a="http://schemas.openxmlformats.org/drawingml/2006/main" xmlns:r="http://schemas.openxmlformats.org/officeDocument/2006/relationships" xmlns:p="http://schemas.openxmlformats.org/presentationml/2006/main">
+  <p:cSld>
+    <p:spTree>
+      <p:nvGrpSpPr>
+        <p:cNvPr id="1" name=""/>
+        <p:cNvGrpSpPr/>
+        <p:nvPr/>
+      </p:nvGrpSpPr>
+      <p:grpSpPr>
+        <a:xfrm>
+          <a:off x="0" y="0"/>
+          <a:ext cx="0" cy="0"/>
+          <a:chOff x="0" y="0"/>
+          <a:chExt cx="0" cy="0"/>
+        </a:xfrm>
+      </p:grpSpPr>
+      <p:sp>
+        <p:nvSpPr>
+          <p:cNvPr id="2" name="Slide Image Placeholder 1"/>
+          <p:cNvSpPr>
+            <a:spLocks noGrp="1" noRot="1" noChangeAspect="1"/>
+          </p:cNvSpPr>
+          <p:nvPr>
+            <p:ph type="sldImg"/>
+          </p:nvPr>
+        </p:nvSpPr>
+        <p:spPr/>
+      </p:sp>
+      <p:sp>
+        <p:nvSpPr>
+          <p:cNvPr id="3" name="Notes Placeholder 2"/>
+          <p:cNvSpPr>
+            <a:spLocks noGrp="1"/>
+          </p:cNvSpPr>
+          <p:nvPr>
+            <p:ph type="body" idx="1"/>
+          </p:nvPr>
+        </p:nvSpPr>
+        <p:spPr/>
+        <p:txBody>
+          <a:bodyPr/>
+          <a:lstStyle/>
+          <a:p>
+            <a:endParaRPr lang="en-US" dirty="0"/>
+          </a:p>
+        </p:txBody>
+      </p:sp>
+      <p:sp>
+        <p:nvSpPr>
+          <p:cNvPr id="4" name="Slide Number Placeholder 3"/>
+          <p:cNvSpPr>
+            <a:spLocks noGrp="1"/>
+          </p:cNvSpPr>
+          <p:nvPr>
+            <p:ph type="sldNum" sz="quarter" idx="10"/>
+          </p:nvPr>
+        </p:nvSpPr>
+        <p:spPr/>
+        <p:txBody>
+          <a:bodyPr/>
+          <a:lstStyle/>
+          <a:p>
+            <a:fld id="{6BB98AFB-CB0D-4DFE-87B9-B4B0D0DE73CD}" type="slidenum">
+              <a:rPr lang="en-US" smtClean="0"/>
+              <a:t>20</a:t>
+            </a:fld>
+            <a:endParaRPr lang="en-US" dirty="0"/>
+          </a:p>
+        </p:txBody>
+      </p:sp>
+    </p:spTree>
+    <p:extLst>
+      <p:ext uri="{BB962C8B-B14F-4D97-AF65-F5344CB8AC3E}">
+        <p14:creationId xmlns:p14="http://schemas.microsoft.com/office/powerpoint/2010/main" val="4292039411"/>
+      </p:ext>
+    </p:extLst>
+  </p:cSld>
+  <p:clrMapOvr>
+    <a:masterClrMapping/>
+  </p:clrMapOvr>
+</p:notes>
+</file>
+
 <file path=ppt/notesSlides/notesSlide3.xml><?xml version="1.0" encoding="utf-8"?>
 <p:notes xmlns:a="http://schemas.openxmlformats.org/drawingml/2006/main" xmlns:r="http://schemas.openxmlformats.org/officeDocument/2006/relationships" xmlns:p="http://schemas.openxmlformats.org/presentationml/2006/main">
   <p:cSld>
@@ -2561,7 +2646,7 @@
           <a:p>
             <a:fld id="{3E0FA9E5-6744-4841-888F-9E7CC0C2B7EC}" type="datetimeFigureOut">
               <a:rPr lang="en-US" smtClean="0"/>
-              <a:t>11/12/2023</a:t>
+              <a:t>11/16/2023</a:t>
             </a:fld>
             <a:endParaRPr lang="en-US" dirty="0"/>
           </a:p>
@@ -2751,7 +2836,7 @@
           <a:p>
             <a:fld id="{3E0FA9E5-6744-4841-888F-9E7CC0C2B7EC}" type="datetimeFigureOut">
               <a:rPr lang="en-US" smtClean="0"/>
-              <a:t>11/12/2023</a:t>
+              <a:t>11/16/2023</a:t>
             </a:fld>
             <a:endParaRPr lang="en-US" dirty="0"/>
           </a:p>
@@ -2946,7 +3031,7 @@
           <a:p>
             <a:fld id="{3E0FA9E5-6744-4841-888F-9E7CC0C2B7EC}" type="datetimeFigureOut">
               <a:rPr lang="en-US" smtClean="0"/>
-              <a:t>11/12/2023</a:t>
+              <a:t>11/16/2023</a:t>
             </a:fld>
             <a:endParaRPr lang="en-US" dirty="0"/>
           </a:p>
@@ -3131,7 +3216,7 @@
           <a:p>
             <a:fld id="{3E0FA9E5-6744-4841-888F-9E7CC0C2B7EC}" type="datetimeFigureOut">
               <a:rPr lang="en-US" smtClean="0"/>
-              <a:t>11/12/2023</a:t>
+              <a:t>11/16/2023</a:t>
             </a:fld>
             <a:endParaRPr lang="en-US" dirty="0"/>
           </a:p>
@@ -3400,7 +3485,7 @@
           <a:p>
             <a:fld id="{3E0FA9E5-6744-4841-888F-9E7CC0C2B7EC}" type="datetimeFigureOut">
               <a:rPr lang="en-US" smtClean="0"/>
-              <a:t>11/12/2023</a:t>
+              <a:t>11/16/2023</a:t>
             </a:fld>
             <a:endParaRPr lang="en-US" dirty="0"/>
           </a:p>
@@ -3707,7 +3792,7 @@
           <a:p>
             <a:fld id="{3E0FA9E5-6744-4841-888F-9E7CC0C2B7EC}" type="datetimeFigureOut">
               <a:rPr lang="en-US" smtClean="0"/>
-              <a:t>11/12/2023</a:t>
+              <a:t>11/16/2023</a:t>
             </a:fld>
             <a:endParaRPr lang="en-US" dirty="0"/>
           </a:p>
@@ -4163,7 +4248,7 @@
           <a:p>
             <a:fld id="{3E0FA9E5-6744-4841-888F-9E7CC0C2B7EC}" type="datetimeFigureOut">
               <a:rPr lang="en-US" smtClean="0"/>
-              <a:t>11/12/2023</a:t>
+              <a:t>11/16/2023</a:t>
             </a:fld>
             <a:endParaRPr lang="en-US" dirty="0"/>
           </a:p>
@@ -4296,7 +4381,7 @@
           <a:p>
             <a:fld id="{3E0FA9E5-6744-4841-888F-9E7CC0C2B7EC}" type="datetimeFigureOut">
               <a:rPr lang="en-US" smtClean="0"/>
-              <a:t>11/12/2023</a:t>
+              <a:t>11/16/2023</a:t>
             </a:fld>
             <a:endParaRPr lang="en-US" dirty="0"/>
           </a:p>
@@ -4406,7 +4491,7 @@
           <a:p>
             <a:fld id="{3E0FA9E5-6744-4841-888F-9E7CC0C2B7EC}" type="datetimeFigureOut">
               <a:rPr lang="en-US" smtClean="0"/>
-              <a:t>11/12/2023</a:t>
+              <a:t>11/16/2023</a:t>
             </a:fld>
             <a:endParaRPr lang="en-US" dirty="0"/>
           </a:p>
@@ -4717,7 +4802,7 @@
           <a:p>
             <a:fld id="{3E0FA9E5-6744-4841-888F-9E7CC0C2B7EC}" type="datetimeFigureOut">
               <a:rPr lang="en-US" smtClean="0"/>
-              <a:t>11/12/2023</a:t>
+              <a:t>11/16/2023</a:t>
             </a:fld>
             <a:endParaRPr lang="en-US" dirty="0"/>
           </a:p>
@@ -5194,7 +5279,7 @@
             <a:fld id="{3E0FA9E5-6744-4841-888F-9E7CC0C2B7EC}" type="datetimeFigureOut">
               <a:rPr lang="en-US" smtClean="0"/>
               <a:pPr/>
-              <a:t>11/12/2023</a:t>
+              <a:t>11/16/2023</a:t>
             </a:fld>
             <a:endParaRPr lang="en-US" dirty="0"/>
           </a:p>
@@ -9625,13 +9710,13 @@
   <p:clrMapOvr>
     <a:masterClrMapping/>
   </p:clrMapOvr>
-  <mc:AlternateContent xmlns:mc="http://schemas.openxmlformats.org/markup-compatibility/2006">
-    <mc:Choice xmlns:p14="http://schemas.microsoft.com/office/powerpoint/2010/main" Requires="p14">
+  <mc:AlternateContent xmlns:mc="http://schemas.openxmlformats.org/markup-compatibility/2006" xmlns:p14="http://schemas.microsoft.com/office/powerpoint/2010/main">
+    <mc:Choice Requires="p14">
       <p:transition spd="med" p14:dur="700">
         <p:fade/>
       </p:transition>
     </mc:Choice>
-    <mc:Fallback>
+    <mc:Fallback xmlns="">
       <p:transition spd="med">
         <p:fade/>
       </p:transition>
@@ -9963,6 +10048,365 @@
     <p:extLst>
       <p:ext uri="{BB962C8B-B14F-4D97-AF65-F5344CB8AC3E}">
         <p14:creationId xmlns:p14="http://schemas.microsoft.com/office/powerpoint/2010/main" val="2396154423"/>
+      </p:ext>
+    </p:extLst>
+  </p:cSld>
+  <p:clrMapOvr>
+    <a:masterClrMapping/>
+  </p:clrMapOvr>
+  <mc:AlternateContent xmlns:mc="http://schemas.openxmlformats.org/markup-compatibility/2006" xmlns:p14="http://schemas.microsoft.com/office/powerpoint/2010/main">
+    <mc:Choice Requires="p14">
+      <p:transition spd="med" p14:dur="700">
+        <p:fade/>
+      </p:transition>
+    </mc:Choice>
+    <mc:Fallback xmlns="">
+      <p:transition spd="med">
+        <p:fade/>
+      </p:transition>
+    </mc:Fallback>
+  </mc:AlternateContent>
+</p:sld>
+</file>
+
+<file path=ppt/slides/slide20.xml><?xml version="1.0" encoding="utf-8"?>
+<p:sld xmlns:a="http://schemas.openxmlformats.org/drawingml/2006/main" xmlns:r="http://schemas.openxmlformats.org/officeDocument/2006/relationships" xmlns:p="http://schemas.openxmlformats.org/presentationml/2006/main">
+  <p:cSld>
+    <p:spTree>
+      <p:nvGrpSpPr>
+        <p:cNvPr id="1" name=""/>
+        <p:cNvGrpSpPr/>
+        <p:nvPr/>
+      </p:nvGrpSpPr>
+      <p:grpSpPr>
+        <a:xfrm>
+          <a:off x="0" y="0"/>
+          <a:ext cx="0" cy="0"/>
+          <a:chOff x="0" y="0"/>
+          <a:chExt cx="0" cy="0"/>
+        </a:xfrm>
+      </p:grpSpPr>
+      <p:sp>
+        <p:nvSpPr>
+          <p:cNvPr id="4" name="Title 3"/>
+          <p:cNvSpPr>
+            <a:spLocks noGrp="1"/>
+          </p:cNvSpPr>
+          <p:nvPr>
+            <p:ph type="ctrTitle"/>
+          </p:nvPr>
+        </p:nvSpPr>
+        <p:spPr/>
+        <p:txBody>
+          <a:bodyPr>
+            <a:normAutofit/>
+          </a:bodyPr>
+          <a:lstStyle/>
+          <a:p>
+            <a:pPr algn="ctr"/>
+            <a:r>
+              <a:rPr lang="zh-CN" altLang="en-US" sz="4800" dirty="0">
+                <a:latin typeface="华文隶书" panose="02010800040101010101" pitchFamily="2" charset="-122"/>
+                <a:ea typeface="华文隶书" panose="02010800040101010101" pitchFamily="2" charset="-122"/>
+              </a:rPr>
+              <a:t>让</a:t>
+            </a:r>
+            <a:r>
+              <a:rPr lang="en-US" altLang="zh-CN" sz="4800" dirty="0">
+                <a:latin typeface="华文隶书" panose="02010800040101010101" pitchFamily="2" charset="-122"/>
+                <a:ea typeface="华文隶书" panose="02010800040101010101" pitchFamily="2" charset="-122"/>
+              </a:rPr>
+              <a:t>Python</a:t>
+            </a:r>
+            <a:r>
+              <a:rPr lang="zh-CN" altLang="en-US" sz="4800" dirty="0">
+                <a:latin typeface="华文隶书" panose="02010800040101010101" pitchFamily="2" charset="-122"/>
+                <a:ea typeface="华文隶书" panose="02010800040101010101" pitchFamily="2" charset="-122"/>
+              </a:rPr>
+              <a:t>遇上</a:t>
+            </a:r>
+            <a:r>
+              <a:rPr lang="en-US" altLang="zh-CN" sz="4800" dirty="0">
+                <a:latin typeface="华文隶书" panose="02010800040101010101" pitchFamily="2" charset="-122"/>
+                <a:ea typeface="华文隶书" panose="02010800040101010101" pitchFamily="2" charset="-122"/>
+              </a:rPr>
+              <a:t>Office</a:t>
+            </a:r>
+            <a:br>
+              <a:rPr lang="en-US" altLang="zh-CN" sz="4800" dirty="0">
+                <a:latin typeface="华文隶书" panose="02010800040101010101" pitchFamily="2" charset="-122"/>
+                <a:ea typeface="华文隶书" panose="02010800040101010101" pitchFamily="2" charset="-122"/>
+              </a:rPr>
+            </a:br>
+            <a:br>
+              <a:rPr lang="en-US" altLang="zh-CN" sz="4800" dirty="0">
+                <a:latin typeface="华文隶书" panose="02010800040101010101" pitchFamily="2" charset="-122"/>
+                <a:ea typeface="华文隶书" panose="02010800040101010101" pitchFamily="2" charset="-122"/>
+              </a:rPr>
+            </a:br>
+            <a:r>
+              <a:rPr lang="en-US" altLang="zh-CN" sz="4800" dirty="0">
+                <a:latin typeface="华文隶书" panose="02010800040101010101" pitchFamily="2" charset="-122"/>
+                <a:ea typeface="华文隶书" panose="02010800040101010101" pitchFamily="2" charset="-122"/>
+              </a:rPr>
+              <a:t>(Python with Office)</a:t>
+            </a:r>
+            <a:endParaRPr lang="en-US" sz="4800" dirty="0">
+              <a:latin typeface="华文隶书" panose="02010800040101010101" pitchFamily="2" charset="-122"/>
+              <a:ea typeface="华文隶书" panose="02010800040101010101" pitchFamily="2" charset="-122"/>
+            </a:endParaRPr>
+          </a:p>
+        </p:txBody>
+      </p:sp>
+      <p:sp>
+        <p:nvSpPr>
+          <p:cNvPr id="3" name="Content Placeholder 2"/>
+          <p:cNvSpPr>
+            <a:spLocks noGrp="1"/>
+          </p:cNvSpPr>
+          <p:nvPr>
+            <p:ph type="subTitle" idx="1"/>
+          </p:nvPr>
+        </p:nvSpPr>
+        <p:spPr>
+          <a:xfrm>
+            <a:off x="549796" y="3403600"/>
+            <a:ext cx="5544617" cy="2185640"/>
+          </a:xfrm>
+        </p:spPr>
+        <p:txBody>
+          <a:bodyPr>
+            <a:normAutofit/>
+          </a:bodyPr>
+          <a:lstStyle/>
+          <a:p>
+            <a:r>
+              <a:rPr lang="en-US" sz="2800" dirty="0">
+                <a:latin typeface="ADLaM Display" panose="020F0502020204030204" pitchFamily="2" charset="0"/>
+                <a:ea typeface="ADLaM Display" panose="020F0502020204030204" pitchFamily="2" charset="0"/>
+                <a:cs typeface="ADLaM Display" panose="020F0502020204030204" pitchFamily="2" charset="0"/>
+              </a:rPr>
+              <a:t>Chapter 4 Class and Object 4.4 Inheritance, Polymorphism</a:t>
+            </a:r>
+          </a:p>
+          <a:p>
+            <a:r>
+              <a:rPr lang="zh-CN" altLang="en-US" sz="2800" dirty="0">
+                <a:latin typeface="ADLaM Display" panose="020F0502020204030204" pitchFamily="2" charset="0"/>
+                <a:ea typeface="ADLaM Display" panose="020F0502020204030204" pitchFamily="2" charset="0"/>
+                <a:cs typeface="ADLaM Display" panose="020F0502020204030204" pitchFamily="2" charset="0"/>
+              </a:rPr>
+              <a:t>第四章 类与对象</a:t>
+            </a:r>
+            <a:endParaRPr lang="en-US" altLang="zh-CN" sz="2800" dirty="0">
+              <a:latin typeface="ADLaM Display" panose="020F0502020204030204" pitchFamily="2" charset="0"/>
+              <a:ea typeface="ADLaM Display" panose="020F0502020204030204" pitchFamily="2" charset="0"/>
+              <a:cs typeface="ADLaM Display" panose="020F0502020204030204" pitchFamily="2" charset="0"/>
+            </a:endParaRPr>
+          </a:p>
+          <a:p>
+            <a:r>
+              <a:rPr lang="en-US" altLang="zh-CN" sz="2800" dirty="0">
+                <a:latin typeface="ADLaM Display" panose="020F0502020204030204" pitchFamily="2" charset="0"/>
+                <a:ea typeface="ADLaM Display" panose="020F0502020204030204" pitchFamily="2" charset="0"/>
+                <a:cs typeface="ADLaM Display" panose="020F0502020204030204" pitchFamily="2" charset="0"/>
+              </a:rPr>
+              <a:t>4.4 </a:t>
+            </a:r>
+            <a:r>
+              <a:rPr lang="zh-CN" altLang="en-US" sz="2800" dirty="0">
+                <a:latin typeface="ADLaM Display" panose="020F0502020204030204" pitchFamily="2" charset="0"/>
+                <a:ea typeface="ADLaM Display" panose="020F0502020204030204" pitchFamily="2" charset="0"/>
+                <a:cs typeface="ADLaM Display" panose="020F0502020204030204" pitchFamily="2" charset="0"/>
+              </a:rPr>
+              <a:t>继承和多态</a:t>
+            </a:r>
+            <a:endParaRPr lang="en-US" altLang="zh-CN" sz="2800" dirty="0">
+              <a:latin typeface="ADLaM Display" panose="020F0502020204030204" pitchFamily="2" charset="0"/>
+              <a:ea typeface="ADLaM Display" panose="020F0502020204030204" pitchFamily="2" charset="0"/>
+              <a:cs typeface="ADLaM Display" panose="020F0502020204030204" pitchFamily="2" charset="0"/>
+            </a:endParaRPr>
+          </a:p>
+        </p:txBody>
+      </p:sp>
+      <p:pic>
+        <p:nvPicPr>
+          <p:cNvPr id="5" name="Picture 4">
+            <a:extLst>
+              <a:ext uri="{FF2B5EF4-FFF2-40B4-BE49-F238E27FC236}">
+                <a16:creationId xmlns:a16="http://schemas.microsoft.com/office/drawing/2014/main" id="{4AD8B85C-B359-195F-B78C-C879AB7840B1}"/>
+              </a:ext>
+            </a:extLst>
+          </p:cNvPr>
+          <p:cNvPicPr>
+            <a:picLocks noChangeAspect="1"/>
+          </p:cNvPicPr>
+          <p:nvPr/>
+        </p:nvPicPr>
+        <p:blipFill>
+          <a:blip r:embed="rId3"/>
+          <a:stretch>
+            <a:fillRect/>
+          </a:stretch>
+        </p:blipFill>
+        <p:spPr>
+          <a:xfrm>
+            <a:off x="57601" y="1189856"/>
+            <a:ext cx="1068259" cy="1556792"/>
+          </a:xfrm>
+          <a:prstGeom prst="rect">
+            <a:avLst/>
+          </a:prstGeom>
+          <a:ln>
+            <a:noFill/>
+          </a:ln>
+          <a:effectLst>
+            <a:outerShdw blurRad="292100" dist="139700" dir="2700000" algn="tl" rotWithShape="0">
+              <a:srgbClr val="333333">
+                <a:alpha val="65000"/>
+              </a:srgbClr>
+            </a:outerShdw>
+          </a:effectLst>
+        </p:spPr>
+      </p:pic>
+      <p:sp>
+        <p:nvSpPr>
+          <p:cNvPr id="2" name="TextBox 1">
+            <a:extLst>
+              <a:ext uri="{FF2B5EF4-FFF2-40B4-BE49-F238E27FC236}">
+                <a16:creationId xmlns:a16="http://schemas.microsoft.com/office/drawing/2014/main" id="{CAB2C784-DE74-68FC-7A84-3E6C5D164315}"/>
+              </a:ext>
+            </a:extLst>
+          </p:cNvPr>
+          <p:cNvSpPr txBox="1"/>
+          <p:nvPr/>
+        </p:nvSpPr>
+        <p:spPr>
+          <a:xfrm>
+            <a:off x="405780" y="5722972"/>
+            <a:ext cx="7951216" cy="523220"/>
+          </a:xfrm>
+          <a:prstGeom prst="rect">
+            <a:avLst/>
+          </a:prstGeom>
+          <a:solidFill>
+            <a:schemeClr val="bg1">
+              <a:lumMod val="95000"/>
+            </a:schemeClr>
+          </a:solidFill>
+          <a:ln>
+            <a:solidFill>
+              <a:schemeClr val="bg2"/>
+            </a:solidFill>
+          </a:ln>
+        </p:spPr>
+        <p:txBody>
+          <a:bodyPr wrap="none" rtlCol="0" anchor="ctr" anchorCtr="1">
+            <a:spAutoFit/>
+          </a:bodyPr>
+          <a:lstStyle/>
+          <a:p>
+            <a:r>
+              <a:rPr lang="en-US" sz="2800" dirty="0">
+                <a:hlinkClick r:id="rId4"/>
+              </a:rPr>
+              <a:t>https://github.com/yasenstar/python_with_office</a:t>
+            </a:r>
+            <a:endParaRPr lang="en-US" sz="2800" dirty="0"/>
+          </a:p>
+        </p:txBody>
+      </p:sp>
+      <p:sp>
+        <p:nvSpPr>
+          <p:cNvPr id="9" name="TextBox 8">
+            <a:extLst>
+              <a:ext uri="{FF2B5EF4-FFF2-40B4-BE49-F238E27FC236}">
+                <a16:creationId xmlns:a16="http://schemas.microsoft.com/office/drawing/2014/main" id="{C25C84F5-3AA3-A068-7E2F-9123CA5A7D16}"/>
+              </a:ext>
+            </a:extLst>
+          </p:cNvPr>
+          <p:cNvSpPr txBox="1"/>
+          <p:nvPr/>
+        </p:nvSpPr>
+        <p:spPr>
+          <a:xfrm>
+            <a:off x="405780" y="6246192"/>
+            <a:ext cx="7951216" cy="523220"/>
+          </a:xfrm>
+          <a:prstGeom prst="rect">
+            <a:avLst/>
+          </a:prstGeom>
+          <a:solidFill>
+            <a:schemeClr val="bg1">
+              <a:lumMod val="95000"/>
+            </a:schemeClr>
+          </a:solidFill>
+          <a:ln>
+            <a:solidFill>
+              <a:schemeClr val="bg2"/>
+            </a:solidFill>
+          </a:ln>
+        </p:spPr>
+        <p:txBody>
+          <a:bodyPr wrap="square" rtlCol="0" anchor="ctr" anchorCtr="1">
+            <a:spAutoFit/>
+          </a:bodyPr>
+          <a:lstStyle/>
+          <a:p>
+            <a:r>
+              <a:rPr lang="en-US" sz="2800" dirty="0">
+                <a:hlinkClick r:id="rId5"/>
+              </a:rPr>
+              <a:t>https://gitee.com/yasenstar/python_with_office</a:t>
+            </a:r>
+            <a:endParaRPr lang="en-US" sz="2800" dirty="0"/>
+          </a:p>
+        </p:txBody>
+      </p:sp>
+      <p:pic>
+        <p:nvPicPr>
+          <p:cNvPr id="8" name="Picture 7">
+            <a:extLst>
+              <a:ext uri="{FF2B5EF4-FFF2-40B4-BE49-F238E27FC236}">
+                <a16:creationId xmlns:a16="http://schemas.microsoft.com/office/drawing/2014/main" id="{46F4691F-0A9F-103C-CE22-4DBDBDB7BD24}"/>
+              </a:ext>
+            </a:extLst>
+          </p:cNvPr>
+          <p:cNvPicPr>
+            <a:picLocks noChangeAspect="1"/>
+          </p:cNvPicPr>
+          <p:nvPr/>
+        </p:nvPicPr>
+        <p:blipFill>
+          <a:blip r:embed="rId6"/>
+          <a:stretch>
+            <a:fillRect/>
+          </a:stretch>
+        </p:blipFill>
+        <p:spPr>
+          <a:xfrm>
+            <a:off x="6238428" y="1725305"/>
+            <a:ext cx="5551408" cy="3736057"/>
+          </a:xfrm>
+          <a:prstGeom prst="rect">
+            <a:avLst/>
+          </a:prstGeom>
+          <a:ln>
+            <a:noFill/>
+          </a:ln>
+          <a:effectLst>
+            <a:outerShdw blurRad="292100" dist="139700" dir="2700000" algn="tl" rotWithShape="0">
+              <a:srgbClr val="333333">
+                <a:alpha val="65000"/>
+              </a:srgbClr>
+            </a:outerShdw>
+          </a:effectLst>
+        </p:spPr>
+      </p:pic>
+    </p:spTree>
+    <p:extLst>
+      <p:ext uri="{BB962C8B-B14F-4D97-AF65-F5344CB8AC3E}">
+        <p14:creationId xmlns:p14="http://schemas.microsoft.com/office/powerpoint/2010/main" val="2574981019"/>
       </p:ext>
     </p:extLst>
   </p:cSld>

</xml_diff>

<commit_message>
add inheritance and polymophism
</commit_message>
<xml_diff>
--- a/Video_Covers.pptx
+++ b/Video_Covers.pptx
@@ -5,10 +5,10 @@
     <p:sldMasterId id="2147483660" r:id="rId1"/>
   </p:sldMasterIdLst>
   <p:notesMasterIdLst>
-    <p:notesMasterId r:id="rId22"/>
+    <p:notesMasterId r:id="rId23"/>
   </p:notesMasterIdLst>
   <p:handoutMasterIdLst>
-    <p:handoutMasterId r:id="rId23"/>
+    <p:handoutMasterId r:id="rId24"/>
   </p:handoutMasterIdLst>
   <p:sldIdLst>
     <p:sldId id="257" r:id="rId2"/>
@@ -31,6 +31,7 @@
     <p:sldId id="274" r:id="rId19"/>
     <p:sldId id="275" r:id="rId20"/>
     <p:sldId id="276" r:id="rId21"/>
+    <p:sldId id="277" r:id="rId22"/>
   </p:sldIdLst>
   <p:sldSz cx="12188825" cy="6858000"/>
   <p:notesSz cx="6858000" cy="9144000"/>
@@ -1803,6 +1804,90 @@
     <p:extLst>
       <p:ext uri="{BB962C8B-B14F-4D97-AF65-F5344CB8AC3E}">
         <p14:creationId xmlns:p14="http://schemas.microsoft.com/office/powerpoint/2010/main" val="4292039411"/>
+      </p:ext>
+    </p:extLst>
+  </p:cSld>
+  <p:clrMapOvr>
+    <a:masterClrMapping/>
+  </p:clrMapOvr>
+</p:notes>
+</file>
+
+<file path=ppt/notesSlides/notesSlide21.xml><?xml version="1.0" encoding="utf-8"?>
+<p:notes xmlns:a="http://schemas.openxmlformats.org/drawingml/2006/main" xmlns:r="http://schemas.openxmlformats.org/officeDocument/2006/relationships" xmlns:p="http://schemas.openxmlformats.org/presentationml/2006/main">
+  <p:cSld>
+    <p:spTree>
+      <p:nvGrpSpPr>
+        <p:cNvPr id="1" name=""/>
+        <p:cNvGrpSpPr/>
+        <p:nvPr/>
+      </p:nvGrpSpPr>
+      <p:grpSpPr>
+        <a:xfrm>
+          <a:off x="0" y="0"/>
+          <a:ext cx="0" cy="0"/>
+          <a:chOff x="0" y="0"/>
+          <a:chExt cx="0" cy="0"/>
+        </a:xfrm>
+      </p:grpSpPr>
+      <p:sp>
+        <p:nvSpPr>
+          <p:cNvPr id="2" name="Slide Image Placeholder 1"/>
+          <p:cNvSpPr>
+            <a:spLocks noGrp="1" noRot="1" noChangeAspect="1"/>
+          </p:cNvSpPr>
+          <p:nvPr>
+            <p:ph type="sldImg"/>
+          </p:nvPr>
+        </p:nvSpPr>
+        <p:spPr/>
+      </p:sp>
+      <p:sp>
+        <p:nvSpPr>
+          <p:cNvPr id="3" name="Notes Placeholder 2"/>
+          <p:cNvSpPr>
+            <a:spLocks noGrp="1"/>
+          </p:cNvSpPr>
+          <p:nvPr>
+            <p:ph type="body" idx="1"/>
+          </p:nvPr>
+        </p:nvSpPr>
+        <p:spPr/>
+        <p:txBody>
+          <a:bodyPr/>
+          <a:lstStyle/>
+          <a:p>
+            <a:endParaRPr lang="en-US" dirty="0"/>
+          </a:p>
+        </p:txBody>
+      </p:sp>
+      <p:sp>
+        <p:nvSpPr>
+          <p:cNvPr id="4" name="Slide Number Placeholder 3"/>
+          <p:cNvSpPr>
+            <a:spLocks noGrp="1"/>
+          </p:cNvSpPr>
+          <p:nvPr>
+            <p:ph type="sldNum" sz="quarter" idx="10"/>
+          </p:nvPr>
+        </p:nvSpPr>
+        <p:spPr/>
+        <p:txBody>
+          <a:bodyPr/>
+          <a:lstStyle/>
+          <a:p>
+            <a:fld id="{6BB98AFB-CB0D-4DFE-87B9-B4B0D0DE73CD}" type="slidenum">
+              <a:rPr lang="en-US" smtClean="0"/>
+              <a:t>21</a:t>
+            </a:fld>
+            <a:endParaRPr lang="en-US" dirty="0"/>
+          </a:p>
+        </p:txBody>
+      </p:sp>
+    </p:spTree>
+    <p:extLst>
+      <p:ext uri="{BB962C8B-B14F-4D97-AF65-F5344CB8AC3E}">
+        <p14:creationId xmlns:p14="http://schemas.microsoft.com/office/powerpoint/2010/main" val="401186042"/>
       </p:ext>
     </p:extLst>
   </p:cSld>
@@ -10407,6 +10492,375 @@
     <p:extLst>
       <p:ext uri="{BB962C8B-B14F-4D97-AF65-F5344CB8AC3E}">
         <p14:creationId xmlns:p14="http://schemas.microsoft.com/office/powerpoint/2010/main" val="2574981019"/>
+      </p:ext>
+    </p:extLst>
+  </p:cSld>
+  <p:clrMapOvr>
+    <a:masterClrMapping/>
+  </p:clrMapOvr>
+  <mc:AlternateContent xmlns:mc="http://schemas.openxmlformats.org/markup-compatibility/2006" xmlns:p14="http://schemas.microsoft.com/office/powerpoint/2010/main">
+    <mc:Choice Requires="p14">
+      <p:transition spd="med" p14:dur="700">
+        <p:fade/>
+      </p:transition>
+    </mc:Choice>
+    <mc:Fallback xmlns="">
+      <p:transition spd="med">
+        <p:fade/>
+      </p:transition>
+    </mc:Fallback>
+  </mc:AlternateContent>
+</p:sld>
+</file>
+
+<file path=ppt/slides/slide21.xml><?xml version="1.0" encoding="utf-8"?>
+<p:sld xmlns:a="http://schemas.openxmlformats.org/drawingml/2006/main" xmlns:r="http://schemas.openxmlformats.org/officeDocument/2006/relationships" xmlns:p="http://schemas.openxmlformats.org/presentationml/2006/main">
+  <p:cSld>
+    <p:spTree>
+      <p:nvGrpSpPr>
+        <p:cNvPr id="1" name=""/>
+        <p:cNvGrpSpPr/>
+        <p:nvPr/>
+      </p:nvGrpSpPr>
+      <p:grpSpPr>
+        <a:xfrm>
+          <a:off x="0" y="0"/>
+          <a:ext cx="0" cy="0"/>
+          <a:chOff x="0" y="0"/>
+          <a:chExt cx="0" cy="0"/>
+        </a:xfrm>
+      </p:grpSpPr>
+      <p:sp>
+        <p:nvSpPr>
+          <p:cNvPr id="4" name="Title 3"/>
+          <p:cNvSpPr>
+            <a:spLocks noGrp="1"/>
+          </p:cNvSpPr>
+          <p:nvPr>
+            <p:ph type="ctrTitle"/>
+          </p:nvPr>
+        </p:nvSpPr>
+        <p:spPr/>
+        <p:txBody>
+          <a:bodyPr>
+            <a:normAutofit/>
+          </a:bodyPr>
+          <a:lstStyle/>
+          <a:p>
+            <a:pPr algn="ctr"/>
+            <a:r>
+              <a:rPr lang="zh-CN" altLang="en-US" sz="4800" dirty="0">
+                <a:latin typeface="华文隶书" panose="02010800040101010101" pitchFamily="2" charset="-122"/>
+                <a:ea typeface="华文隶书" panose="02010800040101010101" pitchFamily="2" charset="-122"/>
+              </a:rPr>
+              <a:t>让</a:t>
+            </a:r>
+            <a:r>
+              <a:rPr lang="en-US" altLang="zh-CN" sz="4800" dirty="0">
+                <a:latin typeface="华文隶书" panose="02010800040101010101" pitchFamily="2" charset="-122"/>
+                <a:ea typeface="华文隶书" panose="02010800040101010101" pitchFamily="2" charset="-122"/>
+              </a:rPr>
+              <a:t>Python</a:t>
+            </a:r>
+            <a:r>
+              <a:rPr lang="zh-CN" altLang="en-US" sz="4800" dirty="0">
+                <a:latin typeface="华文隶书" panose="02010800040101010101" pitchFamily="2" charset="-122"/>
+                <a:ea typeface="华文隶书" panose="02010800040101010101" pitchFamily="2" charset="-122"/>
+              </a:rPr>
+              <a:t>遇上</a:t>
+            </a:r>
+            <a:r>
+              <a:rPr lang="en-US" altLang="zh-CN" sz="4800" dirty="0">
+                <a:latin typeface="华文隶书" panose="02010800040101010101" pitchFamily="2" charset="-122"/>
+                <a:ea typeface="华文隶书" panose="02010800040101010101" pitchFamily="2" charset="-122"/>
+              </a:rPr>
+              <a:t>Office</a:t>
+            </a:r>
+            <a:br>
+              <a:rPr lang="en-US" altLang="zh-CN" sz="4800" dirty="0">
+                <a:latin typeface="华文隶书" panose="02010800040101010101" pitchFamily="2" charset="-122"/>
+                <a:ea typeface="华文隶书" panose="02010800040101010101" pitchFamily="2" charset="-122"/>
+              </a:rPr>
+            </a:br>
+            <a:br>
+              <a:rPr lang="en-US" altLang="zh-CN" sz="4800" dirty="0">
+                <a:latin typeface="华文隶书" panose="02010800040101010101" pitchFamily="2" charset="-122"/>
+                <a:ea typeface="华文隶书" panose="02010800040101010101" pitchFamily="2" charset="-122"/>
+              </a:rPr>
+            </a:br>
+            <a:r>
+              <a:rPr lang="en-US" altLang="zh-CN" sz="4800" dirty="0">
+                <a:latin typeface="华文隶书" panose="02010800040101010101" pitchFamily="2" charset="-122"/>
+                <a:ea typeface="华文隶书" panose="02010800040101010101" pitchFamily="2" charset="-122"/>
+              </a:rPr>
+              <a:t>(Python with Office)</a:t>
+            </a:r>
+            <a:endParaRPr lang="en-US" sz="4800" dirty="0">
+              <a:latin typeface="华文隶书" panose="02010800040101010101" pitchFamily="2" charset="-122"/>
+              <a:ea typeface="华文隶书" panose="02010800040101010101" pitchFamily="2" charset="-122"/>
+            </a:endParaRPr>
+          </a:p>
+        </p:txBody>
+      </p:sp>
+      <p:sp>
+        <p:nvSpPr>
+          <p:cNvPr id="3" name="Content Placeholder 2"/>
+          <p:cNvSpPr>
+            <a:spLocks noGrp="1"/>
+          </p:cNvSpPr>
+          <p:nvPr>
+            <p:ph type="subTitle" idx="1"/>
+          </p:nvPr>
+        </p:nvSpPr>
+        <p:spPr>
+          <a:xfrm>
+            <a:off x="549796" y="3403600"/>
+            <a:ext cx="5544617" cy="2185640"/>
+          </a:xfrm>
+        </p:spPr>
+        <p:txBody>
+          <a:bodyPr>
+            <a:normAutofit/>
+          </a:bodyPr>
+          <a:lstStyle/>
+          <a:p>
+            <a:r>
+              <a:rPr lang="en-US" sz="2800" dirty="0">
+                <a:latin typeface="ADLaM Display" panose="020F0502020204030204" pitchFamily="2" charset="0"/>
+                <a:ea typeface="ADLaM Display" panose="020F0502020204030204" pitchFamily="2" charset="0"/>
+                <a:cs typeface="ADLaM Display" panose="020F0502020204030204" pitchFamily="2" charset="0"/>
+              </a:rPr>
+              <a:t>Chapter 4 Class and Object</a:t>
+            </a:r>
+          </a:p>
+          <a:p>
+            <a:r>
+              <a:rPr lang="en-US" sz="2800" dirty="0">
+                <a:latin typeface="ADLaM Display" panose="020F0502020204030204" pitchFamily="2" charset="0"/>
+                <a:ea typeface="ADLaM Display" panose="020F0502020204030204" pitchFamily="2" charset="0"/>
+                <a:cs typeface="ADLaM Display" panose="020F0502020204030204" pitchFamily="2" charset="0"/>
+              </a:rPr>
+              <a:t>4.5 Class &amp; Static Method</a:t>
+            </a:r>
+          </a:p>
+          <a:p>
+            <a:r>
+              <a:rPr lang="zh-CN" altLang="en-US" sz="2800" dirty="0">
+                <a:latin typeface="ADLaM Display" panose="020F0502020204030204" pitchFamily="2" charset="0"/>
+                <a:ea typeface="ADLaM Display" panose="020F0502020204030204" pitchFamily="2" charset="0"/>
+                <a:cs typeface="ADLaM Display" panose="020F0502020204030204" pitchFamily="2" charset="0"/>
+              </a:rPr>
+              <a:t>第四章 类与对象</a:t>
+            </a:r>
+            <a:endParaRPr lang="en-US" altLang="zh-CN" sz="2800" dirty="0">
+              <a:latin typeface="ADLaM Display" panose="020F0502020204030204" pitchFamily="2" charset="0"/>
+              <a:ea typeface="ADLaM Display" panose="020F0502020204030204" pitchFamily="2" charset="0"/>
+              <a:cs typeface="ADLaM Display" panose="020F0502020204030204" pitchFamily="2" charset="0"/>
+            </a:endParaRPr>
+          </a:p>
+          <a:p>
+            <a:r>
+              <a:rPr lang="en-US" altLang="zh-CN" sz="2800" dirty="0">
+                <a:latin typeface="ADLaM Display" panose="020F0502020204030204" pitchFamily="2" charset="0"/>
+                <a:ea typeface="ADLaM Display" panose="020F0502020204030204" pitchFamily="2" charset="0"/>
+                <a:cs typeface="ADLaM Display" panose="020F0502020204030204" pitchFamily="2" charset="0"/>
+              </a:rPr>
+              <a:t>4.5 </a:t>
+            </a:r>
+            <a:r>
+              <a:rPr lang="zh-CN" altLang="en-US" sz="2800" dirty="0">
+                <a:latin typeface="ADLaM Display" panose="020F0502020204030204" pitchFamily="2" charset="0"/>
+                <a:ea typeface="ADLaM Display" panose="020F0502020204030204" pitchFamily="2" charset="0"/>
+                <a:cs typeface="ADLaM Display" panose="020F0502020204030204" pitchFamily="2" charset="0"/>
+              </a:rPr>
+              <a:t>类方法与静态方法</a:t>
+            </a:r>
+            <a:endParaRPr lang="en-US" altLang="zh-CN" sz="2800" dirty="0">
+              <a:latin typeface="ADLaM Display" panose="020F0502020204030204" pitchFamily="2" charset="0"/>
+              <a:ea typeface="ADLaM Display" panose="020F0502020204030204" pitchFamily="2" charset="0"/>
+              <a:cs typeface="ADLaM Display" panose="020F0502020204030204" pitchFamily="2" charset="0"/>
+            </a:endParaRPr>
+          </a:p>
+        </p:txBody>
+      </p:sp>
+      <p:pic>
+        <p:nvPicPr>
+          <p:cNvPr id="5" name="Picture 4">
+            <a:extLst>
+              <a:ext uri="{FF2B5EF4-FFF2-40B4-BE49-F238E27FC236}">
+                <a16:creationId xmlns:a16="http://schemas.microsoft.com/office/drawing/2014/main" id="{4AD8B85C-B359-195F-B78C-C879AB7840B1}"/>
+              </a:ext>
+            </a:extLst>
+          </p:cNvPr>
+          <p:cNvPicPr>
+            <a:picLocks noChangeAspect="1"/>
+          </p:cNvPicPr>
+          <p:nvPr/>
+        </p:nvPicPr>
+        <p:blipFill>
+          <a:blip r:embed="rId3"/>
+          <a:stretch>
+            <a:fillRect/>
+          </a:stretch>
+        </p:blipFill>
+        <p:spPr>
+          <a:xfrm>
+            <a:off x="57601" y="1189856"/>
+            <a:ext cx="1068259" cy="1556792"/>
+          </a:xfrm>
+          <a:prstGeom prst="rect">
+            <a:avLst/>
+          </a:prstGeom>
+          <a:ln>
+            <a:noFill/>
+          </a:ln>
+          <a:effectLst>
+            <a:outerShdw blurRad="292100" dist="139700" dir="2700000" algn="tl" rotWithShape="0">
+              <a:srgbClr val="333333">
+                <a:alpha val="65000"/>
+              </a:srgbClr>
+            </a:outerShdw>
+          </a:effectLst>
+        </p:spPr>
+      </p:pic>
+      <p:sp>
+        <p:nvSpPr>
+          <p:cNvPr id="2" name="TextBox 1">
+            <a:extLst>
+              <a:ext uri="{FF2B5EF4-FFF2-40B4-BE49-F238E27FC236}">
+                <a16:creationId xmlns:a16="http://schemas.microsoft.com/office/drawing/2014/main" id="{CAB2C784-DE74-68FC-7A84-3E6C5D164315}"/>
+              </a:ext>
+            </a:extLst>
+          </p:cNvPr>
+          <p:cNvSpPr txBox="1"/>
+          <p:nvPr/>
+        </p:nvSpPr>
+        <p:spPr>
+          <a:xfrm>
+            <a:off x="405780" y="5722972"/>
+            <a:ext cx="7951216" cy="523220"/>
+          </a:xfrm>
+          <a:prstGeom prst="rect">
+            <a:avLst/>
+          </a:prstGeom>
+          <a:solidFill>
+            <a:schemeClr val="bg1">
+              <a:lumMod val="95000"/>
+            </a:schemeClr>
+          </a:solidFill>
+          <a:ln>
+            <a:solidFill>
+              <a:schemeClr val="bg2"/>
+            </a:solidFill>
+          </a:ln>
+        </p:spPr>
+        <p:txBody>
+          <a:bodyPr wrap="none" rtlCol="0" anchor="ctr" anchorCtr="1">
+            <a:spAutoFit/>
+          </a:bodyPr>
+          <a:lstStyle/>
+          <a:p>
+            <a:r>
+              <a:rPr lang="en-US" sz="2800" dirty="0">
+                <a:hlinkClick r:id="rId4"/>
+              </a:rPr>
+              <a:t>https://github.com/yasenstar/python_with_office</a:t>
+            </a:r>
+            <a:endParaRPr lang="en-US" sz="2800" dirty="0"/>
+          </a:p>
+        </p:txBody>
+      </p:sp>
+      <p:sp>
+        <p:nvSpPr>
+          <p:cNvPr id="9" name="TextBox 8">
+            <a:extLst>
+              <a:ext uri="{FF2B5EF4-FFF2-40B4-BE49-F238E27FC236}">
+                <a16:creationId xmlns:a16="http://schemas.microsoft.com/office/drawing/2014/main" id="{C25C84F5-3AA3-A068-7E2F-9123CA5A7D16}"/>
+              </a:ext>
+            </a:extLst>
+          </p:cNvPr>
+          <p:cNvSpPr txBox="1"/>
+          <p:nvPr/>
+        </p:nvSpPr>
+        <p:spPr>
+          <a:xfrm>
+            <a:off x="405780" y="6246192"/>
+            <a:ext cx="7951216" cy="523220"/>
+          </a:xfrm>
+          <a:prstGeom prst="rect">
+            <a:avLst/>
+          </a:prstGeom>
+          <a:solidFill>
+            <a:schemeClr val="bg1">
+              <a:lumMod val="95000"/>
+            </a:schemeClr>
+          </a:solidFill>
+          <a:ln>
+            <a:solidFill>
+              <a:schemeClr val="bg2"/>
+            </a:solidFill>
+          </a:ln>
+        </p:spPr>
+        <p:txBody>
+          <a:bodyPr wrap="square" rtlCol="0" anchor="ctr" anchorCtr="1">
+            <a:spAutoFit/>
+          </a:bodyPr>
+          <a:lstStyle/>
+          <a:p>
+            <a:r>
+              <a:rPr lang="en-US" sz="2800" dirty="0">
+                <a:hlinkClick r:id="rId5"/>
+              </a:rPr>
+              <a:t>https://gitee.com/yasenstar/python_with_office</a:t>
+            </a:r>
+            <a:endParaRPr lang="en-US" sz="2800" dirty="0"/>
+          </a:p>
+        </p:txBody>
+      </p:sp>
+      <p:pic>
+        <p:nvPicPr>
+          <p:cNvPr id="7" name="Picture 6">
+            <a:extLst>
+              <a:ext uri="{FF2B5EF4-FFF2-40B4-BE49-F238E27FC236}">
+                <a16:creationId xmlns:a16="http://schemas.microsoft.com/office/drawing/2014/main" id="{10B79822-664C-2BA2-4269-D945E6145779}"/>
+              </a:ext>
+            </a:extLst>
+          </p:cNvPr>
+          <p:cNvPicPr>
+            <a:picLocks noChangeAspect="1"/>
+          </p:cNvPicPr>
+          <p:nvPr/>
+        </p:nvPicPr>
+        <p:blipFill>
+          <a:blip r:embed="rId6"/>
+          <a:stretch>
+            <a:fillRect/>
+          </a:stretch>
+        </p:blipFill>
+        <p:spPr>
+          <a:xfrm>
+            <a:off x="6072863" y="1790700"/>
+            <a:ext cx="5422150" cy="3651299"/>
+          </a:xfrm>
+          <a:prstGeom prst="rect">
+            <a:avLst/>
+          </a:prstGeom>
+          <a:ln>
+            <a:noFill/>
+          </a:ln>
+          <a:effectLst>
+            <a:outerShdw blurRad="292100" dist="139700" dir="2700000" algn="tl" rotWithShape="0">
+              <a:srgbClr val="333333">
+                <a:alpha val="65000"/>
+              </a:srgbClr>
+            </a:outerShdw>
+          </a:effectLst>
+        </p:spPr>
+      </p:pic>
+    </p:spTree>
+    <p:extLst>
+      <p:ext uri="{BB962C8B-B14F-4D97-AF65-F5344CB8AC3E}">
+        <p14:creationId xmlns:p14="http://schemas.microsoft.com/office/powerpoint/2010/main" val="1852244970"/>
       </p:ext>
     </p:extLst>
   </p:cSld>

</xml_diff>

<commit_message>
add image cover till 025
</commit_message>
<xml_diff>
--- a/Video_Covers.pptx
+++ b/Video_Covers.pptx
@@ -5,10 +5,10 @@
     <p:sldMasterId id="2147483660" r:id="rId1"/>
   </p:sldMasterIdLst>
   <p:notesMasterIdLst>
-    <p:notesMasterId r:id="rId23"/>
+    <p:notesMasterId r:id="rId27"/>
   </p:notesMasterIdLst>
   <p:handoutMasterIdLst>
-    <p:handoutMasterId r:id="rId24"/>
+    <p:handoutMasterId r:id="rId28"/>
   </p:handoutMasterIdLst>
   <p:sldIdLst>
     <p:sldId id="257" r:id="rId2"/>
@@ -32,6 +32,10 @@
     <p:sldId id="275" r:id="rId20"/>
     <p:sldId id="276" r:id="rId21"/>
     <p:sldId id="277" r:id="rId22"/>
+    <p:sldId id="278" r:id="rId23"/>
+    <p:sldId id="280" r:id="rId24"/>
+    <p:sldId id="281" r:id="rId25"/>
+    <p:sldId id="279" r:id="rId26"/>
   </p:sldIdLst>
   <p:sldSz cx="12188825" cy="6858000"/>
   <p:notesSz cx="6858000" cy="9144000"/>
@@ -1888,6 +1892,342 @@
     <p:extLst>
       <p:ext uri="{BB962C8B-B14F-4D97-AF65-F5344CB8AC3E}">
         <p14:creationId xmlns:p14="http://schemas.microsoft.com/office/powerpoint/2010/main" val="401186042"/>
+      </p:ext>
+    </p:extLst>
+  </p:cSld>
+  <p:clrMapOvr>
+    <a:masterClrMapping/>
+  </p:clrMapOvr>
+</p:notes>
+</file>
+
+<file path=ppt/notesSlides/notesSlide22.xml><?xml version="1.0" encoding="utf-8"?>
+<p:notes xmlns:a="http://schemas.openxmlformats.org/drawingml/2006/main" xmlns:r="http://schemas.openxmlformats.org/officeDocument/2006/relationships" xmlns:p="http://schemas.openxmlformats.org/presentationml/2006/main">
+  <p:cSld>
+    <p:spTree>
+      <p:nvGrpSpPr>
+        <p:cNvPr id="1" name=""/>
+        <p:cNvGrpSpPr/>
+        <p:nvPr/>
+      </p:nvGrpSpPr>
+      <p:grpSpPr>
+        <a:xfrm>
+          <a:off x="0" y="0"/>
+          <a:ext cx="0" cy="0"/>
+          <a:chOff x="0" y="0"/>
+          <a:chExt cx="0" cy="0"/>
+        </a:xfrm>
+      </p:grpSpPr>
+      <p:sp>
+        <p:nvSpPr>
+          <p:cNvPr id="2" name="Slide Image Placeholder 1"/>
+          <p:cNvSpPr>
+            <a:spLocks noGrp="1" noRot="1" noChangeAspect="1"/>
+          </p:cNvSpPr>
+          <p:nvPr>
+            <p:ph type="sldImg"/>
+          </p:nvPr>
+        </p:nvSpPr>
+        <p:spPr/>
+      </p:sp>
+      <p:sp>
+        <p:nvSpPr>
+          <p:cNvPr id="3" name="Notes Placeholder 2"/>
+          <p:cNvSpPr>
+            <a:spLocks noGrp="1"/>
+          </p:cNvSpPr>
+          <p:nvPr>
+            <p:ph type="body" idx="1"/>
+          </p:nvPr>
+        </p:nvSpPr>
+        <p:spPr/>
+        <p:txBody>
+          <a:bodyPr/>
+          <a:lstStyle/>
+          <a:p>
+            <a:endParaRPr lang="en-US" dirty="0"/>
+          </a:p>
+        </p:txBody>
+      </p:sp>
+      <p:sp>
+        <p:nvSpPr>
+          <p:cNvPr id="4" name="Slide Number Placeholder 3"/>
+          <p:cNvSpPr>
+            <a:spLocks noGrp="1"/>
+          </p:cNvSpPr>
+          <p:nvPr>
+            <p:ph type="sldNum" sz="quarter" idx="10"/>
+          </p:nvPr>
+        </p:nvSpPr>
+        <p:spPr/>
+        <p:txBody>
+          <a:bodyPr/>
+          <a:lstStyle/>
+          <a:p>
+            <a:fld id="{6BB98AFB-CB0D-4DFE-87B9-B4B0D0DE73CD}" type="slidenum">
+              <a:rPr lang="en-US" smtClean="0"/>
+              <a:t>22</a:t>
+            </a:fld>
+            <a:endParaRPr lang="en-US" dirty="0"/>
+          </a:p>
+        </p:txBody>
+      </p:sp>
+    </p:spTree>
+    <p:extLst>
+      <p:ext uri="{BB962C8B-B14F-4D97-AF65-F5344CB8AC3E}">
+        <p14:creationId xmlns:p14="http://schemas.microsoft.com/office/powerpoint/2010/main" val="868342104"/>
+      </p:ext>
+    </p:extLst>
+  </p:cSld>
+  <p:clrMapOvr>
+    <a:masterClrMapping/>
+  </p:clrMapOvr>
+</p:notes>
+</file>
+
+<file path=ppt/notesSlides/notesSlide23.xml><?xml version="1.0" encoding="utf-8"?>
+<p:notes xmlns:a="http://schemas.openxmlformats.org/drawingml/2006/main" xmlns:r="http://schemas.openxmlformats.org/officeDocument/2006/relationships" xmlns:p="http://schemas.openxmlformats.org/presentationml/2006/main">
+  <p:cSld>
+    <p:spTree>
+      <p:nvGrpSpPr>
+        <p:cNvPr id="1" name=""/>
+        <p:cNvGrpSpPr/>
+        <p:nvPr/>
+      </p:nvGrpSpPr>
+      <p:grpSpPr>
+        <a:xfrm>
+          <a:off x="0" y="0"/>
+          <a:ext cx="0" cy="0"/>
+          <a:chOff x="0" y="0"/>
+          <a:chExt cx="0" cy="0"/>
+        </a:xfrm>
+      </p:grpSpPr>
+      <p:sp>
+        <p:nvSpPr>
+          <p:cNvPr id="2" name="Slide Image Placeholder 1"/>
+          <p:cNvSpPr>
+            <a:spLocks noGrp="1" noRot="1" noChangeAspect="1"/>
+          </p:cNvSpPr>
+          <p:nvPr>
+            <p:ph type="sldImg"/>
+          </p:nvPr>
+        </p:nvSpPr>
+        <p:spPr/>
+      </p:sp>
+      <p:sp>
+        <p:nvSpPr>
+          <p:cNvPr id="3" name="Notes Placeholder 2"/>
+          <p:cNvSpPr>
+            <a:spLocks noGrp="1"/>
+          </p:cNvSpPr>
+          <p:nvPr>
+            <p:ph type="body" idx="1"/>
+          </p:nvPr>
+        </p:nvSpPr>
+        <p:spPr/>
+        <p:txBody>
+          <a:bodyPr/>
+          <a:lstStyle/>
+          <a:p>
+            <a:endParaRPr lang="en-US" dirty="0"/>
+          </a:p>
+        </p:txBody>
+      </p:sp>
+      <p:sp>
+        <p:nvSpPr>
+          <p:cNvPr id="4" name="Slide Number Placeholder 3"/>
+          <p:cNvSpPr>
+            <a:spLocks noGrp="1"/>
+          </p:cNvSpPr>
+          <p:nvPr>
+            <p:ph type="sldNum" sz="quarter" idx="10"/>
+          </p:nvPr>
+        </p:nvSpPr>
+        <p:spPr/>
+        <p:txBody>
+          <a:bodyPr/>
+          <a:lstStyle/>
+          <a:p>
+            <a:fld id="{6BB98AFB-CB0D-4DFE-87B9-B4B0D0DE73CD}" type="slidenum">
+              <a:rPr lang="en-US" smtClean="0"/>
+              <a:t>23</a:t>
+            </a:fld>
+            <a:endParaRPr lang="en-US" dirty="0"/>
+          </a:p>
+        </p:txBody>
+      </p:sp>
+    </p:spTree>
+    <p:extLst>
+      <p:ext uri="{BB962C8B-B14F-4D97-AF65-F5344CB8AC3E}">
+        <p14:creationId xmlns:p14="http://schemas.microsoft.com/office/powerpoint/2010/main" val="2827349964"/>
+      </p:ext>
+    </p:extLst>
+  </p:cSld>
+  <p:clrMapOvr>
+    <a:masterClrMapping/>
+  </p:clrMapOvr>
+</p:notes>
+</file>
+
+<file path=ppt/notesSlides/notesSlide24.xml><?xml version="1.0" encoding="utf-8"?>
+<p:notes xmlns:a="http://schemas.openxmlformats.org/drawingml/2006/main" xmlns:r="http://schemas.openxmlformats.org/officeDocument/2006/relationships" xmlns:p="http://schemas.openxmlformats.org/presentationml/2006/main">
+  <p:cSld>
+    <p:spTree>
+      <p:nvGrpSpPr>
+        <p:cNvPr id="1" name=""/>
+        <p:cNvGrpSpPr/>
+        <p:nvPr/>
+      </p:nvGrpSpPr>
+      <p:grpSpPr>
+        <a:xfrm>
+          <a:off x="0" y="0"/>
+          <a:ext cx="0" cy="0"/>
+          <a:chOff x="0" y="0"/>
+          <a:chExt cx="0" cy="0"/>
+        </a:xfrm>
+      </p:grpSpPr>
+      <p:sp>
+        <p:nvSpPr>
+          <p:cNvPr id="2" name="Slide Image Placeholder 1"/>
+          <p:cNvSpPr>
+            <a:spLocks noGrp="1" noRot="1" noChangeAspect="1"/>
+          </p:cNvSpPr>
+          <p:nvPr>
+            <p:ph type="sldImg"/>
+          </p:nvPr>
+        </p:nvSpPr>
+        <p:spPr/>
+      </p:sp>
+      <p:sp>
+        <p:nvSpPr>
+          <p:cNvPr id="3" name="Notes Placeholder 2"/>
+          <p:cNvSpPr>
+            <a:spLocks noGrp="1"/>
+          </p:cNvSpPr>
+          <p:nvPr>
+            <p:ph type="body" idx="1"/>
+          </p:nvPr>
+        </p:nvSpPr>
+        <p:spPr/>
+        <p:txBody>
+          <a:bodyPr/>
+          <a:lstStyle/>
+          <a:p>
+            <a:endParaRPr lang="en-US" dirty="0"/>
+          </a:p>
+        </p:txBody>
+      </p:sp>
+      <p:sp>
+        <p:nvSpPr>
+          <p:cNvPr id="4" name="Slide Number Placeholder 3"/>
+          <p:cNvSpPr>
+            <a:spLocks noGrp="1"/>
+          </p:cNvSpPr>
+          <p:nvPr>
+            <p:ph type="sldNum" sz="quarter" idx="10"/>
+          </p:nvPr>
+        </p:nvSpPr>
+        <p:spPr/>
+        <p:txBody>
+          <a:bodyPr/>
+          <a:lstStyle/>
+          <a:p>
+            <a:fld id="{6BB98AFB-CB0D-4DFE-87B9-B4B0D0DE73CD}" type="slidenum">
+              <a:rPr lang="en-US" smtClean="0"/>
+              <a:t>24</a:t>
+            </a:fld>
+            <a:endParaRPr lang="en-US" dirty="0"/>
+          </a:p>
+        </p:txBody>
+      </p:sp>
+    </p:spTree>
+    <p:extLst>
+      <p:ext uri="{BB962C8B-B14F-4D97-AF65-F5344CB8AC3E}">
+        <p14:creationId xmlns:p14="http://schemas.microsoft.com/office/powerpoint/2010/main" val="3051555535"/>
+      </p:ext>
+    </p:extLst>
+  </p:cSld>
+  <p:clrMapOvr>
+    <a:masterClrMapping/>
+  </p:clrMapOvr>
+</p:notes>
+</file>
+
+<file path=ppt/notesSlides/notesSlide25.xml><?xml version="1.0" encoding="utf-8"?>
+<p:notes xmlns:a="http://schemas.openxmlformats.org/drawingml/2006/main" xmlns:r="http://schemas.openxmlformats.org/officeDocument/2006/relationships" xmlns:p="http://schemas.openxmlformats.org/presentationml/2006/main">
+  <p:cSld>
+    <p:spTree>
+      <p:nvGrpSpPr>
+        <p:cNvPr id="1" name=""/>
+        <p:cNvGrpSpPr/>
+        <p:nvPr/>
+      </p:nvGrpSpPr>
+      <p:grpSpPr>
+        <a:xfrm>
+          <a:off x="0" y="0"/>
+          <a:ext cx="0" cy="0"/>
+          <a:chOff x="0" y="0"/>
+          <a:chExt cx="0" cy="0"/>
+        </a:xfrm>
+      </p:grpSpPr>
+      <p:sp>
+        <p:nvSpPr>
+          <p:cNvPr id="2" name="Slide Image Placeholder 1"/>
+          <p:cNvSpPr>
+            <a:spLocks noGrp="1" noRot="1" noChangeAspect="1"/>
+          </p:cNvSpPr>
+          <p:nvPr>
+            <p:ph type="sldImg"/>
+          </p:nvPr>
+        </p:nvSpPr>
+        <p:spPr/>
+      </p:sp>
+      <p:sp>
+        <p:nvSpPr>
+          <p:cNvPr id="3" name="Notes Placeholder 2"/>
+          <p:cNvSpPr>
+            <a:spLocks noGrp="1"/>
+          </p:cNvSpPr>
+          <p:nvPr>
+            <p:ph type="body" idx="1"/>
+          </p:nvPr>
+        </p:nvSpPr>
+        <p:spPr/>
+        <p:txBody>
+          <a:bodyPr/>
+          <a:lstStyle/>
+          <a:p>
+            <a:endParaRPr lang="en-US" dirty="0"/>
+          </a:p>
+        </p:txBody>
+      </p:sp>
+      <p:sp>
+        <p:nvSpPr>
+          <p:cNvPr id="4" name="Slide Number Placeholder 3"/>
+          <p:cNvSpPr>
+            <a:spLocks noGrp="1"/>
+          </p:cNvSpPr>
+          <p:nvPr>
+            <p:ph type="sldNum" sz="quarter" idx="10"/>
+          </p:nvPr>
+        </p:nvSpPr>
+        <p:spPr/>
+        <p:txBody>
+          <a:bodyPr/>
+          <a:lstStyle/>
+          <a:p>
+            <a:fld id="{6BB98AFB-CB0D-4DFE-87B9-B4B0D0DE73CD}" type="slidenum">
+              <a:rPr lang="en-US" smtClean="0"/>
+              <a:t>25</a:t>
+            </a:fld>
+            <a:endParaRPr lang="en-US" dirty="0"/>
+          </a:p>
+        </p:txBody>
+      </p:sp>
+    </p:spTree>
+    <p:extLst>
+      <p:ext uri="{BB962C8B-B14F-4D97-AF65-F5344CB8AC3E}">
+        <p14:creationId xmlns:p14="http://schemas.microsoft.com/office/powerpoint/2010/main" val="529015424"/>
       </p:ext>
     </p:extLst>
   </p:cSld>
@@ -10271,7 +10611,17 @@
                 <a:ea typeface="ADLaM Display" panose="020F0502020204030204" pitchFamily="2" charset="0"/>
                 <a:cs typeface="ADLaM Display" panose="020F0502020204030204" pitchFamily="2" charset="0"/>
               </a:rPr>
-              <a:t>Chapter 4 Class and Object 4.4 Inheritance, Polymorphism</a:t>
+              <a:t>Chapter 4 Class and Object</a:t>
+            </a:r>
+          </a:p>
+          <a:p>
+            <a:r>
+              <a:rPr lang="en-US" sz="2800" dirty="0">
+                <a:latin typeface="ADLaM Display" panose="020F0502020204030204" pitchFamily="2" charset="0"/>
+                <a:ea typeface="ADLaM Display" panose="020F0502020204030204" pitchFamily="2" charset="0"/>
+                <a:cs typeface="ADLaM Display" panose="020F0502020204030204" pitchFamily="2" charset="0"/>
+              </a:rPr>
+              <a:t>4.4 Inheritance, Polymorphism</a:t>
             </a:r>
           </a:p>
           <a:p>
@@ -10640,8 +10990,21 @@
                 <a:ea typeface="ADLaM Display" panose="020F0502020204030204" pitchFamily="2" charset="0"/>
                 <a:cs typeface="ADLaM Display" panose="020F0502020204030204" pitchFamily="2" charset="0"/>
               </a:rPr>
-              <a:t>4.5 Class &amp; Static Method</a:t>
-            </a:r>
+              <a:t>4.5 </a:t>
+            </a:r>
+            <a:r>
+              <a:rPr lang="en-US" altLang="zh-CN" sz="2800" dirty="0">
+                <a:latin typeface="ADLaM Display" panose="020F0502020204030204" pitchFamily="2" charset="0"/>
+                <a:ea typeface="ADLaM Display" panose="020F0502020204030204" pitchFamily="2" charset="0"/>
+                <a:cs typeface="ADLaM Display" panose="020F0502020204030204" pitchFamily="2" charset="0"/>
+              </a:rPr>
+              <a:t>Class &amp; Static Method</a:t>
+            </a:r>
+            <a:endParaRPr lang="en-US" sz="2800" dirty="0">
+              <a:latin typeface="ADLaM Display" panose="020F0502020204030204" pitchFamily="2" charset="0"/>
+              <a:ea typeface="ADLaM Display" panose="020F0502020204030204" pitchFamily="2" charset="0"/>
+              <a:cs typeface="ADLaM Display" panose="020F0502020204030204" pitchFamily="2" charset="0"/>
+            </a:endParaRPr>
           </a:p>
           <a:p>
             <a:r>
@@ -10819,10 +11182,10 @@
       </p:sp>
       <p:pic>
         <p:nvPicPr>
-          <p:cNvPr id="7" name="Picture 6">
+          <p:cNvPr id="13" name="Picture 12">
             <a:extLst>
               <a:ext uri="{FF2B5EF4-FFF2-40B4-BE49-F238E27FC236}">
-                <a16:creationId xmlns:a16="http://schemas.microsoft.com/office/drawing/2014/main" id="{10B79822-664C-2BA2-4269-D945E6145779}"/>
+                <a16:creationId xmlns:a16="http://schemas.microsoft.com/office/drawing/2014/main" id="{5DA31865-351E-85E6-A184-9C6ACCD79A88}"/>
               </a:ext>
             </a:extLst>
           </p:cNvPr>
@@ -10839,8 +11202,8 @@
         </p:blipFill>
         <p:spPr>
           <a:xfrm>
-            <a:off x="6072863" y="1790700"/>
-            <a:ext cx="5422150" cy="3651299"/>
+            <a:off x="6166420" y="1406727"/>
+            <a:ext cx="5251776" cy="3993746"/>
           </a:xfrm>
           <a:prstGeom prst="rect">
             <a:avLst/>
@@ -10861,6 +11224,1482 @@
     <p:extLst>
       <p:ext uri="{BB962C8B-B14F-4D97-AF65-F5344CB8AC3E}">
         <p14:creationId xmlns:p14="http://schemas.microsoft.com/office/powerpoint/2010/main" val="1852244970"/>
+      </p:ext>
+    </p:extLst>
+  </p:cSld>
+  <p:clrMapOvr>
+    <a:masterClrMapping/>
+  </p:clrMapOvr>
+  <mc:AlternateContent xmlns:mc="http://schemas.openxmlformats.org/markup-compatibility/2006" xmlns:p14="http://schemas.microsoft.com/office/powerpoint/2010/main">
+    <mc:Choice Requires="p14">
+      <p:transition spd="med" p14:dur="700">
+        <p:fade/>
+      </p:transition>
+    </mc:Choice>
+    <mc:Fallback xmlns="">
+      <p:transition spd="med">
+        <p:fade/>
+      </p:transition>
+    </mc:Fallback>
+  </mc:AlternateContent>
+</p:sld>
+</file>
+
+<file path=ppt/slides/slide22.xml><?xml version="1.0" encoding="utf-8"?>
+<p:sld xmlns:a="http://schemas.openxmlformats.org/drawingml/2006/main" xmlns:r="http://schemas.openxmlformats.org/officeDocument/2006/relationships" xmlns:p="http://schemas.openxmlformats.org/presentationml/2006/main">
+  <p:cSld>
+    <p:spTree>
+      <p:nvGrpSpPr>
+        <p:cNvPr id="1" name=""/>
+        <p:cNvGrpSpPr/>
+        <p:nvPr/>
+      </p:nvGrpSpPr>
+      <p:grpSpPr>
+        <a:xfrm>
+          <a:off x="0" y="0"/>
+          <a:ext cx="0" cy="0"/>
+          <a:chOff x="0" y="0"/>
+          <a:chExt cx="0" cy="0"/>
+        </a:xfrm>
+      </p:grpSpPr>
+      <p:sp>
+        <p:nvSpPr>
+          <p:cNvPr id="4" name="Title 3"/>
+          <p:cNvSpPr>
+            <a:spLocks noGrp="1"/>
+          </p:cNvSpPr>
+          <p:nvPr>
+            <p:ph type="ctrTitle"/>
+          </p:nvPr>
+        </p:nvSpPr>
+        <p:spPr/>
+        <p:txBody>
+          <a:bodyPr>
+            <a:normAutofit/>
+          </a:bodyPr>
+          <a:lstStyle/>
+          <a:p>
+            <a:pPr algn="ctr"/>
+            <a:r>
+              <a:rPr lang="zh-CN" altLang="en-US" sz="4800" dirty="0">
+                <a:latin typeface="华文隶书" panose="02010800040101010101" pitchFamily="2" charset="-122"/>
+                <a:ea typeface="华文隶书" panose="02010800040101010101" pitchFamily="2" charset="-122"/>
+              </a:rPr>
+              <a:t>让</a:t>
+            </a:r>
+            <a:r>
+              <a:rPr lang="en-US" altLang="zh-CN" sz="4800" dirty="0">
+                <a:latin typeface="华文隶书" panose="02010800040101010101" pitchFamily="2" charset="-122"/>
+                <a:ea typeface="华文隶书" panose="02010800040101010101" pitchFamily="2" charset="-122"/>
+              </a:rPr>
+              <a:t>Python</a:t>
+            </a:r>
+            <a:r>
+              <a:rPr lang="zh-CN" altLang="en-US" sz="4800" dirty="0">
+                <a:latin typeface="华文隶书" panose="02010800040101010101" pitchFamily="2" charset="-122"/>
+                <a:ea typeface="华文隶书" panose="02010800040101010101" pitchFamily="2" charset="-122"/>
+              </a:rPr>
+              <a:t>遇上</a:t>
+            </a:r>
+            <a:r>
+              <a:rPr lang="en-US" altLang="zh-CN" sz="4800" dirty="0">
+                <a:latin typeface="华文隶书" panose="02010800040101010101" pitchFamily="2" charset="-122"/>
+                <a:ea typeface="华文隶书" panose="02010800040101010101" pitchFamily="2" charset="-122"/>
+              </a:rPr>
+              <a:t>Office</a:t>
+            </a:r>
+            <a:br>
+              <a:rPr lang="en-US" altLang="zh-CN" sz="4800" dirty="0">
+                <a:latin typeface="华文隶书" panose="02010800040101010101" pitchFamily="2" charset="-122"/>
+                <a:ea typeface="华文隶书" panose="02010800040101010101" pitchFamily="2" charset="-122"/>
+              </a:rPr>
+            </a:br>
+            <a:br>
+              <a:rPr lang="en-US" altLang="zh-CN" sz="4800" dirty="0">
+                <a:latin typeface="华文隶书" panose="02010800040101010101" pitchFamily="2" charset="-122"/>
+                <a:ea typeface="华文隶书" panose="02010800040101010101" pitchFamily="2" charset="-122"/>
+              </a:rPr>
+            </a:br>
+            <a:r>
+              <a:rPr lang="en-US" altLang="zh-CN" sz="4800" dirty="0">
+                <a:latin typeface="华文隶书" panose="02010800040101010101" pitchFamily="2" charset="-122"/>
+                <a:ea typeface="华文隶书" panose="02010800040101010101" pitchFamily="2" charset="-122"/>
+              </a:rPr>
+              <a:t>(Python with Office)</a:t>
+            </a:r>
+            <a:endParaRPr lang="en-US" sz="4800" dirty="0">
+              <a:latin typeface="华文隶书" panose="02010800040101010101" pitchFamily="2" charset="-122"/>
+              <a:ea typeface="华文隶书" panose="02010800040101010101" pitchFamily="2" charset="-122"/>
+            </a:endParaRPr>
+          </a:p>
+        </p:txBody>
+      </p:sp>
+      <p:sp>
+        <p:nvSpPr>
+          <p:cNvPr id="3" name="Content Placeholder 2"/>
+          <p:cNvSpPr>
+            <a:spLocks noGrp="1"/>
+          </p:cNvSpPr>
+          <p:nvPr>
+            <p:ph type="subTitle" idx="1"/>
+          </p:nvPr>
+        </p:nvSpPr>
+        <p:spPr>
+          <a:xfrm>
+            <a:off x="549796" y="3403600"/>
+            <a:ext cx="5544617" cy="2185640"/>
+          </a:xfrm>
+        </p:spPr>
+        <p:txBody>
+          <a:bodyPr>
+            <a:normAutofit/>
+          </a:bodyPr>
+          <a:lstStyle/>
+          <a:p>
+            <a:r>
+              <a:rPr lang="en-US" sz="2800" dirty="0">
+                <a:latin typeface="ADLaM Display" panose="020F0502020204030204" pitchFamily="2" charset="0"/>
+                <a:ea typeface="ADLaM Display" panose="020F0502020204030204" pitchFamily="2" charset="0"/>
+                <a:cs typeface="ADLaM Display" panose="020F0502020204030204" pitchFamily="2" charset="0"/>
+              </a:rPr>
+              <a:t>Chapter 5 Other Knowledge</a:t>
+            </a:r>
+          </a:p>
+          <a:p>
+            <a:r>
+              <a:rPr lang="en-US" sz="2800" dirty="0">
+                <a:latin typeface="ADLaM Display" panose="020F0502020204030204" pitchFamily="2" charset="0"/>
+                <a:ea typeface="ADLaM Display" panose="020F0502020204030204" pitchFamily="2" charset="0"/>
+                <a:cs typeface="ADLaM Display" panose="020F0502020204030204" pitchFamily="2" charset="0"/>
+              </a:rPr>
+              <a:t>5.1 Program Exceptions</a:t>
+            </a:r>
+          </a:p>
+          <a:p>
+            <a:r>
+              <a:rPr lang="zh-CN" altLang="en-US" sz="2800" dirty="0">
+                <a:latin typeface="ADLaM Display" panose="020F0502020204030204" pitchFamily="2" charset="0"/>
+                <a:ea typeface="ADLaM Display" panose="020F0502020204030204" pitchFamily="2" charset="0"/>
+                <a:cs typeface="ADLaM Display" panose="020F0502020204030204" pitchFamily="2" charset="0"/>
+              </a:rPr>
+              <a:t>第五章 其他知识点</a:t>
+            </a:r>
+            <a:endParaRPr lang="en-US" altLang="zh-CN" sz="2800" dirty="0">
+              <a:latin typeface="ADLaM Display" panose="020F0502020204030204" pitchFamily="2" charset="0"/>
+              <a:ea typeface="ADLaM Display" panose="020F0502020204030204" pitchFamily="2" charset="0"/>
+              <a:cs typeface="ADLaM Display" panose="020F0502020204030204" pitchFamily="2" charset="0"/>
+            </a:endParaRPr>
+          </a:p>
+          <a:p>
+            <a:r>
+              <a:rPr lang="en-US" altLang="zh-CN" sz="2800" dirty="0">
+                <a:latin typeface="ADLaM Display" panose="020F0502020204030204" pitchFamily="2" charset="0"/>
+                <a:ea typeface="ADLaM Display" panose="020F0502020204030204" pitchFamily="2" charset="0"/>
+                <a:cs typeface="ADLaM Display" panose="020F0502020204030204" pitchFamily="2" charset="0"/>
+              </a:rPr>
+              <a:t>5.1 </a:t>
+            </a:r>
+            <a:r>
+              <a:rPr lang="zh-CN" altLang="en-US" sz="2800" dirty="0">
+                <a:latin typeface="ADLaM Display" panose="020F0502020204030204" pitchFamily="2" charset="0"/>
+                <a:ea typeface="ADLaM Display" panose="020F0502020204030204" pitchFamily="2" charset="0"/>
+                <a:cs typeface="ADLaM Display" panose="020F0502020204030204" pitchFamily="2" charset="0"/>
+              </a:rPr>
+              <a:t>程序异常</a:t>
+            </a:r>
+            <a:endParaRPr lang="en-US" altLang="zh-CN" sz="2800" dirty="0">
+              <a:latin typeface="ADLaM Display" panose="020F0502020204030204" pitchFamily="2" charset="0"/>
+              <a:ea typeface="ADLaM Display" panose="020F0502020204030204" pitchFamily="2" charset="0"/>
+              <a:cs typeface="ADLaM Display" panose="020F0502020204030204" pitchFamily="2" charset="0"/>
+            </a:endParaRPr>
+          </a:p>
+        </p:txBody>
+      </p:sp>
+      <p:pic>
+        <p:nvPicPr>
+          <p:cNvPr id="5" name="Picture 4">
+            <a:extLst>
+              <a:ext uri="{FF2B5EF4-FFF2-40B4-BE49-F238E27FC236}">
+                <a16:creationId xmlns:a16="http://schemas.microsoft.com/office/drawing/2014/main" id="{4AD8B85C-B359-195F-B78C-C879AB7840B1}"/>
+              </a:ext>
+            </a:extLst>
+          </p:cNvPr>
+          <p:cNvPicPr>
+            <a:picLocks noChangeAspect="1"/>
+          </p:cNvPicPr>
+          <p:nvPr/>
+        </p:nvPicPr>
+        <p:blipFill>
+          <a:blip r:embed="rId3"/>
+          <a:stretch>
+            <a:fillRect/>
+          </a:stretch>
+        </p:blipFill>
+        <p:spPr>
+          <a:xfrm>
+            <a:off x="57601" y="1189856"/>
+            <a:ext cx="1068259" cy="1556792"/>
+          </a:xfrm>
+          <a:prstGeom prst="rect">
+            <a:avLst/>
+          </a:prstGeom>
+          <a:ln>
+            <a:noFill/>
+          </a:ln>
+          <a:effectLst>
+            <a:outerShdw blurRad="292100" dist="139700" dir="2700000" algn="tl" rotWithShape="0">
+              <a:srgbClr val="333333">
+                <a:alpha val="65000"/>
+              </a:srgbClr>
+            </a:outerShdw>
+          </a:effectLst>
+        </p:spPr>
+      </p:pic>
+      <p:sp>
+        <p:nvSpPr>
+          <p:cNvPr id="2" name="TextBox 1">
+            <a:extLst>
+              <a:ext uri="{FF2B5EF4-FFF2-40B4-BE49-F238E27FC236}">
+                <a16:creationId xmlns:a16="http://schemas.microsoft.com/office/drawing/2014/main" id="{CAB2C784-DE74-68FC-7A84-3E6C5D164315}"/>
+              </a:ext>
+            </a:extLst>
+          </p:cNvPr>
+          <p:cNvSpPr txBox="1"/>
+          <p:nvPr/>
+        </p:nvSpPr>
+        <p:spPr>
+          <a:xfrm>
+            <a:off x="405780" y="5722972"/>
+            <a:ext cx="7951216" cy="523220"/>
+          </a:xfrm>
+          <a:prstGeom prst="rect">
+            <a:avLst/>
+          </a:prstGeom>
+          <a:solidFill>
+            <a:schemeClr val="bg1">
+              <a:lumMod val="95000"/>
+            </a:schemeClr>
+          </a:solidFill>
+          <a:ln>
+            <a:solidFill>
+              <a:schemeClr val="bg2"/>
+            </a:solidFill>
+          </a:ln>
+        </p:spPr>
+        <p:txBody>
+          <a:bodyPr wrap="none" rtlCol="0" anchor="ctr" anchorCtr="1">
+            <a:spAutoFit/>
+          </a:bodyPr>
+          <a:lstStyle/>
+          <a:p>
+            <a:r>
+              <a:rPr lang="en-US" sz="2800" dirty="0">
+                <a:hlinkClick r:id="rId4"/>
+              </a:rPr>
+              <a:t>https://github.com/yasenstar/python_with_office</a:t>
+            </a:r>
+            <a:endParaRPr lang="en-US" sz="2800" dirty="0"/>
+          </a:p>
+        </p:txBody>
+      </p:sp>
+      <p:sp>
+        <p:nvSpPr>
+          <p:cNvPr id="9" name="TextBox 8">
+            <a:extLst>
+              <a:ext uri="{FF2B5EF4-FFF2-40B4-BE49-F238E27FC236}">
+                <a16:creationId xmlns:a16="http://schemas.microsoft.com/office/drawing/2014/main" id="{C25C84F5-3AA3-A068-7E2F-9123CA5A7D16}"/>
+              </a:ext>
+            </a:extLst>
+          </p:cNvPr>
+          <p:cNvSpPr txBox="1"/>
+          <p:nvPr/>
+        </p:nvSpPr>
+        <p:spPr>
+          <a:xfrm>
+            <a:off x="405780" y="6246192"/>
+            <a:ext cx="7951216" cy="523220"/>
+          </a:xfrm>
+          <a:prstGeom prst="rect">
+            <a:avLst/>
+          </a:prstGeom>
+          <a:solidFill>
+            <a:schemeClr val="bg1">
+              <a:lumMod val="95000"/>
+            </a:schemeClr>
+          </a:solidFill>
+          <a:ln>
+            <a:solidFill>
+              <a:schemeClr val="bg2"/>
+            </a:solidFill>
+          </a:ln>
+        </p:spPr>
+        <p:txBody>
+          <a:bodyPr wrap="square" rtlCol="0" anchor="ctr" anchorCtr="1">
+            <a:spAutoFit/>
+          </a:bodyPr>
+          <a:lstStyle/>
+          <a:p>
+            <a:r>
+              <a:rPr lang="en-US" sz="2800" dirty="0">
+                <a:hlinkClick r:id="rId5"/>
+              </a:rPr>
+              <a:t>https://gitee.com/yasenstar/python_with_office</a:t>
+            </a:r>
+            <a:endParaRPr lang="en-US" sz="2800" dirty="0"/>
+          </a:p>
+        </p:txBody>
+      </p:sp>
+      <p:pic>
+        <p:nvPicPr>
+          <p:cNvPr id="11" name="Picture 10">
+            <a:extLst>
+              <a:ext uri="{FF2B5EF4-FFF2-40B4-BE49-F238E27FC236}">
+                <a16:creationId xmlns:a16="http://schemas.microsoft.com/office/drawing/2014/main" id="{B5A918F3-3DB0-2784-5BB2-A5D055C9C83E}"/>
+              </a:ext>
+            </a:extLst>
+          </p:cNvPr>
+          <p:cNvPicPr>
+            <a:picLocks noChangeAspect="1"/>
+          </p:cNvPicPr>
+          <p:nvPr/>
+        </p:nvPicPr>
+        <p:blipFill>
+          <a:blip r:embed="rId6"/>
+          <a:stretch>
+            <a:fillRect/>
+          </a:stretch>
+        </p:blipFill>
+        <p:spPr>
+          <a:xfrm>
+            <a:off x="5950396" y="1858440"/>
+            <a:ext cx="5861779" cy="3720256"/>
+          </a:xfrm>
+          <a:prstGeom prst="rect">
+            <a:avLst/>
+          </a:prstGeom>
+          <a:ln>
+            <a:noFill/>
+          </a:ln>
+          <a:effectLst>
+            <a:outerShdw blurRad="292100" dist="139700" dir="2700000" algn="tl" rotWithShape="0">
+              <a:srgbClr val="333333">
+                <a:alpha val="65000"/>
+              </a:srgbClr>
+            </a:outerShdw>
+          </a:effectLst>
+        </p:spPr>
+      </p:pic>
+    </p:spTree>
+    <p:extLst>
+      <p:ext uri="{BB962C8B-B14F-4D97-AF65-F5344CB8AC3E}">
+        <p14:creationId xmlns:p14="http://schemas.microsoft.com/office/powerpoint/2010/main" val="1253914409"/>
+      </p:ext>
+    </p:extLst>
+  </p:cSld>
+  <p:clrMapOvr>
+    <a:masterClrMapping/>
+  </p:clrMapOvr>
+  <mc:AlternateContent xmlns:mc="http://schemas.openxmlformats.org/markup-compatibility/2006" xmlns:p14="http://schemas.microsoft.com/office/powerpoint/2010/main">
+    <mc:Choice Requires="p14">
+      <p:transition spd="med" p14:dur="700">
+        <p:fade/>
+      </p:transition>
+    </mc:Choice>
+    <mc:Fallback xmlns="">
+      <p:transition spd="med">
+        <p:fade/>
+      </p:transition>
+    </mc:Fallback>
+  </mc:AlternateContent>
+</p:sld>
+</file>
+
+<file path=ppt/slides/slide23.xml><?xml version="1.0" encoding="utf-8"?>
+<p:sld xmlns:a="http://schemas.openxmlformats.org/drawingml/2006/main" xmlns:r="http://schemas.openxmlformats.org/officeDocument/2006/relationships" xmlns:p="http://schemas.openxmlformats.org/presentationml/2006/main">
+  <p:cSld>
+    <p:spTree>
+      <p:nvGrpSpPr>
+        <p:cNvPr id="1" name=""/>
+        <p:cNvGrpSpPr/>
+        <p:nvPr/>
+      </p:nvGrpSpPr>
+      <p:grpSpPr>
+        <a:xfrm>
+          <a:off x="0" y="0"/>
+          <a:ext cx="0" cy="0"/>
+          <a:chOff x="0" y="0"/>
+          <a:chExt cx="0" cy="0"/>
+        </a:xfrm>
+      </p:grpSpPr>
+      <p:sp>
+        <p:nvSpPr>
+          <p:cNvPr id="4" name="Title 3"/>
+          <p:cNvSpPr>
+            <a:spLocks noGrp="1"/>
+          </p:cNvSpPr>
+          <p:nvPr>
+            <p:ph type="ctrTitle"/>
+          </p:nvPr>
+        </p:nvSpPr>
+        <p:spPr/>
+        <p:txBody>
+          <a:bodyPr>
+            <a:normAutofit/>
+          </a:bodyPr>
+          <a:lstStyle/>
+          <a:p>
+            <a:pPr algn="ctr"/>
+            <a:r>
+              <a:rPr lang="zh-CN" altLang="en-US" sz="4800" dirty="0">
+                <a:latin typeface="华文隶书" panose="02010800040101010101" pitchFamily="2" charset="-122"/>
+                <a:ea typeface="华文隶书" panose="02010800040101010101" pitchFamily="2" charset="-122"/>
+              </a:rPr>
+              <a:t>让</a:t>
+            </a:r>
+            <a:r>
+              <a:rPr lang="en-US" altLang="zh-CN" sz="4800" dirty="0">
+                <a:latin typeface="华文隶书" panose="02010800040101010101" pitchFamily="2" charset="-122"/>
+                <a:ea typeface="华文隶书" panose="02010800040101010101" pitchFamily="2" charset="-122"/>
+              </a:rPr>
+              <a:t>Python</a:t>
+            </a:r>
+            <a:r>
+              <a:rPr lang="zh-CN" altLang="en-US" sz="4800" dirty="0">
+                <a:latin typeface="华文隶书" panose="02010800040101010101" pitchFamily="2" charset="-122"/>
+                <a:ea typeface="华文隶书" panose="02010800040101010101" pitchFamily="2" charset="-122"/>
+              </a:rPr>
+              <a:t>遇上</a:t>
+            </a:r>
+            <a:r>
+              <a:rPr lang="en-US" altLang="zh-CN" sz="4800" dirty="0">
+                <a:latin typeface="华文隶书" panose="02010800040101010101" pitchFamily="2" charset="-122"/>
+                <a:ea typeface="华文隶书" panose="02010800040101010101" pitchFamily="2" charset="-122"/>
+              </a:rPr>
+              <a:t>Office</a:t>
+            </a:r>
+            <a:br>
+              <a:rPr lang="en-US" altLang="zh-CN" sz="4800" dirty="0">
+                <a:latin typeface="华文隶书" panose="02010800040101010101" pitchFamily="2" charset="-122"/>
+                <a:ea typeface="华文隶书" panose="02010800040101010101" pitchFamily="2" charset="-122"/>
+              </a:rPr>
+            </a:br>
+            <a:br>
+              <a:rPr lang="en-US" altLang="zh-CN" sz="4800" dirty="0">
+                <a:latin typeface="华文隶书" panose="02010800040101010101" pitchFamily="2" charset="-122"/>
+                <a:ea typeface="华文隶书" panose="02010800040101010101" pitchFamily="2" charset="-122"/>
+              </a:rPr>
+            </a:br>
+            <a:r>
+              <a:rPr lang="en-US" altLang="zh-CN" sz="4800" dirty="0">
+                <a:latin typeface="华文隶书" panose="02010800040101010101" pitchFamily="2" charset="-122"/>
+                <a:ea typeface="华文隶书" panose="02010800040101010101" pitchFamily="2" charset="-122"/>
+              </a:rPr>
+              <a:t>(Python with Office)</a:t>
+            </a:r>
+            <a:endParaRPr lang="en-US" sz="4800" dirty="0">
+              <a:latin typeface="华文隶书" panose="02010800040101010101" pitchFamily="2" charset="-122"/>
+              <a:ea typeface="华文隶书" panose="02010800040101010101" pitchFamily="2" charset="-122"/>
+            </a:endParaRPr>
+          </a:p>
+        </p:txBody>
+      </p:sp>
+      <p:sp>
+        <p:nvSpPr>
+          <p:cNvPr id="3" name="Content Placeholder 2"/>
+          <p:cNvSpPr>
+            <a:spLocks noGrp="1"/>
+          </p:cNvSpPr>
+          <p:nvPr>
+            <p:ph type="subTitle" idx="1"/>
+          </p:nvPr>
+        </p:nvSpPr>
+        <p:spPr>
+          <a:xfrm>
+            <a:off x="549796" y="3403600"/>
+            <a:ext cx="5544617" cy="2185640"/>
+          </a:xfrm>
+        </p:spPr>
+        <p:txBody>
+          <a:bodyPr>
+            <a:normAutofit/>
+          </a:bodyPr>
+          <a:lstStyle/>
+          <a:p>
+            <a:r>
+              <a:rPr lang="en-US" sz="2800" dirty="0">
+                <a:latin typeface="ADLaM Display" panose="020F0502020204030204" pitchFamily="2" charset="0"/>
+                <a:ea typeface="ADLaM Display" panose="020F0502020204030204" pitchFamily="2" charset="0"/>
+                <a:cs typeface="ADLaM Display" panose="020F0502020204030204" pitchFamily="2" charset="0"/>
+              </a:rPr>
+              <a:t>Chapter 5 Other Knowledge</a:t>
+            </a:r>
+          </a:p>
+          <a:p>
+            <a:r>
+              <a:rPr lang="en-US" sz="2800" dirty="0">
+                <a:latin typeface="ADLaM Display" panose="020F0502020204030204" pitchFamily="2" charset="0"/>
+                <a:ea typeface="ADLaM Display" panose="020F0502020204030204" pitchFamily="2" charset="0"/>
+                <a:cs typeface="ADLaM Display" panose="020F0502020204030204" pitchFamily="2" charset="0"/>
+              </a:rPr>
+              <a:t>5.2 File input/output</a:t>
+            </a:r>
+          </a:p>
+          <a:p>
+            <a:r>
+              <a:rPr lang="zh-CN" altLang="en-US" sz="2800" dirty="0">
+                <a:latin typeface="ADLaM Display" panose="020F0502020204030204" pitchFamily="2" charset="0"/>
+                <a:ea typeface="ADLaM Display" panose="020F0502020204030204" pitchFamily="2" charset="0"/>
+                <a:cs typeface="ADLaM Display" panose="020F0502020204030204" pitchFamily="2" charset="0"/>
+              </a:rPr>
+              <a:t>第五章 其他知识点</a:t>
+            </a:r>
+            <a:endParaRPr lang="en-US" altLang="zh-CN" sz="2800" dirty="0">
+              <a:latin typeface="ADLaM Display" panose="020F0502020204030204" pitchFamily="2" charset="0"/>
+              <a:ea typeface="ADLaM Display" panose="020F0502020204030204" pitchFamily="2" charset="0"/>
+              <a:cs typeface="ADLaM Display" panose="020F0502020204030204" pitchFamily="2" charset="0"/>
+            </a:endParaRPr>
+          </a:p>
+          <a:p>
+            <a:r>
+              <a:rPr lang="en-US" altLang="zh-CN" sz="2800" dirty="0">
+                <a:latin typeface="ADLaM Display" panose="020F0502020204030204" pitchFamily="2" charset="0"/>
+                <a:ea typeface="ADLaM Display" panose="020F0502020204030204" pitchFamily="2" charset="0"/>
+                <a:cs typeface="ADLaM Display" panose="020F0502020204030204" pitchFamily="2" charset="0"/>
+              </a:rPr>
+              <a:t>5.2 </a:t>
+            </a:r>
+            <a:r>
+              <a:rPr lang="zh-CN" altLang="en-US" sz="2800" dirty="0">
+                <a:latin typeface="ADLaM Display" panose="020F0502020204030204" pitchFamily="2" charset="0"/>
+                <a:ea typeface="ADLaM Display" panose="020F0502020204030204" pitchFamily="2" charset="0"/>
+                <a:cs typeface="ADLaM Display" panose="020F0502020204030204" pitchFamily="2" charset="0"/>
+              </a:rPr>
+              <a:t>文件读写</a:t>
+            </a:r>
+            <a:endParaRPr lang="en-US" altLang="zh-CN" sz="2800" dirty="0">
+              <a:latin typeface="ADLaM Display" panose="020F0502020204030204" pitchFamily="2" charset="0"/>
+              <a:ea typeface="ADLaM Display" panose="020F0502020204030204" pitchFamily="2" charset="0"/>
+              <a:cs typeface="ADLaM Display" panose="020F0502020204030204" pitchFamily="2" charset="0"/>
+            </a:endParaRPr>
+          </a:p>
+        </p:txBody>
+      </p:sp>
+      <p:pic>
+        <p:nvPicPr>
+          <p:cNvPr id="5" name="Picture 4">
+            <a:extLst>
+              <a:ext uri="{FF2B5EF4-FFF2-40B4-BE49-F238E27FC236}">
+                <a16:creationId xmlns:a16="http://schemas.microsoft.com/office/drawing/2014/main" id="{4AD8B85C-B359-195F-B78C-C879AB7840B1}"/>
+              </a:ext>
+            </a:extLst>
+          </p:cNvPr>
+          <p:cNvPicPr>
+            <a:picLocks noChangeAspect="1"/>
+          </p:cNvPicPr>
+          <p:nvPr/>
+        </p:nvPicPr>
+        <p:blipFill>
+          <a:blip r:embed="rId3"/>
+          <a:stretch>
+            <a:fillRect/>
+          </a:stretch>
+        </p:blipFill>
+        <p:spPr>
+          <a:xfrm>
+            <a:off x="57601" y="1189856"/>
+            <a:ext cx="1068259" cy="1556792"/>
+          </a:xfrm>
+          <a:prstGeom prst="rect">
+            <a:avLst/>
+          </a:prstGeom>
+          <a:ln>
+            <a:noFill/>
+          </a:ln>
+          <a:effectLst>
+            <a:outerShdw blurRad="292100" dist="139700" dir="2700000" algn="tl" rotWithShape="0">
+              <a:srgbClr val="333333">
+                <a:alpha val="65000"/>
+              </a:srgbClr>
+            </a:outerShdw>
+          </a:effectLst>
+        </p:spPr>
+      </p:pic>
+      <p:sp>
+        <p:nvSpPr>
+          <p:cNvPr id="2" name="TextBox 1">
+            <a:extLst>
+              <a:ext uri="{FF2B5EF4-FFF2-40B4-BE49-F238E27FC236}">
+                <a16:creationId xmlns:a16="http://schemas.microsoft.com/office/drawing/2014/main" id="{CAB2C784-DE74-68FC-7A84-3E6C5D164315}"/>
+              </a:ext>
+            </a:extLst>
+          </p:cNvPr>
+          <p:cNvSpPr txBox="1"/>
+          <p:nvPr/>
+        </p:nvSpPr>
+        <p:spPr>
+          <a:xfrm>
+            <a:off x="405780" y="5722972"/>
+            <a:ext cx="7951216" cy="523220"/>
+          </a:xfrm>
+          <a:prstGeom prst="rect">
+            <a:avLst/>
+          </a:prstGeom>
+          <a:solidFill>
+            <a:schemeClr val="bg1">
+              <a:lumMod val="95000"/>
+            </a:schemeClr>
+          </a:solidFill>
+          <a:ln>
+            <a:solidFill>
+              <a:schemeClr val="bg2"/>
+            </a:solidFill>
+          </a:ln>
+        </p:spPr>
+        <p:txBody>
+          <a:bodyPr wrap="none" rtlCol="0" anchor="ctr" anchorCtr="1">
+            <a:spAutoFit/>
+          </a:bodyPr>
+          <a:lstStyle/>
+          <a:p>
+            <a:r>
+              <a:rPr lang="en-US" sz="2800" dirty="0">
+                <a:hlinkClick r:id="rId4"/>
+              </a:rPr>
+              <a:t>https://github.com/yasenstar/python_with_office</a:t>
+            </a:r>
+            <a:endParaRPr lang="en-US" sz="2800" dirty="0"/>
+          </a:p>
+        </p:txBody>
+      </p:sp>
+      <p:sp>
+        <p:nvSpPr>
+          <p:cNvPr id="9" name="TextBox 8">
+            <a:extLst>
+              <a:ext uri="{FF2B5EF4-FFF2-40B4-BE49-F238E27FC236}">
+                <a16:creationId xmlns:a16="http://schemas.microsoft.com/office/drawing/2014/main" id="{C25C84F5-3AA3-A068-7E2F-9123CA5A7D16}"/>
+              </a:ext>
+            </a:extLst>
+          </p:cNvPr>
+          <p:cNvSpPr txBox="1"/>
+          <p:nvPr/>
+        </p:nvSpPr>
+        <p:spPr>
+          <a:xfrm>
+            <a:off x="405780" y="6246192"/>
+            <a:ext cx="7951216" cy="523220"/>
+          </a:xfrm>
+          <a:prstGeom prst="rect">
+            <a:avLst/>
+          </a:prstGeom>
+          <a:solidFill>
+            <a:schemeClr val="bg1">
+              <a:lumMod val="95000"/>
+            </a:schemeClr>
+          </a:solidFill>
+          <a:ln>
+            <a:solidFill>
+              <a:schemeClr val="bg2"/>
+            </a:solidFill>
+          </a:ln>
+        </p:spPr>
+        <p:txBody>
+          <a:bodyPr wrap="square" rtlCol="0" anchor="ctr" anchorCtr="1">
+            <a:spAutoFit/>
+          </a:bodyPr>
+          <a:lstStyle/>
+          <a:p>
+            <a:r>
+              <a:rPr lang="en-US" sz="2800" dirty="0">
+                <a:hlinkClick r:id="rId5"/>
+              </a:rPr>
+              <a:t>https://gitee.com/yasenstar/python_with_office</a:t>
+            </a:r>
+            <a:endParaRPr lang="en-US" sz="2800" dirty="0"/>
+          </a:p>
+        </p:txBody>
+      </p:sp>
+      <p:pic>
+        <p:nvPicPr>
+          <p:cNvPr id="7" name="Picture 6">
+            <a:extLst>
+              <a:ext uri="{FF2B5EF4-FFF2-40B4-BE49-F238E27FC236}">
+                <a16:creationId xmlns:a16="http://schemas.microsoft.com/office/drawing/2014/main" id="{B0EE15D0-3BDF-A4B2-3CD1-F3BC57007058}"/>
+              </a:ext>
+            </a:extLst>
+          </p:cNvPr>
+          <p:cNvPicPr>
+            <a:picLocks noChangeAspect="1"/>
+          </p:cNvPicPr>
+          <p:nvPr/>
+        </p:nvPicPr>
+        <p:blipFill>
+          <a:blip r:embed="rId6"/>
+          <a:stretch>
+            <a:fillRect/>
+          </a:stretch>
+        </p:blipFill>
+        <p:spPr>
+          <a:xfrm>
+            <a:off x="6166420" y="966004"/>
+            <a:ext cx="5801841" cy="4584171"/>
+          </a:xfrm>
+          <a:prstGeom prst="rect">
+            <a:avLst/>
+          </a:prstGeom>
+          <a:ln>
+            <a:noFill/>
+          </a:ln>
+          <a:effectLst>
+            <a:outerShdw blurRad="292100" dist="139700" dir="2700000" algn="tl" rotWithShape="0">
+              <a:srgbClr val="333333">
+                <a:alpha val="65000"/>
+              </a:srgbClr>
+            </a:outerShdw>
+          </a:effectLst>
+        </p:spPr>
+      </p:pic>
+    </p:spTree>
+    <p:extLst>
+      <p:ext uri="{BB962C8B-B14F-4D97-AF65-F5344CB8AC3E}">
+        <p14:creationId xmlns:p14="http://schemas.microsoft.com/office/powerpoint/2010/main" val="1374689778"/>
+      </p:ext>
+    </p:extLst>
+  </p:cSld>
+  <p:clrMapOvr>
+    <a:masterClrMapping/>
+  </p:clrMapOvr>
+  <mc:AlternateContent xmlns:mc="http://schemas.openxmlformats.org/markup-compatibility/2006" xmlns:p14="http://schemas.microsoft.com/office/powerpoint/2010/main">
+    <mc:Choice Requires="p14">
+      <p:transition spd="med" p14:dur="700">
+        <p:fade/>
+      </p:transition>
+    </mc:Choice>
+    <mc:Fallback xmlns="">
+      <p:transition spd="med">
+        <p:fade/>
+      </p:transition>
+    </mc:Fallback>
+  </mc:AlternateContent>
+</p:sld>
+</file>
+
+<file path=ppt/slides/slide24.xml><?xml version="1.0" encoding="utf-8"?>
+<p:sld xmlns:a="http://schemas.openxmlformats.org/drawingml/2006/main" xmlns:r="http://schemas.openxmlformats.org/officeDocument/2006/relationships" xmlns:p="http://schemas.openxmlformats.org/presentationml/2006/main">
+  <p:cSld>
+    <p:spTree>
+      <p:nvGrpSpPr>
+        <p:cNvPr id="1" name=""/>
+        <p:cNvGrpSpPr/>
+        <p:nvPr/>
+      </p:nvGrpSpPr>
+      <p:grpSpPr>
+        <a:xfrm>
+          <a:off x="0" y="0"/>
+          <a:ext cx="0" cy="0"/>
+          <a:chOff x="0" y="0"/>
+          <a:chExt cx="0" cy="0"/>
+        </a:xfrm>
+      </p:grpSpPr>
+      <p:sp>
+        <p:nvSpPr>
+          <p:cNvPr id="4" name="Title 3"/>
+          <p:cNvSpPr>
+            <a:spLocks noGrp="1"/>
+          </p:cNvSpPr>
+          <p:nvPr>
+            <p:ph type="ctrTitle"/>
+          </p:nvPr>
+        </p:nvSpPr>
+        <p:spPr/>
+        <p:txBody>
+          <a:bodyPr>
+            <a:normAutofit/>
+          </a:bodyPr>
+          <a:lstStyle/>
+          <a:p>
+            <a:pPr algn="ctr"/>
+            <a:r>
+              <a:rPr lang="zh-CN" altLang="en-US" sz="4800" dirty="0">
+                <a:latin typeface="华文隶书" panose="02010800040101010101" pitchFamily="2" charset="-122"/>
+                <a:ea typeface="华文隶书" panose="02010800040101010101" pitchFamily="2" charset="-122"/>
+              </a:rPr>
+              <a:t>让</a:t>
+            </a:r>
+            <a:r>
+              <a:rPr lang="en-US" altLang="zh-CN" sz="4800" dirty="0">
+                <a:latin typeface="华文隶书" panose="02010800040101010101" pitchFamily="2" charset="-122"/>
+                <a:ea typeface="华文隶书" panose="02010800040101010101" pitchFamily="2" charset="-122"/>
+              </a:rPr>
+              <a:t>Python</a:t>
+            </a:r>
+            <a:r>
+              <a:rPr lang="zh-CN" altLang="en-US" sz="4800" dirty="0">
+                <a:latin typeface="华文隶书" panose="02010800040101010101" pitchFamily="2" charset="-122"/>
+                <a:ea typeface="华文隶书" panose="02010800040101010101" pitchFamily="2" charset="-122"/>
+              </a:rPr>
+              <a:t>遇上</a:t>
+            </a:r>
+            <a:r>
+              <a:rPr lang="en-US" altLang="zh-CN" sz="4800" dirty="0">
+                <a:latin typeface="华文隶书" panose="02010800040101010101" pitchFamily="2" charset="-122"/>
+                <a:ea typeface="华文隶书" panose="02010800040101010101" pitchFamily="2" charset="-122"/>
+              </a:rPr>
+              <a:t>Office</a:t>
+            </a:r>
+            <a:br>
+              <a:rPr lang="en-US" altLang="zh-CN" sz="4800" dirty="0">
+                <a:latin typeface="华文隶书" panose="02010800040101010101" pitchFamily="2" charset="-122"/>
+                <a:ea typeface="华文隶书" panose="02010800040101010101" pitchFamily="2" charset="-122"/>
+              </a:rPr>
+            </a:br>
+            <a:br>
+              <a:rPr lang="en-US" altLang="zh-CN" sz="4800" dirty="0">
+                <a:latin typeface="华文隶书" panose="02010800040101010101" pitchFamily="2" charset="-122"/>
+                <a:ea typeface="华文隶书" panose="02010800040101010101" pitchFamily="2" charset="-122"/>
+              </a:rPr>
+            </a:br>
+            <a:r>
+              <a:rPr lang="en-US" altLang="zh-CN" sz="4800" dirty="0">
+                <a:latin typeface="华文隶书" panose="02010800040101010101" pitchFamily="2" charset="-122"/>
+                <a:ea typeface="华文隶书" panose="02010800040101010101" pitchFamily="2" charset="-122"/>
+              </a:rPr>
+              <a:t>(Python with Office)</a:t>
+            </a:r>
+            <a:endParaRPr lang="en-US" sz="4800" dirty="0">
+              <a:latin typeface="华文隶书" panose="02010800040101010101" pitchFamily="2" charset="-122"/>
+              <a:ea typeface="华文隶书" panose="02010800040101010101" pitchFamily="2" charset="-122"/>
+            </a:endParaRPr>
+          </a:p>
+        </p:txBody>
+      </p:sp>
+      <p:sp>
+        <p:nvSpPr>
+          <p:cNvPr id="3" name="Content Placeholder 2"/>
+          <p:cNvSpPr>
+            <a:spLocks noGrp="1"/>
+          </p:cNvSpPr>
+          <p:nvPr>
+            <p:ph type="subTitle" idx="1"/>
+          </p:nvPr>
+        </p:nvSpPr>
+        <p:spPr>
+          <a:xfrm>
+            <a:off x="549796" y="3403600"/>
+            <a:ext cx="5544617" cy="2185640"/>
+          </a:xfrm>
+        </p:spPr>
+        <p:txBody>
+          <a:bodyPr>
+            <a:normAutofit/>
+          </a:bodyPr>
+          <a:lstStyle/>
+          <a:p>
+            <a:r>
+              <a:rPr lang="en-US" sz="2800" dirty="0">
+                <a:latin typeface="ADLaM Display" panose="020F0502020204030204" pitchFamily="2" charset="0"/>
+                <a:ea typeface="ADLaM Display" panose="020F0502020204030204" pitchFamily="2" charset="0"/>
+                <a:cs typeface="ADLaM Display" panose="020F0502020204030204" pitchFamily="2" charset="0"/>
+              </a:rPr>
+              <a:t>Chapter 5 Other Knowledge</a:t>
+            </a:r>
+          </a:p>
+          <a:p>
+            <a:r>
+              <a:rPr lang="en-US" sz="2800" dirty="0">
+                <a:latin typeface="ADLaM Display" panose="020F0502020204030204" pitchFamily="2" charset="0"/>
+                <a:ea typeface="ADLaM Display" panose="020F0502020204030204" pitchFamily="2" charset="0"/>
+                <a:cs typeface="ADLaM Display" panose="020F0502020204030204" pitchFamily="2" charset="0"/>
+              </a:rPr>
+              <a:t>5.3 Modules and Packages</a:t>
+            </a:r>
+          </a:p>
+          <a:p>
+            <a:r>
+              <a:rPr lang="zh-CN" altLang="en-US" sz="2800" dirty="0">
+                <a:latin typeface="ADLaM Display" panose="020F0502020204030204" pitchFamily="2" charset="0"/>
+                <a:ea typeface="ADLaM Display" panose="020F0502020204030204" pitchFamily="2" charset="0"/>
+                <a:cs typeface="ADLaM Display" panose="020F0502020204030204" pitchFamily="2" charset="0"/>
+              </a:rPr>
+              <a:t>第五章 其他知识点</a:t>
+            </a:r>
+            <a:endParaRPr lang="en-US" altLang="zh-CN" sz="2800" dirty="0">
+              <a:latin typeface="ADLaM Display" panose="020F0502020204030204" pitchFamily="2" charset="0"/>
+              <a:ea typeface="ADLaM Display" panose="020F0502020204030204" pitchFamily="2" charset="0"/>
+              <a:cs typeface="ADLaM Display" panose="020F0502020204030204" pitchFamily="2" charset="0"/>
+            </a:endParaRPr>
+          </a:p>
+          <a:p>
+            <a:r>
+              <a:rPr lang="en-US" altLang="zh-CN" sz="2800" dirty="0">
+                <a:latin typeface="ADLaM Display" panose="020F0502020204030204" pitchFamily="2" charset="0"/>
+                <a:ea typeface="ADLaM Display" panose="020F0502020204030204" pitchFamily="2" charset="0"/>
+                <a:cs typeface="ADLaM Display" panose="020F0502020204030204" pitchFamily="2" charset="0"/>
+              </a:rPr>
+              <a:t>5.3 </a:t>
+            </a:r>
+            <a:r>
+              <a:rPr lang="zh-CN" altLang="en-US" sz="2800" dirty="0">
+                <a:latin typeface="ADLaM Display" panose="020F0502020204030204" pitchFamily="2" charset="0"/>
+                <a:ea typeface="ADLaM Display" panose="020F0502020204030204" pitchFamily="2" charset="0"/>
+                <a:cs typeface="ADLaM Display" panose="020F0502020204030204" pitchFamily="2" charset="0"/>
+              </a:rPr>
+              <a:t>模块和包</a:t>
+            </a:r>
+            <a:endParaRPr lang="en-US" altLang="zh-CN" sz="2800" dirty="0">
+              <a:latin typeface="ADLaM Display" panose="020F0502020204030204" pitchFamily="2" charset="0"/>
+              <a:ea typeface="ADLaM Display" panose="020F0502020204030204" pitchFamily="2" charset="0"/>
+              <a:cs typeface="ADLaM Display" panose="020F0502020204030204" pitchFamily="2" charset="0"/>
+            </a:endParaRPr>
+          </a:p>
+        </p:txBody>
+      </p:sp>
+      <p:pic>
+        <p:nvPicPr>
+          <p:cNvPr id="5" name="Picture 4">
+            <a:extLst>
+              <a:ext uri="{FF2B5EF4-FFF2-40B4-BE49-F238E27FC236}">
+                <a16:creationId xmlns:a16="http://schemas.microsoft.com/office/drawing/2014/main" id="{4AD8B85C-B359-195F-B78C-C879AB7840B1}"/>
+              </a:ext>
+            </a:extLst>
+          </p:cNvPr>
+          <p:cNvPicPr>
+            <a:picLocks noChangeAspect="1"/>
+          </p:cNvPicPr>
+          <p:nvPr/>
+        </p:nvPicPr>
+        <p:blipFill>
+          <a:blip r:embed="rId3"/>
+          <a:stretch>
+            <a:fillRect/>
+          </a:stretch>
+        </p:blipFill>
+        <p:spPr>
+          <a:xfrm>
+            <a:off x="57601" y="1189856"/>
+            <a:ext cx="1068259" cy="1556792"/>
+          </a:xfrm>
+          <a:prstGeom prst="rect">
+            <a:avLst/>
+          </a:prstGeom>
+          <a:ln>
+            <a:noFill/>
+          </a:ln>
+          <a:effectLst>
+            <a:outerShdw blurRad="292100" dist="139700" dir="2700000" algn="tl" rotWithShape="0">
+              <a:srgbClr val="333333">
+                <a:alpha val="65000"/>
+              </a:srgbClr>
+            </a:outerShdw>
+          </a:effectLst>
+        </p:spPr>
+      </p:pic>
+      <p:sp>
+        <p:nvSpPr>
+          <p:cNvPr id="2" name="TextBox 1">
+            <a:extLst>
+              <a:ext uri="{FF2B5EF4-FFF2-40B4-BE49-F238E27FC236}">
+                <a16:creationId xmlns:a16="http://schemas.microsoft.com/office/drawing/2014/main" id="{CAB2C784-DE74-68FC-7A84-3E6C5D164315}"/>
+              </a:ext>
+            </a:extLst>
+          </p:cNvPr>
+          <p:cNvSpPr txBox="1"/>
+          <p:nvPr/>
+        </p:nvSpPr>
+        <p:spPr>
+          <a:xfrm>
+            <a:off x="405780" y="5722972"/>
+            <a:ext cx="7951216" cy="523220"/>
+          </a:xfrm>
+          <a:prstGeom prst="rect">
+            <a:avLst/>
+          </a:prstGeom>
+          <a:solidFill>
+            <a:schemeClr val="bg1">
+              <a:lumMod val="95000"/>
+            </a:schemeClr>
+          </a:solidFill>
+          <a:ln>
+            <a:solidFill>
+              <a:schemeClr val="bg2"/>
+            </a:solidFill>
+          </a:ln>
+        </p:spPr>
+        <p:txBody>
+          <a:bodyPr wrap="none" rtlCol="0" anchor="ctr" anchorCtr="1">
+            <a:spAutoFit/>
+          </a:bodyPr>
+          <a:lstStyle/>
+          <a:p>
+            <a:r>
+              <a:rPr lang="en-US" sz="2800" dirty="0">
+                <a:hlinkClick r:id="rId4"/>
+              </a:rPr>
+              <a:t>https://github.com/yasenstar/python_with_office</a:t>
+            </a:r>
+            <a:endParaRPr lang="en-US" sz="2800" dirty="0"/>
+          </a:p>
+        </p:txBody>
+      </p:sp>
+      <p:sp>
+        <p:nvSpPr>
+          <p:cNvPr id="9" name="TextBox 8">
+            <a:extLst>
+              <a:ext uri="{FF2B5EF4-FFF2-40B4-BE49-F238E27FC236}">
+                <a16:creationId xmlns:a16="http://schemas.microsoft.com/office/drawing/2014/main" id="{C25C84F5-3AA3-A068-7E2F-9123CA5A7D16}"/>
+              </a:ext>
+            </a:extLst>
+          </p:cNvPr>
+          <p:cNvSpPr txBox="1"/>
+          <p:nvPr/>
+        </p:nvSpPr>
+        <p:spPr>
+          <a:xfrm>
+            <a:off x="405780" y="6246192"/>
+            <a:ext cx="7951216" cy="523220"/>
+          </a:xfrm>
+          <a:prstGeom prst="rect">
+            <a:avLst/>
+          </a:prstGeom>
+          <a:solidFill>
+            <a:schemeClr val="bg1">
+              <a:lumMod val="95000"/>
+            </a:schemeClr>
+          </a:solidFill>
+          <a:ln>
+            <a:solidFill>
+              <a:schemeClr val="bg2"/>
+            </a:solidFill>
+          </a:ln>
+        </p:spPr>
+        <p:txBody>
+          <a:bodyPr wrap="square" rtlCol="0" anchor="ctr" anchorCtr="1">
+            <a:spAutoFit/>
+          </a:bodyPr>
+          <a:lstStyle/>
+          <a:p>
+            <a:r>
+              <a:rPr lang="en-US" sz="2800" dirty="0">
+                <a:hlinkClick r:id="rId5"/>
+              </a:rPr>
+              <a:t>https://gitee.com/yasenstar/python_with_office</a:t>
+            </a:r>
+            <a:endParaRPr lang="en-US" sz="2800" dirty="0"/>
+          </a:p>
+        </p:txBody>
+      </p:sp>
+      <p:pic>
+        <p:nvPicPr>
+          <p:cNvPr id="7" name="Picture 6">
+            <a:extLst>
+              <a:ext uri="{FF2B5EF4-FFF2-40B4-BE49-F238E27FC236}">
+                <a16:creationId xmlns:a16="http://schemas.microsoft.com/office/drawing/2014/main" id="{D77DDD71-BE45-B133-1B94-3F08329D60AA}"/>
+              </a:ext>
+            </a:extLst>
+          </p:cNvPr>
+          <p:cNvPicPr>
+            <a:picLocks noChangeAspect="1"/>
+          </p:cNvPicPr>
+          <p:nvPr/>
+        </p:nvPicPr>
+        <p:blipFill>
+          <a:blip r:embed="rId6"/>
+          <a:stretch>
+            <a:fillRect/>
+          </a:stretch>
+        </p:blipFill>
+        <p:spPr>
+          <a:xfrm>
+            <a:off x="6094412" y="1790700"/>
+            <a:ext cx="5544618" cy="3447744"/>
+          </a:xfrm>
+          <a:prstGeom prst="rect">
+            <a:avLst/>
+          </a:prstGeom>
+          <a:ln>
+            <a:noFill/>
+          </a:ln>
+          <a:effectLst>
+            <a:outerShdw blurRad="292100" dist="139700" dir="2700000" algn="tl" rotWithShape="0">
+              <a:srgbClr val="333333">
+                <a:alpha val="65000"/>
+              </a:srgbClr>
+            </a:outerShdw>
+          </a:effectLst>
+        </p:spPr>
+      </p:pic>
+    </p:spTree>
+    <p:extLst>
+      <p:ext uri="{BB962C8B-B14F-4D97-AF65-F5344CB8AC3E}">
+        <p14:creationId xmlns:p14="http://schemas.microsoft.com/office/powerpoint/2010/main" val="1300917695"/>
+      </p:ext>
+    </p:extLst>
+  </p:cSld>
+  <p:clrMapOvr>
+    <a:masterClrMapping/>
+  </p:clrMapOvr>
+  <mc:AlternateContent xmlns:mc="http://schemas.openxmlformats.org/markup-compatibility/2006" xmlns:p14="http://schemas.microsoft.com/office/powerpoint/2010/main">
+    <mc:Choice Requires="p14">
+      <p:transition spd="med" p14:dur="700">
+        <p:fade/>
+      </p:transition>
+    </mc:Choice>
+    <mc:Fallback xmlns="">
+      <p:transition spd="med">
+        <p:fade/>
+      </p:transition>
+    </mc:Fallback>
+  </mc:AlternateContent>
+</p:sld>
+</file>
+
+<file path=ppt/slides/slide25.xml><?xml version="1.0" encoding="utf-8"?>
+<p:sld xmlns:a="http://schemas.openxmlformats.org/drawingml/2006/main" xmlns:r="http://schemas.openxmlformats.org/officeDocument/2006/relationships" xmlns:p="http://schemas.openxmlformats.org/presentationml/2006/main">
+  <p:cSld>
+    <p:spTree>
+      <p:nvGrpSpPr>
+        <p:cNvPr id="1" name=""/>
+        <p:cNvGrpSpPr/>
+        <p:nvPr/>
+      </p:nvGrpSpPr>
+      <p:grpSpPr>
+        <a:xfrm>
+          <a:off x="0" y="0"/>
+          <a:ext cx="0" cy="0"/>
+          <a:chOff x="0" y="0"/>
+          <a:chExt cx="0" cy="0"/>
+        </a:xfrm>
+      </p:grpSpPr>
+      <p:sp>
+        <p:nvSpPr>
+          <p:cNvPr id="4" name="Title 3"/>
+          <p:cNvSpPr>
+            <a:spLocks noGrp="1"/>
+          </p:cNvSpPr>
+          <p:nvPr>
+            <p:ph type="ctrTitle"/>
+          </p:nvPr>
+        </p:nvSpPr>
+        <p:spPr/>
+        <p:txBody>
+          <a:bodyPr>
+            <a:normAutofit/>
+          </a:bodyPr>
+          <a:lstStyle/>
+          <a:p>
+            <a:pPr algn="ctr"/>
+            <a:r>
+              <a:rPr lang="zh-CN" altLang="en-US" sz="4800" dirty="0">
+                <a:latin typeface="华文隶书" panose="02010800040101010101" pitchFamily="2" charset="-122"/>
+                <a:ea typeface="华文隶书" panose="02010800040101010101" pitchFamily="2" charset="-122"/>
+              </a:rPr>
+              <a:t>让</a:t>
+            </a:r>
+            <a:r>
+              <a:rPr lang="en-US" altLang="zh-CN" sz="4800" dirty="0">
+                <a:latin typeface="华文隶书" panose="02010800040101010101" pitchFamily="2" charset="-122"/>
+                <a:ea typeface="华文隶书" panose="02010800040101010101" pitchFamily="2" charset="-122"/>
+              </a:rPr>
+              <a:t>Python</a:t>
+            </a:r>
+            <a:r>
+              <a:rPr lang="zh-CN" altLang="en-US" sz="4800" dirty="0">
+                <a:latin typeface="华文隶书" panose="02010800040101010101" pitchFamily="2" charset="-122"/>
+                <a:ea typeface="华文隶书" panose="02010800040101010101" pitchFamily="2" charset="-122"/>
+              </a:rPr>
+              <a:t>遇上</a:t>
+            </a:r>
+            <a:r>
+              <a:rPr lang="en-US" altLang="zh-CN" sz="4800" dirty="0">
+                <a:latin typeface="华文隶书" panose="02010800040101010101" pitchFamily="2" charset="-122"/>
+                <a:ea typeface="华文隶书" panose="02010800040101010101" pitchFamily="2" charset="-122"/>
+              </a:rPr>
+              <a:t>Office</a:t>
+            </a:r>
+            <a:br>
+              <a:rPr lang="en-US" altLang="zh-CN" sz="4800" dirty="0">
+                <a:latin typeface="华文隶书" panose="02010800040101010101" pitchFamily="2" charset="-122"/>
+                <a:ea typeface="华文隶书" panose="02010800040101010101" pitchFamily="2" charset="-122"/>
+              </a:rPr>
+            </a:br>
+            <a:br>
+              <a:rPr lang="en-US" altLang="zh-CN" sz="4800" dirty="0">
+                <a:latin typeface="华文隶书" panose="02010800040101010101" pitchFamily="2" charset="-122"/>
+                <a:ea typeface="华文隶书" panose="02010800040101010101" pitchFamily="2" charset="-122"/>
+              </a:rPr>
+            </a:br>
+            <a:r>
+              <a:rPr lang="en-US" altLang="zh-CN" sz="4800" dirty="0">
+                <a:latin typeface="华文隶书" panose="02010800040101010101" pitchFamily="2" charset="-122"/>
+                <a:ea typeface="华文隶书" panose="02010800040101010101" pitchFamily="2" charset="-122"/>
+              </a:rPr>
+              <a:t>(Python with Office)</a:t>
+            </a:r>
+            <a:endParaRPr lang="en-US" sz="4800" dirty="0">
+              <a:latin typeface="华文隶书" panose="02010800040101010101" pitchFamily="2" charset="-122"/>
+              <a:ea typeface="华文隶书" panose="02010800040101010101" pitchFamily="2" charset="-122"/>
+            </a:endParaRPr>
+          </a:p>
+        </p:txBody>
+      </p:sp>
+      <p:sp>
+        <p:nvSpPr>
+          <p:cNvPr id="3" name="Content Placeholder 2"/>
+          <p:cNvSpPr>
+            <a:spLocks noGrp="1"/>
+          </p:cNvSpPr>
+          <p:nvPr>
+            <p:ph type="subTitle" idx="1"/>
+          </p:nvPr>
+        </p:nvSpPr>
+        <p:spPr>
+          <a:xfrm>
+            <a:off x="549796" y="3403600"/>
+            <a:ext cx="5544617" cy="2185640"/>
+          </a:xfrm>
+        </p:spPr>
+        <p:txBody>
+          <a:bodyPr>
+            <a:normAutofit/>
+          </a:bodyPr>
+          <a:lstStyle/>
+          <a:p>
+            <a:r>
+              <a:rPr lang="en-US" sz="2800" dirty="0">
+                <a:latin typeface="ADLaM Display" panose="020F0502020204030204" pitchFamily="2" charset="0"/>
+                <a:ea typeface="ADLaM Display" panose="020F0502020204030204" pitchFamily="2" charset="0"/>
+                <a:cs typeface="ADLaM Display" panose="020F0502020204030204" pitchFamily="2" charset="0"/>
+              </a:rPr>
+              <a:t>Chapter 5 Other Knowledge</a:t>
+            </a:r>
+          </a:p>
+          <a:p>
+            <a:r>
+              <a:rPr lang="en-US" sz="2800" dirty="0">
+                <a:latin typeface="ADLaM Display" panose="020F0502020204030204" pitchFamily="2" charset="0"/>
+                <a:ea typeface="ADLaM Display" panose="020F0502020204030204" pitchFamily="2" charset="0"/>
+                <a:cs typeface="ADLaM Display" panose="020F0502020204030204" pitchFamily="2" charset="0"/>
+              </a:rPr>
+              <a:t>5.4 Common Used Modules</a:t>
+            </a:r>
+          </a:p>
+          <a:p>
+            <a:r>
+              <a:rPr lang="zh-CN" altLang="en-US" sz="2800" dirty="0">
+                <a:latin typeface="ADLaM Display" panose="020F0502020204030204" pitchFamily="2" charset="0"/>
+                <a:ea typeface="ADLaM Display" panose="020F0502020204030204" pitchFamily="2" charset="0"/>
+                <a:cs typeface="ADLaM Display" panose="020F0502020204030204" pitchFamily="2" charset="0"/>
+              </a:rPr>
+              <a:t>第五章 其他知识点</a:t>
+            </a:r>
+            <a:endParaRPr lang="en-US" altLang="zh-CN" sz="2800" dirty="0">
+              <a:latin typeface="ADLaM Display" panose="020F0502020204030204" pitchFamily="2" charset="0"/>
+              <a:ea typeface="ADLaM Display" panose="020F0502020204030204" pitchFamily="2" charset="0"/>
+              <a:cs typeface="ADLaM Display" panose="020F0502020204030204" pitchFamily="2" charset="0"/>
+            </a:endParaRPr>
+          </a:p>
+          <a:p>
+            <a:r>
+              <a:rPr lang="en-US" altLang="zh-CN" sz="2800" dirty="0">
+                <a:latin typeface="ADLaM Display" panose="020F0502020204030204" pitchFamily="2" charset="0"/>
+                <a:ea typeface="ADLaM Display" panose="020F0502020204030204" pitchFamily="2" charset="0"/>
+                <a:cs typeface="ADLaM Display" panose="020F0502020204030204" pitchFamily="2" charset="0"/>
+              </a:rPr>
+              <a:t>5.4 </a:t>
+            </a:r>
+            <a:r>
+              <a:rPr lang="zh-CN" altLang="en-US" sz="2800" dirty="0">
+                <a:latin typeface="ADLaM Display" panose="020F0502020204030204" pitchFamily="2" charset="0"/>
+                <a:ea typeface="ADLaM Display" panose="020F0502020204030204" pitchFamily="2" charset="0"/>
+                <a:cs typeface="ADLaM Display" panose="020F0502020204030204" pitchFamily="2" charset="0"/>
+              </a:rPr>
+              <a:t>常用模块</a:t>
+            </a:r>
+            <a:endParaRPr lang="en-US" altLang="zh-CN" sz="2800" dirty="0">
+              <a:latin typeface="ADLaM Display" panose="020F0502020204030204" pitchFamily="2" charset="0"/>
+              <a:ea typeface="ADLaM Display" panose="020F0502020204030204" pitchFamily="2" charset="0"/>
+              <a:cs typeface="ADLaM Display" panose="020F0502020204030204" pitchFamily="2" charset="0"/>
+            </a:endParaRPr>
+          </a:p>
+        </p:txBody>
+      </p:sp>
+      <p:pic>
+        <p:nvPicPr>
+          <p:cNvPr id="5" name="Picture 4">
+            <a:extLst>
+              <a:ext uri="{FF2B5EF4-FFF2-40B4-BE49-F238E27FC236}">
+                <a16:creationId xmlns:a16="http://schemas.microsoft.com/office/drawing/2014/main" id="{4AD8B85C-B359-195F-B78C-C879AB7840B1}"/>
+              </a:ext>
+            </a:extLst>
+          </p:cNvPr>
+          <p:cNvPicPr>
+            <a:picLocks noChangeAspect="1"/>
+          </p:cNvPicPr>
+          <p:nvPr/>
+        </p:nvPicPr>
+        <p:blipFill>
+          <a:blip r:embed="rId3"/>
+          <a:stretch>
+            <a:fillRect/>
+          </a:stretch>
+        </p:blipFill>
+        <p:spPr>
+          <a:xfrm>
+            <a:off x="57601" y="1189856"/>
+            <a:ext cx="1068259" cy="1556792"/>
+          </a:xfrm>
+          <a:prstGeom prst="rect">
+            <a:avLst/>
+          </a:prstGeom>
+          <a:ln>
+            <a:noFill/>
+          </a:ln>
+          <a:effectLst>
+            <a:outerShdw blurRad="292100" dist="139700" dir="2700000" algn="tl" rotWithShape="0">
+              <a:srgbClr val="333333">
+                <a:alpha val="65000"/>
+              </a:srgbClr>
+            </a:outerShdw>
+          </a:effectLst>
+        </p:spPr>
+      </p:pic>
+      <p:sp>
+        <p:nvSpPr>
+          <p:cNvPr id="2" name="TextBox 1">
+            <a:extLst>
+              <a:ext uri="{FF2B5EF4-FFF2-40B4-BE49-F238E27FC236}">
+                <a16:creationId xmlns:a16="http://schemas.microsoft.com/office/drawing/2014/main" id="{CAB2C784-DE74-68FC-7A84-3E6C5D164315}"/>
+              </a:ext>
+            </a:extLst>
+          </p:cNvPr>
+          <p:cNvSpPr txBox="1"/>
+          <p:nvPr/>
+        </p:nvSpPr>
+        <p:spPr>
+          <a:xfrm>
+            <a:off x="405780" y="5722972"/>
+            <a:ext cx="7951216" cy="523220"/>
+          </a:xfrm>
+          <a:prstGeom prst="rect">
+            <a:avLst/>
+          </a:prstGeom>
+          <a:solidFill>
+            <a:schemeClr val="bg1">
+              <a:lumMod val="95000"/>
+            </a:schemeClr>
+          </a:solidFill>
+          <a:ln>
+            <a:solidFill>
+              <a:schemeClr val="bg2"/>
+            </a:solidFill>
+          </a:ln>
+        </p:spPr>
+        <p:txBody>
+          <a:bodyPr wrap="none" rtlCol="0" anchor="ctr" anchorCtr="1">
+            <a:spAutoFit/>
+          </a:bodyPr>
+          <a:lstStyle/>
+          <a:p>
+            <a:r>
+              <a:rPr lang="en-US" sz="2800" dirty="0">
+                <a:hlinkClick r:id="rId4"/>
+              </a:rPr>
+              <a:t>https://github.com/yasenstar/python_with_office</a:t>
+            </a:r>
+            <a:endParaRPr lang="en-US" sz="2800" dirty="0"/>
+          </a:p>
+        </p:txBody>
+      </p:sp>
+      <p:sp>
+        <p:nvSpPr>
+          <p:cNvPr id="9" name="TextBox 8">
+            <a:extLst>
+              <a:ext uri="{FF2B5EF4-FFF2-40B4-BE49-F238E27FC236}">
+                <a16:creationId xmlns:a16="http://schemas.microsoft.com/office/drawing/2014/main" id="{C25C84F5-3AA3-A068-7E2F-9123CA5A7D16}"/>
+              </a:ext>
+            </a:extLst>
+          </p:cNvPr>
+          <p:cNvSpPr txBox="1"/>
+          <p:nvPr/>
+        </p:nvSpPr>
+        <p:spPr>
+          <a:xfrm>
+            <a:off x="405780" y="6246192"/>
+            <a:ext cx="7951216" cy="523220"/>
+          </a:xfrm>
+          <a:prstGeom prst="rect">
+            <a:avLst/>
+          </a:prstGeom>
+          <a:solidFill>
+            <a:schemeClr val="bg1">
+              <a:lumMod val="95000"/>
+            </a:schemeClr>
+          </a:solidFill>
+          <a:ln>
+            <a:solidFill>
+              <a:schemeClr val="bg2"/>
+            </a:solidFill>
+          </a:ln>
+        </p:spPr>
+        <p:txBody>
+          <a:bodyPr wrap="square" rtlCol="0" anchor="ctr" anchorCtr="1">
+            <a:spAutoFit/>
+          </a:bodyPr>
+          <a:lstStyle/>
+          <a:p>
+            <a:r>
+              <a:rPr lang="en-US" sz="2800" dirty="0">
+                <a:hlinkClick r:id="rId5"/>
+              </a:rPr>
+              <a:t>https://gitee.com/yasenstar/python_with_office</a:t>
+            </a:r>
+            <a:endParaRPr lang="en-US" sz="2800" dirty="0"/>
+          </a:p>
+        </p:txBody>
+      </p:sp>
+      <p:pic>
+        <p:nvPicPr>
+          <p:cNvPr id="7" name="Picture 6">
+            <a:extLst>
+              <a:ext uri="{FF2B5EF4-FFF2-40B4-BE49-F238E27FC236}">
+                <a16:creationId xmlns:a16="http://schemas.microsoft.com/office/drawing/2014/main" id="{A9176D0C-CB8F-5AAF-3FE8-4949AFA11081}"/>
+              </a:ext>
+            </a:extLst>
+          </p:cNvPr>
+          <p:cNvPicPr>
+            <a:picLocks noChangeAspect="1"/>
+          </p:cNvPicPr>
+          <p:nvPr/>
+        </p:nvPicPr>
+        <p:blipFill>
+          <a:blip r:embed="rId6"/>
+          <a:stretch>
+            <a:fillRect/>
+          </a:stretch>
+        </p:blipFill>
+        <p:spPr>
+          <a:xfrm>
+            <a:off x="6104474" y="1707656"/>
+            <a:ext cx="5694925" cy="3593552"/>
+          </a:xfrm>
+          <a:prstGeom prst="rect">
+            <a:avLst/>
+          </a:prstGeom>
+          <a:ln>
+            <a:noFill/>
+          </a:ln>
+          <a:effectLst>
+            <a:outerShdw blurRad="292100" dist="139700" dir="2700000" algn="tl" rotWithShape="0">
+              <a:srgbClr val="333333">
+                <a:alpha val="65000"/>
+              </a:srgbClr>
+            </a:outerShdw>
+          </a:effectLst>
+        </p:spPr>
+      </p:pic>
+    </p:spTree>
+    <p:extLst>
+      <p:ext uri="{BB962C8B-B14F-4D97-AF65-F5344CB8AC3E}">
+        <p14:creationId xmlns:p14="http://schemas.microsoft.com/office/powerpoint/2010/main" val="1906186032"/>
       </p:ext>
     </p:extLst>
   </p:cSld>

</xml_diff>